<commit_message>
New efficiencies and acceptances for several vars. Also QCD closure test and tt contamination for loose btag wp
</commit_message>
<xml_diff>
--- a/Weekly Meetings/HEP_Weekly_10January2020.pptx
+++ b/Weekly Meetings/HEP_Weekly_10January2020.pptx
@@ -6,18 +6,17 @@
     <p:sldMasterId id="2147483661" r:id="rId2"/>
   </p:sldMasterIdLst>
   <p:notesMasterIdLst>
-    <p:notesMasterId r:id="rId9"/>
+    <p:notesMasterId r:id="rId8"/>
   </p:notesMasterIdLst>
   <p:handoutMasterIdLst>
-    <p:handoutMasterId r:id="rId10"/>
+    <p:handoutMasterId r:id="rId9"/>
   </p:handoutMasterIdLst>
   <p:sldIdLst>
     <p:sldId id="256" r:id="rId3"/>
     <p:sldId id="500" r:id="rId4"/>
-    <p:sldId id="512" r:id="rId5"/>
-    <p:sldId id="509" r:id="rId6"/>
-    <p:sldId id="511" r:id="rId7"/>
-    <p:sldId id="513" r:id="rId8"/>
+    <p:sldId id="509" r:id="rId5"/>
+    <p:sldId id="513" r:id="rId6"/>
+    <p:sldId id="512" r:id="rId7"/>
   </p:sldIdLst>
   <p:sldSz cx="12192000" cy="6858000"/>
   <p:notesSz cx="6858000" cy="9144000"/>
@@ -7682,7 +7681,7 @@
             <p:spPr>
               <a:xfrm>
                 <a:off x="111965" y="717334"/>
-                <a:ext cx="11783048" cy="5918993"/>
+                <a:ext cx="11783048" cy="6195992"/>
               </a:xfrm>
               <a:prstGeom prst="rect">
                 <a:avLst/>
@@ -7840,13 +7839,46 @@
                   <a:rPr lang="en-US" dirty="0">
                     <a:sym typeface="Wingdings" pitchFamily="2" charset="2"/>
                   </a:rPr>
-                  <a:t> templates are </a:t>
+                  <a:t> templates are ok </a:t>
+                </a:r>
+                <a:endParaRPr lang="el-GR" dirty="0">
+                  <a:sym typeface="Wingdings" pitchFamily="2" charset="2"/>
+                </a:endParaRPr>
+              </a:p>
+              <a:p>
+                <a:pPr marL="742950" lvl="1" indent="-285750">
+                  <a:buFont typeface="Arial" panose="020B0604020202020204" pitchFamily="34" charset="0"/>
+                  <a:buChar char="•"/>
+                </a:pPr>
+                <a:r>
+                  <a:rPr lang="en-US" dirty="0">
+                    <a:sym typeface="Wingdings" pitchFamily="2" charset="2"/>
+                  </a:rPr>
+                  <a:t>In order to compare our results with theoretical </a:t>
                 </a:r>
                 <a:r>
-                  <a:rPr lang="en-US">
+                  <a:rPr lang="en-US" dirty="0" err="1">
                     <a:sym typeface="Wingdings" pitchFamily="2" charset="2"/>
                   </a:rPr>
-                  <a:t>ok </a:t>
+                  <a:t>parton</a:t>
+                </a:r>
+                <a:r>
+                  <a:rPr lang="en-US" dirty="0">
+                    <a:sym typeface="Wingdings" pitchFamily="2" charset="2"/>
+                  </a:rPr>
+                  <a:t>/particle results  Nominal MC and not High </a:t>
+                </a:r>
+                <a:r>
+                  <a:rPr lang="en-US" dirty="0" err="1">
+                    <a:sym typeface="Wingdings" pitchFamily="2" charset="2"/>
+                  </a:rPr>
+                  <a:t>Mtt</a:t>
+                </a:r>
+                <a:r>
+                  <a:rPr lang="en-US" dirty="0">
+                    <a:sym typeface="Wingdings" pitchFamily="2" charset="2"/>
+                  </a:rPr>
+                  <a:t> samples</a:t>
                 </a:r>
                 <a:endParaRPr lang="en-US" dirty="0"/>
               </a:p>
@@ -8365,7 +8397,7 @@
             <p:spPr>
               <a:xfrm>
                 <a:off x="111965" y="717334"/>
-                <a:ext cx="11783048" cy="5918993"/>
+                <a:ext cx="11783048" cy="6195992"/>
               </a:xfrm>
               <a:prstGeom prst="rect">
                 <a:avLst/>
@@ -8373,7 +8405,7 @@
               <a:blipFill>
                 <a:blip r:embed="rId2"/>
                 <a:stretch>
-                  <a:fillRect l="-323" t="-214"/>
+                  <a:fillRect l="-323" t="-204"/>
                 </a:stretch>
               </a:blipFill>
             </p:spPr>
@@ -8465,6 +8497,804 @@
 </file>
 
 <file path=ppt/slides/slide3.xml><?xml version="1.0" encoding="utf-8"?>
+<p:sld xmlns:a="http://schemas.openxmlformats.org/drawingml/2006/main" xmlns:r="http://schemas.openxmlformats.org/officeDocument/2006/relationships" xmlns:p="http://schemas.openxmlformats.org/presentationml/2006/main">
+  <p:cSld>
+    <p:spTree>
+      <p:nvGrpSpPr>
+        <p:cNvPr id="1" name=""/>
+        <p:cNvGrpSpPr/>
+        <p:nvPr/>
+      </p:nvGrpSpPr>
+      <p:grpSpPr>
+        <a:xfrm>
+          <a:off x="0" y="0"/>
+          <a:ext cx="0" cy="0"/>
+          <a:chOff x="0" y="0"/>
+          <a:chExt cx="0" cy="0"/>
+        </a:xfrm>
+      </p:grpSpPr>
+      <p:sp>
+        <p:nvSpPr>
+          <p:cNvPr id="11" name="Footer Placeholder 7">
+            <a:extLst>
+              <a:ext uri="{FF2B5EF4-FFF2-40B4-BE49-F238E27FC236}">
+                <a16:creationId xmlns:a16="http://schemas.microsoft.com/office/drawing/2014/main" id="{59E26047-BD3C-504E-B955-20FE5C8AA1AA}"/>
+              </a:ext>
+            </a:extLst>
+          </p:cNvPr>
+          <p:cNvSpPr>
+            <a:spLocks noGrp="1"/>
+          </p:cNvSpPr>
+          <p:nvPr>
+            <p:ph type="ftr" sz="quarter" idx="11"/>
+          </p:nvPr>
+        </p:nvSpPr>
+        <p:spPr>
+          <a:xfrm>
+            <a:off x="3686185" y="6459785"/>
+            <a:ext cx="4822804" cy="365125"/>
+          </a:xfrm>
+        </p:spPr>
+        <p:txBody>
+          <a:bodyPr/>
+          <a:lstStyle/>
+          <a:p>
+            <a:r>
+              <a:rPr lang="fi-FI"/>
+              <a:t>NTUA G. Bakas</a:t>
+            </a:r>
+            <a:endParaRPr lang="en-US" dirty="0"/>
+          </a:p>
+        </p:txBody>
+      </p:sp>
+      <p:sp>
+        <p:nvSpPr>
+          <p:cNvPr id="12" name="Title 4">
+            <a:extLst>
+              <a:ext uri="{FF2B5EF4-FFF2-40B4-BE49-F238E27FC236}">
+                <a16:creationId xmlns:a16="http://schemas.microsoft.com/office/drawing/2014/main" id="{CCE472BB-DFA4-B349-8F30-2673C528FF7C}"/>
+              </a:ext>
+            </a:extLst>
+          </p:cNvPr>
+          <p:cNvSpPr txBox="1">
+            <a:spLocks/>
+          </p:cNvSpPr>
+          <p:nvPr/>
+        </p:nvSpPr>
+        <p:spPr>
+          <a:xfrm>
+            <a:off x="270168" y="174788"/>
+            <a:ext cx="6598766" cy="512916"/>
+          </a:xfrm>
+          <a:prstGeom prst="rect">
+            <a:avLst/>
+          </a:prstGeom>
+        </p:spPr>
+        <p:txBody>
+          <a:bodyPr vert="horz" lIns="91440" tIns="45720" rIns="91440" bIns="45720" rtlCol="0" anchor="b">
+            <a:noAutofit/>
+          </a:bodyPr>
+          <a:lstStyle>
+            <a:lvl1pPr algn="l" defTabSz="914400" rtl="0" eaLnBrk="1" latinLnBrk="0" hangingPunct="1">
+              <a:lnSpc>
+                <a:spcPct val="85000"/>
+              </a:lnSpc>
+              <a:spcBef>
+                <a:spcPct val="0"/>
+              </a:spcBef>
+              <a:buNone/>
+              <a:defRPr sz="4800" kern="1200" spc="-50" baseline="0">
+                <a:solidFill>
+                  <a:schemeClr val="tx1">
+                    <a:lumMod val="75000"/>
+                    <a:lumOff val="25000"/>
+                  </a:schemeClr>
+                </a:solidFill>
+                <a:latin typeface="+mj-lt"/>
+                <a:ea typeface="+mj-ea"/>
+                <a:cs typeface="+mj-cs"/>
+              </a:defRPr>
+            </a:lvl1pPr>
+          </a:lstStyle>
+          <a:p>
+            <a:r>
+              <a:rPr lang="en-GB" sz="2800" u="sng" dirty="0"/>
+              <a:t>TT contamination with Loose b-tagging WP</a:t>
+            </a:r>
+          </a:p>
+        </p:txBody>
+      </p:sp>
+      <p:sp>
+        <p:nvSpPr>
+          <p:cNvPr id="24" name="TextBox 23">
+            <a:extLst>
+              <a:ext uri="{FF2B5EF4-FFF2-40B4-BE49-F238E27FC236}">
+                <a16:creationId xmlns:a16="http://schemas.microsoft.com/office/drawing/2014/main" id="{6467259F-D55B-834E-9B9E-F410C9440440}"/>
+              </a:ext>
+            </a:extLst>
+          </p:cNvPr>
+          <p:cNvSpPr txBox="1"/>
+          <p:nvPr/>
+        </p:nvSpPr>
+        <p:spPr>
+          <a:xfrm>
+            <a:off x="1131570" y="1136599"/>
+            <a:ext cx="2057400" cy="369332"/>
+          </a:xfrm>
+          <a:prstGeom prst="rect">
+            <a:avLst/>
+          </a:prstGeom>
+          <a:noFill/>
+        </p:spPr>
+        <p:txBody>
+          <a:bodyPr wrap="square" rtlCol="0">
+            <a:spAutoFit/>
+          </a:bodyPr>
+          <a:lstStyle/>
+          <a:p>
+            <a:pPr algn="ctr"/>
+            <a:r>
+              <a:rPr lang="en-US" dirty="0">
+                <a:solidFill>
+                  <a:srgbClr val="00B0F0"/>
+                </a:solidFill>
+              </a:rPr>
+              <a:t>2016</a:t>
+            </a:r>
+          </a:p>
+        </p:txBody>
+      </p:sp>
+      <p:sp>
+        <p:nvSpPr>
+          <p:cNvPr id="25" name="TextBox 24">
+            <a:extLst>
+              <a:ext uri="{FF2B5EF4-FFF2-40B4-BE49-F238E27FC236}">
+                <a16:creationId xmlns:a16="http://schemas.microsoft.com/office/drawing/2014/main" id="{DE28F087-3562-8B49-AF03-25095E9C5C74}"/>
+              </a:ext>
+            </a:extLst>
+          </p:cNvPr>
+          <p:cNvSpPr txBox="1"/>
+          <p:nvPr/>
+        </p:nvSpPr>
+        <p:spPr>
+          <a:xfrm>
+            <a:off x="5067300" y="1136599"/>
+            <a:ext cx="2057400" cy="369332"/>
+          </a:xfrm>
+          <a:prstGeom prst="rect">
+            <a:avLst/>
+          </a:prstGeom>
+          <a:noFill/>
+        </p:spPr>
+        <p:txBody>
+          <a:bodyPr wrap="square" rtlCol="0">
+            <a:spAutoFit/>
+          </a:bodyPr>
+          <a:lstStyle/>
+          <a:p>
+            <a:pPr algn="ctr"/>
+            <a:r>
+              <a:rPr lang="en-US" dirty="0">
+                <a:solidFill>
+                  <a:srgbClr val="FF0000"/>
+                </a:solidFill>
+              </a:rPr>
+              <a:t>2017</a:t>
+            </a:r>
+          </a:p>
+        </p:txBody>
+      </p:sp>
+      <p:sp>
+        <p:nvSpPr>
+          <p:cNvPr id="26" name="TextBox 25">
+            <a:extLst>
+              <a:ext uri="{FF2B5EF4-FFF2-40B4-BE49-F238E27FC236}">
+                <a16:creationId xmlns:a16="http://schemas.microsoft.com/office/drawing/2014/main" id="{D81097FE-8411-3A41-813A-135B44833012}"/>
+              </a:ext>
+            </a:extLst>
+          </p:cNvPr>
+          <p:cNvSpPr txBox="1"/>
+          <p:nvPr/>
+        </p:nvSpPr>
+        <p:spPr>
+          <a:xfrm>
+            <a:off x="8871758" y="1134606"/>
+            <a:ext cx="2057400" cy="369332"/>
+          </a:xfrm>
+          <a:prstGeom prst="rect">
+            <a:avLst/>
+          </a:prstGeom>
+          <a:noFill/>
+        </p:spPr>
+        <p:txBody>
+          <a:bodyPr wrap="square" rtlCol="0">
+            <a:spAutoFit/>
+          </a:bodyPr>
+          <a:lstStyle/>
+          <a:p>
+            <a:pPr algn="ctr"/>
+            <a:r>
+              <a:rPr lang="en-US" dirty="0">
+                <a:solidFill>
+                  <a:srgbClr val="00B050"/>
+                </a:solidFill>
+              </a:rPr>
+              <a:t>2018</a:t>
+            </a:r>
+          </a:p>
+        </p:txBody>
+      </p:sp>
+      <p:sp>
+        <p:nvSpPr>
+          <p:cNvPr id="2" name="Slide Number Placeholder 1">
+            <a:extLst>
+              <a:ext uri="{FF2B5EF4-FFF2-40B4-BE49-F238E27FC236}">
+                <a16:creationId xmlns:a16="http://schemas.microsoft.com/office/drawing/2014/main" id="{2BDF07F2-8A31-6F41-9C54-4431125619C4}"/>
+              </a:ext>
+            </a:extLst>
+          </p:cNvPr>
+          <p:cNvSpPr>
+            <a:spLocks noGrp="1"/>
+          </p:cNvSpPr>
+          <p:nvPr>
+            <p:ph type="sldNum" sz="quarter" idx="12"/>
+          </p:nvPr>
+        </p:nvSpPr>
+        <p:spPr/>
+        <p:txBody>
+          <a:bodyPr/>
+          <a:lstStyle/>
+          <a:p>
+            <a:fld id="{4FAB73BC-B049-4115-A692-8D63A059BFB8}" type="slidenum">
+              <a:rPr lang="en-US" smtClean="0"/>
+              <a:pPr/>
+              <a:t>3</a:t>
+            </a:fld>
+            <a:endParaRPr lang="en-US" dirty="0"/>
+          </a:p>
+        </p:txBody>
+      </p:sp>
+      <p:cxnSp>
+        <p:nvCxnSpPr>
+          <p:cNvPr id="31" name="Straight Connector 30">
+            <a:extLst>
+              <a:ext uri="{FF2B5EF4-FFF2-40B4-BE49-F238E27FC236}">
+                <a16:creationId xmlns:a16="http://schemas.microsoft.com/office/drawing/2014/main" id="{39FD2651-9624-6645-A8FB-B6EDFBEACC24}"/>
+              </a:ext>
+            </a:extLst>
+          </p:cNvPr>
+          <p:cNvCxnSpPr>
+            <a:cxnSpLocks/>
+          </p:cNvCxnSpPr>
+          <p:nvPr/>
+        </p:nvCxnSpPr>
+        <p:spPr>
+          <a:xfrm>
+            <a:off x="30480" y="72102"/>
+            <a:ext cx="0" cy="6300788"/>
+          </a:xfrm>
+          <a:prstGeom prst="line">
+            <a:avLst/>
+          </a:prstGeom>
+          <a:ln w="25400">
+            <a:solidFill>
+              <a:srgbClr val="00B0F0"/>
+            </a:solidFill>
+          </a:ln>
+        </p:spPr>
+        <p:style>
+          <a:lnRef idx="1">
+            <a:schemeClr val="accent1"/>
+          </a:lnRef>
+          <a:fillRef idx="0">
+            <a:schemeClr val="accent1"/>
+          </a:fillRef>
+          <a:effectRef idx="0">
+            <a:schemeClr val="accent1"/>
+          </a:effectRef>
+          <a:fontRef idx="minor">
+            <a:schemeClr val="tx1"/>
+          </a:fontRef>
+        </p:style>
+      </p:cxnSp>
+      <p:sp>
+        <p:nvSpPr>
+          <p:cNvPr id="13" name="Date Placeholder 12">
+            <a:extLst>
+              <a:ext uri="{FF2B5EF4-FFF2-40B4-BE49-F238E27FC236}">
+                <a16:creationId xmlns:a16="http://schemas.microsoft.com/office/drawing/2014/main" id="{26FBEBE3-A9F2-CB4A-A555-BD1769498DB6}"/>
+              </a:ext>
+            </a:extLst>
+          </p:cNvPr>
+          <p:cNvSpPr>
+            <a:spLocks noGrp="1"/>
+          </p:cNvSpPr>
+          <p:nvPr>
+            <p:ph type="dt" sz="half" idx="10"/>
+          </p:nvPr>
+        </p:nvSpPr>
+        <p:spPr/>
+        <p:txBody>
+          <a:bodyPr/>
+          <a:lstStyle/>
+          <a:p>
+            <a:fld id="{863596AC-079A-914A-A4AA-F10BF720D55E}" type="datetime1">
+              <a:rPr lang="en-US" smtClean="0"/>
+              <a:t>1/9/20</a:t>
+            </a:fld>
+            <a:endParaRPr lang="en-US" dirty="0"/>
+          </a:p>
+        </p:txBody>
+      </p:sp>
+      <p:cxnSp>
+        <p:nvCxnSpPr>
+          <p:cNvPr id="27" name="Straight Connector 26">
+            <a:extLst>
+              <a:ext uri="{FF2B5EF4-FFF2-40B4-BE49-F238E27FC236}">
+                <a16:creationId xmlns:a16="http://schemas.microsoft.com/office/drawing/2014/main" id="{486E758F-A6A6-A949-AEA6-3614F17201C4}"/>
+              </a:ext>
+            </a:extLst>
+          </p:cNvPr>
+          <p:cNvCxnSpPr>
+            <a:cxnSpLocks/>
+          </p:cNvCxnSpPr>
+          <p:nvPr/>
+        </p:nvCxnSpPr>
+        <p:spPr>
+          <a:xfrm>
+            <a:off x="4002403" y="0"/>
+            <a:ext cx="0" cy="5049078"/>
+          </a:xfrm>
+          <a:prstGeom prst="line">
+            <a:avLst/>
+          </a:prstGeom>
+          <a:ln w="25400">
+            <a:solidFill>
+              <a:srgbClr val="FF0000"/>
+            </a:solidFill>
+          </a:ln>
+        </p:spPr>
+        <p:style>
+          <a:lnRef idx="1">
+            <a:schemeClr val="accent1"/>
+          </a:lnRef>
+          <a:fillRef idx="0">
+            <a:schemeClr val="accent1"/>
+          </a:fillRef>
+          <a:effectRef idx="0">
+            <a:schemeClr val="accent1"/>
+          </a:effectRef>
+          <a:fontRef idx="minor">
+            <a:schemeClr val="tx1"/>
+          </a:fontRef>
+        </p:style>
+      </p:cxnSp>
+      <p:cxnSp>
+        <p:nvCxnSpPr>
+          <p:cNvPr id="28" name="Straight Connector 27">
+            <a:extLst>
+              <a:ext uri="{FF2B5EF4-FFF2-40B4-BE49-F238E27FC236}">
+                <a16:creationId xmlns:a16="http://schemas.microsoft.com/office/drawing/2014/main" id="{58BF1060-8244-AA47-BC85-432273E489FD}"/>
+              </a:ext>
+            </a:extLst>
+          </p:cNvPr>
+          <p:cNvCxnSpPr>
+            <a:cxnSpLocks/>
+          </p:cNvCxnSpPr>
+          <p:nvPr/>
+        </p:nvCxnSpPr>
+        <p:spPr>
+          <a:xfrm flipH="1">
+            <a:off x="7974333" y="0"/>
+            <a:ext cx="1" cy="5049078"/>
+          </a:xfrm>
+          <a:prstGeom prst="line">
+            <a:avLst/>
+          </a:prstGeom>
+          <a:ln w="25400">
+            <a:solidFill>
+              <a:srgbClr val="FF0000"/>
+            </a:solidFill>
+          </a:ln>
+        </p:spPr>
+        <p:style>
+          <a:lnRef idx="1">
+            <a:schemeClr val="accent1"/>
+          </a:lnRef>
+          <a:fillRef idx="0">
+            <a:schemeClr val="accent1"/>
+          </a:fillRef>
+          <a:effectRef idx="0">
+            <a:schemeClr val="accent1"/>
+          </a:effectRef>
+          <a:fontRef idx="minor">
+            <a:schemeClr val="tx1"/>
+          </a:fontRef>
+        </p:style>
+      </p:cxnSp>
+      <p:cxnSp>
+        <p:nvCxnSpPr>
+          <p:cNvPr id="29" name="Straight Connector 28">
+            <a:extLst>
+              <a:ext uri="{FF2B5EF4-FFF2-40B4-BE49-F238E27FC236}">
+                <a16:creationId xmlns:a16="http://schemas.microsoft.com/office/drawing/2014/main" id="{1E569388-2E39-4547-A8E9-ED16C21F2D62}"/>
+              </a:ext>
+            </a:extLst>
+          </p:cNvPr>
+          <p:cNvCxnSpPr>
+            <a:cxnSpLocks/>
+          </p:cNvCxnSpPr>
+          <p:nvPr/>
+        </p:nvCxnSpPr>
+        <p:spPr>
+          <a:xfrm>
+            <a:off x="8055292" y="0"/>
+            <a:ext cx="0" cy="5049078"/>
+          </a:xfrm>
+          <a:prstGeom prst="line">
+            <a:avLst/>
+          </a:prstGeom>
+          <a:ln w="25400">
+            <a:solidFill>
+              <a:srgbClr val="00B050"/>
+            </a:solidFill>
+          </a:ln>
+        </p:spPr>
+        <p:style>
+          <a:lnRef idx="1">
+            <a:schemeClr val="accent1"/>
+          </a:lnRef>
+          <a:fillRef idx="0">
+            <a:schemeClr val="accent1"/>
+          </a:fillRef>
+          <a:effectRef idx="0">
+            <a:schemeClr val="accent1"/>
+          </a:effectRef>
+          <a:fontRef idx="minor">
+            <a:schemeClr val="tx1"/>
+          </a:fontRef>
+        </p:style>
+      </p:cxnSp>
+      <p:cxnSp>
+        <p:nvCxnSpPr>
+          <p:cNvPr id="30" name="Straight Connector 29">
+            <a:extLst>
+              <a:ext uri="{FF2B5EF4-FFF2-40B4-BE49-F238E27FC236}">
+                <a16:creationId xmlns:a16="http://schemas.microsoft.com/office/drawing/2014/main" id="{117EBB5D-182A-9547-9463-4339A9CA0668}"/>
+              </a:ext>
+            </a:extLst>
+          </p:cNvPr>
+          <p:cNvCxnSpPr>
+            <a:cxnSpLocks/>
+          </p:cNvCxnSpPr>
+          <p:nvPr/>
+        </p:nvCxnSpPr>
+        <p:spPr>
+          <a:xfrm>
+            <a:off x="12051035" y="14288"/>
+            <a:ext cx="0" cy="6300788"/>
+          </a:xfrm>
+          <a:prstGeom prst="line">
+            <a:avLst/>
+          </a:prstGeom>
+          <a:ln w="25400">
+            <a:solidFill>
+              <a:srgbClr val="00B050"/>
+            </a:solidFill>
+          </a:ln>
+        </p:spPr>
+        <p:style>
+          <a:lnRef idx="1">
+            <a:schemeClr val="accent1"/>
+          </a:lnRef>
+          <a:fillRef idx="0">
+            <a:schemeClr val="accent1"/>
+          </a:fillRef>
+          <a:effectRef idx="0">
+            <a:schemeClr val="accent1"/>
+          </a:effectRef>
+          <a:fontRef idx="minor">
+            <a:schemeClr val="tx1"/>
+          </a:fontRef>
+        </p:style>
+      </p:cxnSp>
+      <p:cxnSp>
+        <p:nvCxnSpPr>
+          <p:cNvPr id="18" name="Straight Connector 17">
+            <a:extLst>
+              <a:ext uri="{FF2B5EF4-FFF2-40B4-BE49-F238E27FC236}">
+                <a16:creationId xmlns:a16="http://schemas.microsoft.com/office/drawing/2014/main" id="{FA0B9E01-6EBC-A743-8BF6-5BD64D58800A}"/>
+              </a:ext>
+            </a:extLst>
+          </p:cNvPr>
+          <p:cNvCxnSpPr>
+            <a:cxnSpLocks/>
+          </p:cNvCxnSpPr>
+          <p:nvPr/>
+        </p:nvCxnSpPr>
+        <p:spPr>
+          <a:xfrm>
+            <a:off x="3935730" y="0"/>
+            <a:ext cx="0" cy="5049078"/>
+          </a:xfrm>
+          <a:prstGeom prst="line">
+            <a:avLst/>
+          </a:prstGeom>
+          <a:ln w="25400">
+            <a:solidFill>
+              <a:srgbClr val="00B0F0"/>
+            </a:solidFill>
+          </a:ln>
+        </p:spPr>
+        <p:style>
+          <a:lnRef idx="1">
+            <a:schemeClr val="accent1"/>
+          </a:lnRef>
+          <a:fillRef idx="0">
+            <a:schemeClr val="accent1"/>
+          </a:fillRef>
+          <a:effectRef idx="0">
+            <a:schemeClr val="accent1"/>
+          </a:effectRef>
+          <a:fontRef idx="minor">
+            <a:schemeClr val="tx1"/>
+          </a:fontRef>
+        </p:style>
+      </p:cxnSp>
+    </p:spTree>
+    <p:extLst>
+      <p:ext uri="{BB962C8B-B14F-4D97-AF65-F5344CB8AC3E}">
+        <p14:creationId xmlns:p14="http://schemas.microsoft.com/office/powerpoint/2010/main" val="919335657"/>
+      </p:ext>
+    </p:extLst>
+  </p:cSld>
+  <p:clrMapOvr>
+    <a:masterClrMapping/>
+  </p:clrMapOvr>
+</p:sld>
+</file>
+
+<file path=ppt/slides/slide4.xml><?xml version="1.0" encoding="utf-8"?>
+<p:sld xmlns:a="http://schemas.openxmlformats.org/drawingml/2006/main" xmlns:r="http://schemas.openxmlformats.org/officeDocument/2006/relationships" xmlns:p="http://schemas.openxmlformats.org/presentationml/2006/main">
+  <p:cSld>
+    <p:spTree>
+      <p:nvGrpSpPr>
+        <p:cNvPr id="1" name=""/>
+        <p:cNvGrpSpPr/>
+        <p:nvPr/>
+      </p:nvGrpSpPr>
+      <p:grpSpPr>
+        <a:xfrm>
+          <a:off x="0" y="0"/>
+          <a:ext cx="0" cy="0"/>
+          <a:chOff x="0" y="0"/>
+          <a:chExt cx="0" cy="0"/>
+        </a:xfrm>
+      </p:grpSpPr>
+      <p:sp>
+        <p:nvSpPr>
+          <p:cNvPr id="11" name="Footer Placeholder 7">
+            <a:extLst>
+              <a:ext uri="{FF2B5EF4-FFF2-40B4-BE49-F238E27FC236}">
+                <a16:creationId xmlns:a16="http://schemas.microsoft.com/office/drawing/2014/main" id="{59E26047-BD3C-504E-B955-20FE5C8AA1AA}"/>
+              </a:ext>
+            </a:extLst>
+          </p:cNvPr>
+          <p:cNvSpPr>
+            <a:spLocks noGrp="1"/>
+          </p:cNvSpPr>
+          <p:nvPr>
+            <p:ph type="ftr" sz="quarter" idx="11"/>
+          </p:nvPr>
+        </p:nvSpPr>
+        <p:spPr>
+          <a:xfrm>
+            <a:off x="3686185" y="6459785"/>
+            <a:ext cx="4822804" cy="365125"/>
+          </a:xfrm>
+        </p:spPr>
+        <p:txBody>
+          <a:bodyPr/>
+          <a:lstStyle/>
+          <a:p>
+            <a:r>
+              <a:rPr lang="fi-FI"/>
+              <a:t>NTUA G. Bakas</a:t>
+            </a:r>
+            <a:endParaRPr lang="en-US" dirty="0"/>
+          </a:p>
+        </p:txBody>
+      </p:sp>
+      <p:sp>
+        <p:nvSpPr>
+          <p:cNvPr id="2" name="Slide Number Placeholder 1">
+            <a:extLst>
+              <a:ext uri="{FF2B5EF4-FFF2-40B4-BE49-F238E27FC236}">
+                <a16:creationId xmlns:a16="http://schemas.microsoft.com/office/drawing/2014/main" id="{2BDF07F2-8A31-6F41-9C54-4431125619C4}"/>
+              </a:ext>
+            </a:extLst>
+          </p:cNvPr>
+          <p:cNvSpPr>
+            <a:spLocks noGrp="1"/>
+          </p:cNvSpPr>
+          <p:nvPr>
+            <p:ph type="sldNum" sz="quarter" idx="12"/>
+          </p:nvPr>
+        </p:nvSpPr>
+        <p:spPr/>
+        <p:txBody>
+          <a:bodyPr/>
+          <a:lstStyle/>
+          <a:p>
+            <a:fld id="{4FAB73BC-B049-4115-A692-8D63A059BFB8}" type="slidenum">
+              <a:rPr lang="en-US" smtClean="0"/>
+              <a:pPr/>
+              <a:t>4</a:t>
+            </a:fld>
+            <a:endParaRPr lang="en-US" dirty="0"/>
+          </a:p>
+        </p:txBody>
+      </p:sp>
+      <p:sp>
+        <p:nvSpPr>
+          <p:cNvPr id="13" name="Date Placeholder 12">
+            <a:extLst>
+              <a:ext uri="{FF2B5EF4-FFF2-40B4-BE49-F238E27FC236}">
+                <a16:creationId xmlns:a16="http://schemas.microsoft.com/office/drawing/2014/main" id="{26FBEBE3-A9F2-CB4A-A555-BD1769498DB6}"/>
+              </a:ext>
+            </a:extLst>
+          </p:cNvPr>
+          <p:cNvSpPr>
+            <a:spLocks noGrp="1"/>
+          </p:cNvSpPr>
+          <p:nvPr>
+            <p:ph type="dt" sz="half" idx="10"/>
+          </p:nvPr>
+        </p:nvSpPr>
+        <p:spPr/>
+        <p:txBody>
+          <a:bodyPr/>
+          <a:lstStyle/>
+          <a:p>
+            <a:fld id="{863596AC-079A-914A-A4AA-F10BF720D55E}" type="datetime1">
+              <a:rPr lang="en-US" smtClean="0"/>
+              <a:t>1/9/20</a:t>
+            </a:fld>
+            <a:endParaRPr lang="en-US" dirty="0"/>
+          </a:p>
+        </p:txBody>
+      </p:sp>
+      <p:sp>
+        <p:nvSpPr>
+          <p:cNvPr id="32" name="Title 4">
+            <a:extLst>
+              <a:ext uri="{FF2B5EF4-FFF2-40B4-BE49-F238E27FC236}">
+                <a16:creationId xmlns:a16="http://schemas.microsoft.com/office/drawing/2014/main" id="{F99A7C50-63DB-A04F-B28D-F01966DF13E9}"/>
+              </a:ext>
+            </a:extLst>
+          </p:cNvPr>
+          <p:cNvSpPr txBox="1">
+            <a:spLocks/>
+          </p:cNvSpPr>
+          <p:nvPr/>
+        </p:nvSpPr>
+        <p:spPr>
+          <a:xfrm>
+            <a:off x="270168" y="118951"/>
+            <a:ext cx="6598766" cy="512916"/>
+          </a:xfrm>
+          <a:prstGeom prst="rect">
+            <a:avLst/>
+          </a:prstGeom>
+        </p:spPr>
+        <p:txBody>
+          <a:bodyPr vert="horz" lIns="91440" tIns="45720" rIns="91440" bIns="45720" rtlCol="0" anchor="b">
+            <a:noAutofit/>
+          </a:bodyPr>
+          <a:lstStyle>
+            <a:lvl1pPr algn="l" defTabSz="914400" rtl="0" eaLnBrk="1" latinLnBrk="0" hangingPunct="1">
+              <a:lnSpc>
+                <a:spcPct val="85000"/>
+              </a:lnSpc>
+              <a:spcBef>
+                <a:spcPct val="0"/>
+              </a:spcBef>
+              <a:buNone/>
+              <a:defRPr sz="4800" kern="1200" spc="-50" baseline="0">
+                <a:solidFill>
+                  <a:schemeClr val="tx1">
+                    <a:lumMod val="75000"/>
+                    <a:lumOff val="25000"/>
+                  </a:schemeClr>
+                </a:solidFill>
+                <a:latin typeface="+mj-lt"/>
+                <a:ea typeface="+mj-ea"/>
+                <a:cs typeface="+mj-cs"/>
+              </a:defRPr>
+            </a:lvl1pPr>
+          </a:lstStyle>
+          <a:p>
+            <a:r>
+              <a:rPr lang="en-GB" sz="2800" u="sng" dirty="0"/>
+              <a:t>Efficiency And Acceptance for all years</a:t>
+            </a:r>
+          </a:p>
+        </p:txBody>
+      </p:sp>
+      <p:pic>
+        <p:nvPicPr>
+          <p:cNvPr id="10" name="Picture 9">
+            <a:extLst>
+              <a:ext uri="{FF2B5EF4-FFF2-40B4-BE49-F238E27FC236}">
+                <a16:creationId xmlns:a16="http://schemas.microsoft.com/office/drawing/2014/main" id="{6450D0CF-8DA2-8848-B20E-0659A2626562}"/>
+              </a:ext>
+            </a:extLst>
+          </p:cNvPr>
+          <p:cNvPicPr>
+            <a:picLocks noChangeAspect="1"/>
+          </p:cNvPicPr>
+          <p:nvPr/>
+        </p:nvPicPr>
+        <p:blipFill>
+          <a:blip r:embed="rId2"/>
+          <a:stretch>
+            <a:fillRect/>
+          </a:stretch>
+        </p:blipFill>
+        <p:spPr>
+          <a:xfrm rot="5400000">
+            <a:off x="976947" y="368618"/>
+            <a:ext cx="4166870" cy="6120765"/>
+          </a:xfrm>
+          <a:prstGeom prst="rect">
+            <a:avLst/>
+          </a:prstGeom>
+        </p:spPr>
+      </p:pic>
+      <p:pic>
+        <p:nvPicPr>
+          <p:cNvPr id="15" name="Picture 14">
+            <a:extLst>
+              <a:ext uri="{FF2B5EF4-FFF2-40B4-BE49-F238E27FC236}">
+                <a16:creationId xmlns:a16="http://schemas.microsoft.com/office/drawing/2014/main" id="{7915DB52-DD74-594B-8CA6-971597AE9D1B}"/>
+              </a:ext>
+            </a:extLst>
+          </p:cNvPr>
+          <p:cNvPicPr>
+            <a:picLocks noChangeAspect="1"/>
+          </p:cNvPicPr>
+          <p:nvPr/>
+        </p:nvPicPr>
+        <p:blipFill>
+          <a:blip r:embed="rId3"/>
+          <a:stretch>
+            <a:fillRect/>
+          </a:stretch>
+        </p:blipFill>
+        <p:spPr>
+          <a:xfrm rot="5400000">
+            <a:off x="6864815" y="368617"/>
+            <a:ext cx="4166870" cy="6120765"/>
+          </a:xfrm>
+          <a:prstGeom prst="rect">
+            <a:avLst/>
+          </a:prstGeom>
+        </p:spPr>
+      </p:pic>
+    </p:spTree>
+    <p:extLst>
+      <p:ext uri="{BB962C8B-B14F-4D97-AF65-F5344CB8AC3E}">
+        <p14:creationId xmlns:p14="http://schemas.microsoft.com/office/powerpoint/2010/main" val="2616482238"/>
+      </p:ext>
+    </p:extLst>
+  </p:cSld>
+  <p:clrMapOvr>
+    <a:masterClrMapping/>
+  </p:clrMapOvr>
+</p:sld>
+</file>
+
+<file path=ppt/slides/slide5.xml><?xml version="1.0" encoding="utf-8"?>
 <p:sld xmlns:a="http://schemas.openxmlformats.org/drawingml/2006/main" xmlns:r="http://schemas.openxmlformats.org/officeDocument/2006/relationships" xmlns:p="http://schemas.openxmlformats.org/presentationml/2006/main">
   <p:cSld>
     <p:spTree>
@@ -9647,7 +10477,7 @@
             <a:fld id="{4FAB73BC-B049-4115-A692-8D63A059BFB8}" type="slidenum">
               <a:rPr lang="en-US" smtClean="0"/>
               <a:pPr/>
-              <a:t>3</a:t>
+              <a:t>5</a:t>
             </a:fld>
             <a:endParaRPr lang="en-US" dirty="0"/>
           </a:p>
@@ -11059,1696 +11889,6 @@
 </p:sld>
 </file>
 
-<file path=ppt/slides/slide4.xml><?xml version="1.0" encoding="utf-8"?>
-<p:sld xmlns:a="http://schemas.openxmlformats.org/drawingml/2006/main" xmlns:r="http://schemas.openxmlformats.org/officeDocument/2006/relationships" xmlns:p="http://schemas.openxmlformats.org/presentationml/2006/main">
-  <p:cSld>
-    <p:spTree>
-      <p:nvGrpSpPr>
-        <p:cNvPr id="1" name=""/>
-        <p:cNvGrpSpPr/>
-        <p:nvPr/>
-      </p:nvGrpSpPr>
-      <p:grpSpPr>
-        <a:xfrm>
-          <a:off x="0" y="0"/>
-          <a:ext cx="0" cy="0"/>
-          <a:chOff x="0" y="0"/>
-          <a:chExt cx="0" cy="0"/>
-        </a:xfrm>
-      </p:grpSpPr>
-      <p:sp>
-        <p:nvSpPr>
-          <p:cNvPr id="11" name="Footer Placeholder 7">
-            <a:extLst>
-              <a:ext uri="{FF2B5EF4-FFF2-40B4-BE49-F238E27FC236}">
-                <a16:creationId xmlns:a16="http://schemas.microsoft.com/office/drawing/2014/main" id="{59E26047-BD3C-504E-B955-20FE5C8AA1AA}"/>
-              </a:ext>
-            </a:extLst>
-          </p:cNvPr>
-          <p:cNvSpPr>
-            <a:spLocks noGrp="1"/>
-          </p:cNvSpPr>
-          <p:nvPr>
-            <p:ph type="ftr" sz="quarter" idx="11"/>
-          </p:nvPr>
-        </p:nvSpPr>
-        <p:spPr>
-          <a:xfrm>
-            <a:off x="3686185" y="6459785"/>
-            <a:ext cx="4822804" cy="365125"/>
-          </a:xfrm>
-        </p:spPr>
-        <p:txBody>
-          <a:bodyPr/>
-          <a:lstStyle/>
-          <a:p>
-            <a:r>
-              <a:rPr lang="fi-FI"/>
-              <a:t>NTUA G. Bakas</a:t>
-            </a:r>
-            <a:endParaRPr lang="en-US" dirty="0"/>
-          </a:p>
-        </p:txBody>
-      </p:sp>
-      <p:sp>
-        <p:nvSpPr>
-          <p:cNvPr id="12" name="Title 4">
-            <a:extLst>
-              <a:ext uri="{FF2B5EF4-FFF2-40B4-BE49-F238E27FC236}">
-                <a16:creationId xmlns:a16="http://schemas.microsoft.com/office/drawing/2014/main" id="{CCE472BB-DFA4-B349-8F30-2673C528FF7C}"/>
-              </a:ext>
-            </a:extLst>
-          </p:cNvPr>
-          <p:cNvSpPr txBox="1">
-            <a:spLocks/>
-          </p:cNvSpPr>
-          <p:nvPr/>
-        </p:nvSpPr>
-        <p:spPr>
-          <a:xfrm>
-            <a:off x="270168" y="482602"/>
-            <a:ext cx="6598766" cy="512916"/>
-          </a:xfrm>
-          <a:prstGeom prst="rect">
-            <a:avLst/>
-          </a:prstGeom>
-        </p:spPr>
-        <p:txBody>
-          <a:bodyPr vert="horz" lIns="91440" tIns="45720" rIns="91440" bIns="45720" rtlCol="0" anchor="b">
-            <a:noAutofit/>
-          </a:bodyPr>
-          <a:lstStyle>
-            <a:lvl1pPr algn="l" defTabSz="914400" rtl="0" eaLnBrk="1" latinLnBrk="0" hangingPunct="1">
-              <a:lnSpc>
-                <a:spcPct val="85000"/>
-              </a:lnSpc>
-              <a:spcBef>
-                <a:spcPct val="0"/>
-              </a:spcBef>
-              <a:buNone/>
-              <a:defRPr sz="4800" kern="1200" spc="-50" baseline="0">
-                <a:solidFill>
-                  <a:schemeClr val="tx1">
-                    <a:lumMod val="75000"/>
-                    <a:lumOff val="25000"/>
-                  </a:schemeClr>
-                </a:solidFill>
-                <a:latin typeface="+mj-lt"/>
-                <a:ea typeface="+mj-ea"/>
-                <a:cs typeface="+mj-cs"/>
-              </a:defRPr>
-            </a:lvl1pPr>
-          </a:lstStyle>
-          <a:p>
-            <a:r>
-              <a:rPr lang="en-GB" sz="2800" u="sng" dirty="0"/>
-              <a:t>Fiducial Measurements (jetPt0) ABCD method and free eb</a:t>
-            </a:r>
-          </a:p>
-        </p:txBody>
-      </p:sp>
-      <p:sp>
-        <p:nvSpPr>
-          <p:cNvPr id="24" name="TextBox 23">
-            <a:extLst>
-              <a:ext uri="{FF2B5EF4-FFF2-40B4-BE49-F238E27FC236}">
-                <a16:creationId xmlns:a16="http://schemas.microsoft.com/office/drawing/2014/main" id="{6467259F-D55B-834E-9B9E-F410C9440440}"/>
-              </a:ext>
-            </a:extLst>
-          </p:cNvPr>
-          <p:cNvSpPr txBox="1"/>
-          <p:nvPr/>
-        </p:nvSpPr>
-        <p:spPr>
-          <a:xfrm>
-            <a:off x="1131570" y="1136599"/>
-            <a:ext cx="2057400" cy="369332"/>
-          </a:xfrm>
-          <a:prstGeom prst="rect">
-            <a:avLst/>
-          </a:prstGeom>
-          <a:noFill/>
-        </p:spPr>
-        <p:txBody>
-          <a:bodyPr wrap="square" rtlCol="0">
-            <a:spAutoFit/>
-          </a:bodyPr>
-          <a:lstStyle/>
-          <a:p>
-            <a:pPr algn="ctr"/>
-            <a:r>
-              <a:rPr lang="en-US" dirty="0">
-                <a:solidFill>
-                  <a:srgbClr val="00B0F0"/>
-                </a:solidFill>
-              </a:rPr>
-              <a:t>2016</a:t>
-            </a:r>
-          </a:p>
-        </p:txBody>
-      </p:sp>
-      <p:sp>
-        <p:nvSpPr>
-          <p:cNvPr id="25" name="TextBox 24">
-            <a:extLst>
-              <a:ext uri="{FF2B5EF4-FFF2-40B4-BE49-F238E27FC236}">
-                <a16:creationId xmlns:a16="http://schemas.microsoft.com/office/drawing/2014/main" id="{DE28F087-3562-8B49-AF03-25095E9C5C74}"/>
-              </a:ext>
-            </a:extLst>
-          </p:cNvPr>
-          <p:cNvSpPr txBox="1"/>
-          <p:nvPr/>
-        </p:nvSpPr>
-        <p:spPr>
-          <a:xfrm>
-            <a:off x="5067300" y="1136599"/>
-            <a:ext cx="2057400" cy="369332"/>
-          </a:xfrm>
-          <a:prstGeom prst="rect">
-            <a:avLst/>
-          </a:prstGeom>
-          <a:noFill/>
-        </p:spPr>
-        <p:txBody>
-          <a:bodyPr wrap="square" rtlCol="0">
-            <a:spAutoFit/>
-          </a:bodyPr>
-          <a:lstStyle/>
-          <a:p>
-            <a:pPr algn="ctr"/>
-            <a:r>
-              <a:rPr lang="en-US" dirty="0">
-                <a:solidFill>
-                  <a:srgbClr val="FF0000"/>
-                </a:solidFill>
-              </a:rPr>
-              <a:t>2017</a:t>
-            </a:r>
-          </a:p>
-        </p:txBody>
-      </p:sp>
-      <p:sp>
-        <p:nvSpPr>
-          <p:cNvPr id="26" name="TextBox 25">
-            <a:extLst>
-              <a:ext uri="{FF2B5EF4-FFF2-40B4-BE49-F238E27FC236}">
-                <a16:creationId xmlns:a16="http://schemas.microsoft.com/office/drawing/2014/main" id="{D81097FE-8411-3A41-813A-135B44833012}"/>
-              </a:ext>
-            </a:extLst>
-          </p:cNvPr>
-          <p:cNvSpPr txBox="1"/>
-          <p:nvPr/>
-        </p:nvSpPr>
-        <p:spPr>
-          <a:xfrm>
-            <a:off x="8871758" y="1134606"/>
-            <a:ext cx="2057400" cy="369332"/>
-          </a:xfrm>
-          <a:prstGeom prst="rect">
-            <a:avLst/>
-          </a:prstGeom>
-          <a:noFill/>
-        </p:spPr>
-        <p:txBody>
-          <a:bodyPr wrap="square" rtlCol="0">
-            <a:spAutoFit/>
-          </a:bodyPr>
-          <a:lstStyle/>
-          <a:p>
-            <a:pPr algn="ctr"/>
-            <a:r>
-              <a:rPr lang="en-US" dirty="0">
-                <a:solidFill>
-                  <a:srgbClr val="00B050"/>
-                </a:solidFill>
-              </a:rPr>
-              <a:t>2018</a:t>
-            </a:r>
-          </a:p>
-        </p:txBody>
-      </p:sp>
-      <p:sp>
-        <p:nvSpPr>
-          <p:cNvPr id="2" name="Slide Number Placeholder 1">
-            <a:extLst>
-              <a:ext uri="{FF2B5EF4-FFF2-40B4-BE49-F238E27FC236}">
-                <a16:creationId xmlns:a16="http://schemas.microsoft.com/office/drawing/2014/main" id="{2BDF07F2-8A31-6F41-9C54-4431125619C4}"/>
-              </a:ext>
-            </a:extLst>
-          </p:cNvPr>
-          <p:cNvSpPr>
-            <a:spLocks noGrp="1"/>
-          </p:cNvSpPr>
-          <p:nvPr>
-            <p:ph type="sldNum" sz="quarter" idx="12"/>
-          </p:nvPr>
-        </p:nvSpPr>
-        <p:spPr/>
-        <p:txBody>
-          <a:bodyPr/>
-          <a:lstStyle/>
-          <a:p>
-            <a:fld id="{4FAB73BC-B049-4115-A692-8D63A059BFB8}" type="slidenum">
-              <a:rPr lang="en-US" smtClean="0"/>
-              <a:pPr/>
-              <a:t>4</a:t>
-            </a:fld>
-            <a:endParaRPr lang="en-US" dirty="0"/>
-          </a:p>
-        </p:txBody>
-      </p:sp>
-      <p:cxnSp>
-        <p:nvCxnSpPr>
-          <p:cNvPr id="31" name="Straight Connector 30">
-            <a:extLst>
-              <a:ext uri="{FF2B5EF4-FFF2-40B4-BE49-F238E27FC236}">
-                <a16:creationId xmlns:a16="http://schemas.microsoft.com/office/drawing/2014/main" id="{39FD2651-9624-6645-A8FB-B6EDFBEACC24}"/>
-              </a:ext>
-            </a:extLst>
-          </p:cNvPr>
-          <p:cNvCxnSpPr>
-            <a:cxnSpLocks/>
-          </p:cNvCxnSpPr>
-          <p:nvPr/>
-        </p:nvCxnSpPr>
-        <p:spPr>
-          <a:xfrm>
-            <a:off x="30480" y="72102"/>
-            <a:ext cx="0" cy="6300788"/>
-          </a:xfrm>
-          <a:prstGeom prst="line">
-            <a:avLst/>
-          </a:prstGeom>
-          <a:ln w="25400">
-            <a:solidFill>
-              <a:srgbClr val="00B0F0"/>
-            </a:solidFill>
-          </a:ln>
-        </p:spPr>
-        <p:style>
-          <a:lnRef idx="1">
-            <a:schemeClr val="accent1"/>
-          </a:lnRef>
-          <a:fillRef idx="0">
-            <a:schemeClr val="accent1"/>
-          </a:fillRef>
-          <a:effectRef idx="0">
-            <a:schemeClr val="accent1"/>
-          </a:effectRef>
-          <a:fontRef idx="minor">
-            <a:schemeClr val="tx1"/>
-          </a:fontRef>
-        </p:style>
-      </p:cxnSp>
-      <p:sp>
-        <p:nvSpPr>
-          <p:cNvPr id="13" name="Date Placeholder 12">
-            <a:extLst>
-              <a:ext uri="{FF2B5EF4-FFF2-40B4-BE49-F238E27FC236}">
-                <a16:creationId xmlns:a16="http://schemas.microsoft.com/office/drawing/2014/main" id="{26FBEBE3-A9F2-CB4A-A555-BD1769498DB6}"/>
-              </a:ext>
-            </a:extLst>
-          </p:cNvPr>
-          <p:cNvSpPr>
-            <a:spLocks noGrp="1"/>
-          </p:cNvSpPr>
-          <p:nvPr>
-            <p:ph type="dt" sz="half" idx="10"/>
-          </p:nvPr>
-        </p:nvSpPr>
-        <p:spPr/>
-        <p:txBody>
-          <a:bodyPr/>
-          <a:lstStyle/>
-          <a:p>
-            <a:fld id="{863596AC-079A-914A-A4AA-F10BF720D55E}" type="datetime1">
-              <a:rPr lang="en-US" smtClean="0"/>
-              <a:t>1/9/20</a:t>
-            </a:fld>
-            <a:endParaRPr lang="en-US" dirty="0"/>
-          </a:p>
-        </p:txBody>
-      </p:sp>
-      <p:cxnSp>
-        <p:nvCxnSpPr>
-          <p:cNvPr id="27" name="Straight Connector 26">
-            <a:extLst>
-              <a:ext uri="{FF2B5EF4-FFF2-40B4-BE49-F238E27FC236}">
-                <a16:creationId xmlns:a16="http://schemas.microsoft.com/office/drawing/2014/main" id="{486E758F-A6A6-A949-AEA6-3614F17201C4}"/>
-              </a:ext>
-            </a:extLst>
-          </p:cNvPr>
-          <p:cNvCxnSpPr>
-            <a:cxnSpLocks/>
-          </p:cNvCxnSpPr>
-          <p:nvPr/>
-        </p:nvCxnSpPr>
-        <p:spPr>
-          <a:xfrm>
-            <a:off x="4002403" y="0"/>
-            <a:ext cx="0" cy="5049078"/>
-          </a:xfrm>
-          <a:prstGeom prst="line">
-            <a:avLst/>
-          </a:prstGeom>
-          <a:ln w="25400">
-            <a:solidFill>
-              <a:srgbClr val="FF0000"/>
-            </a:solidFill>
-          </a:ln>
-        </p:spPr>
-        <p:style>
-          <a:lnRef idx="1">
-            <a:schemeClr val="accent1"/>
-          </a:lnRef>
-          <a:fillRef idx="0">
-            <a:schemeClr val="accent1"/>
-          </a:fillRef>
-          <a:effectRef idx="0">
-            <a:schemeClr val="accent1"/>
-          </a:effectRef>
-          <a:fontRef idx="minor">
-            <a:schemeClr val="tx1"/>
-          </a:fontRef>
-        </p:style>
-      </p:cxnSp>
-      <p:cxnSp>
-        <p:nvCxnSpPr>
-          <p:cNvPr id="28" name="Straight Connector 27">
-            <a:extLst>
-              <a:ext uri="{FF2B5EF4-FFF2-40B4-BE49-F238E27FC236}">
-                <a16:creationId xmlns:a16="http://schemas.microsoft.com/office/drawing/2014/main" id="{58BF1060-8244-AA47-BC85-432273E489FD}"/>
-              </a:ext>
-            </a:extLst>
-          </p:cNvPr>
-          <p:cNvCxnSpPr>
-            <a:cxnSpLocks/>
-          </p:cNvCxnSpPr>
-          <p:nvPr/>
-        </p:nvCxnSpPr>
-        <p:spPr>
-          <a:xfrm flipH="1">
-            <a:off x="7974333" y="0"/>
-            <a:ext cx="1" cy="5049078"/>
-          </a:xfrm>
-          <a:prstGeom prst="line">
-            <a:avLst/>
-          </a:prstGeom>
-          <a:ln w="25400">
-            <a:solidFill>
-              <a:srgbClr val="FF0000"/>
-            </a:solidFill>
-          </a:ln>
-        </p:spPr>
-        <p:style>
-          <a:lnRef idx="1">
-            <a:schemeClr val="accent1"/>
-          </a:lnRef>
-          <a:fillRef idx="0">
-            <a:schemeClr val="accent1"/>
-          </a:fillRef>
-          <a:effectRef idx="0">
-            <a:schemeClr val="accent1"/>
-          </a:effectRef>
-          <a:fontRef idx="minor">
-            <a:schemeClr val="tx1"/>
-          </a:fontRef>
-        </p:style>
-      </p:cxnSp>
-      <p:cxnSp>
-        <p:nvCxnSpPr>
-          <p:cNvPr id="29" name="Straight Connector 28">
-            <a:extLst>
-              <a:ext uri="{FF2B5EF4-FFF2-40B4-BE49-F238E27FC236}">
-                <a16:creationId xmlns:a16="http://schemas.microsoft.com/office/drawing/2014/main" id="{1E569388-2E39-4547-A8E9-ED16C21F2D62}"/>
-              </a:ext>
-            </a:extLst>
-          </p:cNvPr>
-          <p:cNvCxnSpPr>
-            <a:cxnSpLocks/>
-          </p:cNvCxnSpPr>
-          <p:nvPr/>
-        </p:nvCxnSpPr>
-        <p:spPr>
-          <a:xfrm>
-            <a:off x="8055292" y="0"/>
-            <a:ext cx="0" cy="5049078"/>
-          </a:xfrm>
-          <a:prstGeom prst="line">
-            <a:avLst/>
-          </a:prstGeom>
-          <a:ln w="25400">
-            <a:solidFill>
-              <a:srgbClr val="00B050"/>
-            </a:solidFill>
-          </a:ln>
-        </p:spPr>
-        <p:style>
-          <a:lnRef idx="1">
-            <a:schemeClr val="accent1"/>
-          </a:lnRef>
-          <a:fillRef idx="0">
-            <a:schemeClr val="accent1"/>
-          </a:fillRef>
-          <a:effectRef idx="0">
-            <a:schemeClr val="accent1"/>
-          </a:effectRef>
-          <a:fontRef idx="minor">
-            <a:schemeClr val="tx1"/>
-          </a:fontRef>
-        </p:style>
-      </p:cxnSp>
-      <p:cxnSp>
-        <p:nvCxnSpPr>
-          <p:cNvPr id="30" name="Straight Connector 29">
-            <a:extLst>
-              <a:ext uri="{FF2B5EF4-FFF2-40B4-BE49-F238E27FC236}">
-                <a16:creationId xmlns:a16="http://schemas.microsoft.com/office/drawing/2014/main" id="{117EBB5D-182A-9547-9463-4339A9CA0668}"/>
-              </a:ext>
-            </a:extLst>
-          </p:cNvPr>
-          <p:cNvCxnSpPr>
-            <a:cxnSpLocks/>
-          </p:cNvCxnSpPr>
-          <p:nvPr/>
-        </p:nvCxnSpPr>
-        <p:spPr>
-          <a:xfrm>
-            <a:off x="12051035" y="14288"/>
-            <a:ext cx="0" cy="6300788"/>
-          </a:xfrm>
-          <a:prstGeom prst="line">
-            <a:avLst/>
-          </a:prstGeom>
-          <a:ln w="25400">
-            <a:solidFill>
-              <a:srgbClr val="00B050"/>
-            </a:solidFill>
-          </a:ln>
-        </p:spPr>
-        <p:style>
-          <a:lnRef idx="1">
-            <a:schemeClr val="accent1"/>
-          </a:lnRef>
-          <a:fillRef idx="0">
-            <a:schemeClr val="accent1"/>
-          </a:fillRef>
-          <a:effectRef idx="0">
-            <a:schemeClr val="accent1"/>
-          </a:effectRef>
-          <a:fontRef idx="minor">
-            <a:schemeClr val="tx1"/>
-          </a:fontRef>
-        </p:style>
-      </p:cxnSp>
-      <p:cxnSp>
-        <p:nvCxnSpPr>
-          <p:cNvPr id="18" name="Straight Connector 17">
-            <a:extLst>
-              <a:ext uri="{FF2B5EF4-FFF2-40B4-BE49-F238E27FC236}">
-                <a16:creationId xmlns:a16="http://schemas.microsoft.com/office/drawing/2014/main" id="{FA0B9E01-6EBC-A743-8BF6-5BD64D58800A}"/>
-              </a:ext>
-            </a:extLst>
-          </p:cNvPr>
-          <p:cNvCxnSpPr>
-            <a:cxnSpLocks/>
-          </p:cNvCxnSpPr>
-          <p:nvPr/>
-        </p:nvCxnSpPr>
-        <p:spPr>
-          <a:xfrm>
-            <a:off x="3935730" y="0"/>
-            <a:ext cx="0" cy="5049078"/>
-          </a:xfrm>
-          <a:prstGeom prst="line">
-            <a:avLst/>
-          </a:prstGeom>
-          <a:ln w="25400">
-            <a:solidFill>
-              <a:srgbClr val="00B0F0"/>
-            </a:solidFill>
-          </a:ln>
-        </p:spPr>
-        <p:style>
-          <a:lnRef idx="1">
-            <a:schemeClr val="accent1"/>
-          </a:lnRef>
-          <a:fillRef idx="0">
-            <a:schemeClr val="accent1"/>
-          </a:fillRef>
-          <a:effectRef idx="0">
-            <a:schemeClr val="accent1"/>
-          </a:effectRef>
-          <a:fontRef idx="minor">
-            <a:schemeClr val="tx1"/>
-          </a:fontRef>
-        </p:style>
-      </p:cxnSp>
-      <p:sp>
-        <p:nvSpPr>
-          <p:cNvPr id="32" name="TextBox 31">
-            <a:extLst>
-              <a:ext uri="{FF2B5EF4-FFF2-40B4-BE49-F238E27FC236}">
-                <a16:creationId xmlns:a16="http://schemas.microsoft.com/office/drawing/2014/main" id="{14AAE8B1-BB6C-3F4A-AC09-A96BAFF40E7D}"/>
-              </a:ext>
-            </a:extLst>
-          </p:cNvPr>
-          <p:cNvSpPr txBox="1"/>
-          <p:nvPr/>
-        </p:nvSpPr>
-        <p:spPr>
-          <a:xfrm>
-            <a:off x="62482" y="5118375"/>
-            <a:ext cx="11783048" cy="1200329"/>
-          </a:xfrm>
-          <a:prstGeom prst="rect">
-            <a:avLst/>
-          </a:prstGeom>
-          <a:noFill/>
-        </p:spPr>
-        <p:txBody>
-          <a:bodyPr wrap="square" rtlCol="0">
-            <a:spAutoFit/>
-          </a:bodyPr>
-          <a:lstStyle/>
-          <a:p>
-            <a:pPr marL="285750" indent="-285750">
-              <a:buFont typeface="Arial" panose="020B0604020202020204" pitchFamily="34" charset="0"/>
-              <a:buChar char="•"/>
-            </a:pPr>
-            <a:r>
-              <a:rPr lang="en-US" dirty="0"/>
-              <a:t>Output is not consistent with what we expected </a:t>
-            </a:r>
-          </a:p>
-          <a:p>
-            <a:pPr marL="742950" lvl="1" indent="-285750">
-              <a:buFont typeface="Arial" panose="020B0604020202020204" pitchFamily="34" charset="0"/>
-              <a:buChar char="•"/>
-            </a:pPr>
-            <a:r>
-              <a:rPr lang="en-US" dirty="0"/>
-              <a:t>We expect r </a:t>
-            </a:r>
-            <a:r>
-              <a:rPr lang="en-US" dirty="0">
-                <a:solidFill>
-                  <a:srgbClr val="00B0F0"/>
-                </a:solidFill>
-              </a:rPr>
-              <a:t>~ 0.85 for 2016</a:t>
-            </a:r>
-            <a:r>
-              <a:rPr lang="en-US" dirty="0"/>
-              <a:t>, </a:t>
-            </a:r>
-            <a:r>
-              <a:rPr lang="en-US" dirty="0">
-                <a:solidFill>
-                  <a:srgbClr val="FF0000"/>
-                </a:solidFill>
-              </a:rPr>
-              <a:t>~0.65 for 2017</a:t>
-            </a:r>
-            <a:r>
-              <a:rPr lang="en-US" dirty="0"/>
-              <a:t> and </a:t>
-            </a:r>
-            <a:r>
-              <a:rPr lang="en-US" dirty="0">
-                <a:solidFill>
-                  <a:srgbClr val="00B050"/>
-                </a:solidFill>
-              </a:rPr>
-              <a:t>~0.75 for 2018 </a:t>
-            </a:r>
-            <a:endParaRPr lang="en-US" dirty="0"/>
-          </a:p>
-          <a:p>
-            <a:pPr marL="742950" lvl="1" indent="-285750">
-              <a:buFont typeface="Arial" panose="020B0604020202020204" pitchFamily="34" charset="0"/>
-              <a:buChar char="•"/>
-            </a:pPr>
-            <a:r>
-              <a:rPr lang="en-US" dirty="0"/>
-              <a:t>After signal extraction r</a:t>
-            </a:r>
-            <a:r>
-              <a:rPr lang="en-US" dirty="0">
-                <a:solidFill>
-                  <a:srgbClr val="00B050"/>
-                </a:solidFill>
-              </a:rPr>
-              <a:t> </a:t>
-            </a:r>
-            <a:r>
-              <a:rPr lang="en-US" dirty="0">
-                <a:solidFill>
-                  <a:srgbClr val="00B0F0"/>
-                </a:solidFill>
-              </a:rPr>
-              <a:t>~ 0.96 for 2016</a:t>
-            </a:r>
-            <a:r>
-              <a:rPr lang="en-US" dirty="0"/>
-              <a:t>, </a:t>
-            </a:r>
-            <a:r>
-              <a:rPr lang="en-US" dirty="0">
-                <a:solidFill>
-                  <a:srgbClr val="FF0000"/>
-                </a:solidFill>
-              </a:rPr>
-              <a:t>~0.63 for 2017</a:t>
-            </a:r>
-            <a:r>
-              <a:rPr lang="en-US" dirty="0"/>
-              <a:t> and </a:t>
-            </a:r>
-            <a:r>
-              <a:rPr lang="en-US" dirty="0">
-                <a:solidFill>
-                  <a:srgbClr val="00B050"/>
-                </a:solidFill>
-              </a:rPr>
-              <a:t>~0.89 for 2018 </a:t>
-            </a:r>
-          </a:p>
-          <a:p>
-            <a:pPr marL="742950" lvl="1" indent="-285750">
-              <a:buFont typeface="Arial" panose="020B0604020202020204" pitchFamily="34" charset="0"/>
-              <a:buChar char="•"/>
-            </a:pPr>
-            <a:r>
-              <a:rPr lang="en-US" dirty="0" err="1"/>
-              <a:t>Nqcd</a:t>
-            </a:r>
-            <a:r>
-              <a:rPr lang="en-US" dirty="0"/>
-              <a:t> in SR reduced probably the problem (not enough QCD extracted?) </a:t>
-            </a:r>
-          </a:p>
-        </p:txBody>
-      </p:sp>
-      <p:pic>
-        <p:nvPicPr>
-          <p:cNvPr id="5" name="Picture 4">
-            <a:extLst>
-              <a:ext uri="{FF2B5EF4-FFF2-40B4-BE49-F238E27FC236}">
-                <a16:creationId xmlns:a16="http://schemas.microsoft.com/office/drawing/2014/main" id="{C68E5130-EEA3-7447-A480-FD565BB04347}"/>
-              </a:ext>
-            </a:extLst>
-          </p:cNvPr>
-          <p:cNvPicPr>
-            <a:picLocks noChangeAspect="1"/>
-          </p:cNvPicPr>
-          <p:nvPr/>
-        </p:nvPicPr>
-        <p:blipFill>
-          <a:blip r:embed="rId2"/>
-          <a:stretch>
-            <a:fillRect/>
-          </a:stretch>
-        </p:blipFill>
-        <p:spPr>
-          <a:xfrm rot="5400000">
-            <a:off x="556294" y="1113270"/>
-            <a:ext cx="2752979" cy="3816477"/>
-          </a:xfrm>
-          <a:prstGeom prst="rect">
-            <a:avLst/>
-          </a:prstGeom>
-        </p:spPr>
-      </p:pic>
-      <p:pic>
-        <p:nvPicPr>
-          <p:cNvPr id="9" name="Picture 8">
-            <a:extLst>
-              <a:ext uri="{FF2B5EF4-FFF2-40B4-BE49-F238E27FC236}">
-                <a16:creationId xmlns:a16="http://schemas.microsoft.com/office/drawing/2014/main" id="{A1BBBF3C-5EA5-3E47-A5A2-FAE65F5307D6}"/>
-              </a:ext>
-            </a:extLst>
-          </p:cNvPr>
-          <p:cNvPicPr>
-            <a:picLocks noChangeAspect="1"/>
-          </p:cNvPicPr>
-          <p:nvPr/>
-        </p:nvPicPr>
-        <p:blipFill>
-          <a:blip r:embed="rId3"/>
-          <a:stretch>
-            <a:fillRect/>
-          </a:stretch>
-        </p:blipFill>
-        <p:spPr>
-          <a:xfrm rot="5400000">
-            <a:off x="4557007" y="1113270"/>
-            <a:ext cx="2752979" cy="3816477"/>
-          </a:xfrm>
-          <a:prstGeom prst="rect">
-            <a:avLst/>
-          </a:prstGeom>
-        </p:spPr>
-      </p:pic>
-      <p:pic>
-        <p:nvPicPr>
-          <p:cNvPr id="14" name="Picture 13">
-            <a:extLst>
-              <a:ext uri="{FF2B5EF4-FFF2-40B4-BE49-F238E27FC236}">
-                <a16:creationId xmlns:a16="http://schemas.microsoft.com/office/drawing/2014/main" id="{AA17E4E1-FD80-B74F-AA6F-74FAF2EE33BD}"/>
-              </a:ext>
-            </a:extLst>
-          </p:cNvPr>
-          <p:cNvPicPr>
-            <a:picLocks noChangeAspect="1"/>
-          </p:cNvPicPr>
-          <p:nvPr/>
-        </p:nvPicPr>
-        <p:blipFill>
-          <a:blip r:embed="rId4"/>
-          <a:stretch>
-            <a:fillRect/>
-          </a:stretch>
-        </p:blipFill>
-        <p:spPr>
-          <a:xfrm rot="5400000">
-            <a:off x="8716262" y="1113270"/>
-            <a:ext cx="2752979" cy="3816477"/>
-          </a:xfrm>
-          <a:prstGeom prst="rect">
-            <a:avLst/>
-          </a:prstGeom>
-        </p:spPr>
-      </p:pic>
-    </p:spTree>
-    <p:extLst>
-      <p:ext uri="{BB962C8B-B14F-4D97-AF65-F5344CB8AC3E}">
-        <p14:creationId xmlns:p14="http://schemas.microsoft.com/office/powerpoint/2010/main" val="919335657"/>
-      </p:ext>
-    </p:extLst>
-  </p:cSld>
-  <p:clrMapOvr>
-    <a:masterClrMapping/>
-  </p:clrMapOvr>
-</p:sld>
-</file>
-
-<file path=ppt/slides/slide5.xml><?xml version="1.0" encoding="utf-8"?>
-<p:sld xmlns:a="http://schemas.openxmlformats.org/drawingml/2006/main" xmlns:r="http://schemas.openxmlformats.org/officeDocument/2006/relationships" xmlns:p="http://schemas.openxmlformats.org/presentationml/2006/main">
-  <p:cSld>
-    <p:spTree>
-      <p:nvGrpSpPr>
-        <p:cNvPr id="1" name=""/>
-        <p:cNvGrpSpPr/>
-        <p:nvPr/>
-      </p:nvGrpSpPr>
-      <p:grpSpPr>
-        <a:xfrm>
-          <a:off x="0" y="0"/>
-          <a:ext cx="0" cy="0"/>
-          <a:chOff x="0" y="0"/>
-          <a:chExt cx="0" cy="0"/>
-        </a:xfrm>
-      </p:grpSpPr>
-      <p:sp>
-        <p:nvSpPr>
-          <p:cNvPr id="11" name="Footer Placeholder 7">
-            <a:extLst>
-              <a:ext uri="{FF2B5EF4-FFF2-40B4-BE49-F238E27FC236}">
-                <a16:creationId xmlns:a16="http://schemas.microsoft.com/office/drawing/2014/main" id="{59E26047-BD3C-504E-B955-20FE5C8AA1AA}"/>
-              </a:ext>
-            </a:extLst>
-          </p:cNvPr>
-          <p:cNvSpPr>
-            <a:spLocks noGrp="1"/>
-          </p:cNvSpPr>
-          <p:nvPr>
-            <p:ph type="ftr" sz="quarter" idx="11"/>
-          </p:nvPr>
-        </p:nvSpPr>
-        <p:spPr>
-          <a:xfrm>
-            <a:off x="3686185" y="6459785"/>
-            <a:ext cx="4822804" cy="365125"/>
-          </a:xfrm>
-        </p:spPr>
-        <p:txBody>
-          <a:bodyPr/>
-          <a:lstStyle/>
-          <a:p>
-            <a:r>
-              <a:rPr lang="fi-FI"/>
-              <a:t>NTUA G. Bakas</a:t>
-            </a:r>
-            <a:endParaRPr lang="en-US" dirty="0"/>
-          </a:p>
-        </p:txBody>
-      </p:sp>
-      <p:sp>
-        <p:nvSpPr>
-          <p:cNvPr id="24" name="TextBox 23">
-            <a:extLst>
-              <a:ext uri="{FF2B5EF4-FFF2-40B4-BE49-F238E27FC236}">
-                <a16:creationId xmlns:a16="http://schemas.microsoft.com/office/drawing/2014/main" id="{6467259F-D55B-834E-9B9E-F410C9440440}"/>
-              </a:ext>
-            </a:extLst>
-          </p:cNvPr>
-          <p:cNvSpPr txBox="1"/>
-          <p:nvPr/>
-        </p:nvSpPr>
-        <p:spPr>
-          <a:xfrm>
-            <a:off x="1131570" y="1136599"/>
-            <a:ext cx="2057400" cy="369332"/>
-          </a:xfrm>
-          <a:prstGeom prst="rect">
-            <a:avLst/>
-          </a:prstGeom>
-          <a:noFill/>
-        </p:spPr>
-        <p:txBody>
-          <a:bodyPr wrap="square" rtlCol="0">
-            <a:spAutoFit/>
-          </a:bodyPr>
-          <a:lstStyle/>
-          <a:p>
-            <a:pPr algn="ctr"/>
-            <a:r>
-              <a:rPr lang="en-US" dirty="0">
-                <a:solidFill>
-                  <a:srgbClr val="00B0F0"/>
-                </a:solidFill>
-              </a:rPr>
-              <a:t>2016</a:t>
-            </a:r>
-          </a:p>
-        </p:txBody>
-      </p:sp>
-      <p:sp>
-        <p:nvSpPr>
-          <p:cNvPr id="25" name="TextBox 24">
-            <a:extLst>
-              <a:ext uri="{FF2B5EF4-FFF2-40B4-BE49-F238E27FC236}">
-                <a16:creationId xmlns:a16="http://schemas.microsoft.com/office/drawing/2014/main" id="{DE28F087-3562-8B49-AF03-25095E9C5C74}"/>
-              </a:ext>
-            </a:extLst>
-          </p:cNvPr>
-          <p:cNvSpPr txBox="1"/>
-          <p:nvPr/>
-        </p:nvSpPr>
-        <p:spPr>
-          <a:xfrm>
-            <a:off x="5067300" y="1136599"/>
-            <a:ext cx="2057400" cy="369332"/>
-          </a:xfrm>
-          <a:prstGeom prst="rect">
-            <a:avLst/>
-          </a:prstGeom>
-          <a:noFill/>
-        </p:spPr>
-        <p:txBody>
-          <a:bodyPr wrap="square" rtlCol="0">
-            <a:spAutoFit/>
-          </a:bodyPr>
-          <a:lstStyle/>
-          <a:p>
-            <a:pPr algn="ctr"/>
-            <a:r>
-              <a:rPr lang="en-US" dirty="0">
-                <a:solidFill>
-                  <a:srgbClr val="FF0000"/>
-                </a:solidFill>
-              </a:rPr>
-              <a:t>2017</a:t>
-            </a:r>
-          </a:p>
-        </p:txBody>
-      </p:sp>
-      <p:sp>
-        <p:nvSpPr>
-          <p:cNvPr id="26" name="TextBox 25">
-            <a:extLst>
-              <a:ext uri="{FF2B5EF4-FFF2-40B4-BE49-F238E27FC236}">
-                <a16:creationId xmlns:a16="http://schemas.microsoft.com/office/drawing/2014/main" id="{D81097FE-8411-3A41-813A-135B44833012}"/>
-              </a:ext>
-            </a:extLst>
-          </p:cNvPr>
-          <p:cNvSpPr txBox="1"/>
-          <p:nvPr/>
-        </p:nvSpPr>
-        <p:spPr>
-          <a:xfrm>
-            <a:off x="8871758" y="1134606"/>
-            <a:ext cx="2057400" cy="369332"/>
-          </a:xfrm>
-          <a:prstGeom prst="rect">
-            <a:avLst/>
-          </a:prstGeom>
-          <a:noFill/>
-        </p:spPr>
-        <p:txBody>
-          <a:bodyPr wrap="square" rtlCol="0">
-            <a:spAutoFit/>
-          </a:bodyPr>
-          <a:lstStyle/>
-          <a:p>
-            <a:pPr algn="ctr"/>
-            <a:r>
-              <a:rPr lang="en-US" dirty="0">
-                <a:solidFill>
-                  <a:srgbClr val="00B050"/>
-                </a:solidFill>
-              </a:rPr>
-              <a:t>2018</a:t>
-            </a:r>
-          </a:p>
-        </p:txBody>
-      </p:sp>
-      <p:sp>
-        <p:nvSpPr>
-          <p:cNvPr id="2" name="Slide Number Placeholder 1">
-            <a:extLst>
-              <a:ext uri="{FF2B5EF4-FFF2-40B4-BE49-F238E27FC236}">
-                <a16:creationId xmlns:a16="http://schemas.microsoft.com/office/drawing/2014/main" id="{2BDF07F2-8A31-6F41-9C54-4431125619C4}"/>
-              </a:ext>
-            </a:extLst>
-          </p:cNvPr>
-          <p:cNvSpPr>
-            <a:spLocks noGrp="1"/>
-          </p:cNvSpPr>
-          <p:nvPr>
-            <p:ph type="sldNum" sz="quarter" idx="12"/>
-          </p:nvPr>
-        </p:nvSpPr>
-        <p:spPr/>
-        <p:txBody>
-          <a:bodyPr/>
-          <a:lstStyle/>
-          <a:p>
-            <a:fld id="{4FAB73BC-B049-4115-A692-8D63A059BFB8}" type="slidenum">
-              <a:rPr lang="en-US" smtClean="0"/>
-              <a:pPr/>
-              <a:t>5</a:t>
-            </a:fld>
-            <a:endParaRPr lang="en-US" dirty="0"/>
-          </a:p>
-        </p:txBody>
-      </p:sp>
-      <p:cxnSp>
-        <p:nvCxnSpPr>
-          <p:cNvPr id="31" name="Straight Connector 30">
-            <a:extLst>
-              <a:ext uri="{FF2B5EF4-FFF2-40B4-BE49-F238E27FC236}">
-                <a16:creationId xmlns:a16="http://schemas.microsoft.com/office/drawing/2014/main" id="{39FD2651-9624-6645-A8FB-B6EDFBEACC24}"/>
-              </a:ext>
-            </a:extLst>
-          </p:cNvPr>
-          <p:cNvCxnSpPr>
-            <a:cxnSpLocks/>
-          </p:cNvCxnSpPr>
-          <p:nvPr/>
-        </p:nvCxnSpPr>
-        <p:spPr>
-          <a:xfrm>
-            <a:off x="30480" y="72102"/>
-            <a:ext cx="0" cy="6300788"/>
-          </a:xfrm>
-          <a:prstGeom prst="line">
-            <a:avLst/>
-          </a:prstGeom>
-          <a:ln w="25400">
-            <a:solidFill>
-              <a:srgbClr val="00B0F0"/>
-            </a:solidFill>
-          </a:ln>
-        </p:spPr>
-        <p:style>
-          <a:lnRef idx="1">
-            <a:schemeClr val="accent1"/>
-          </a:lnRef>
-          <a:fillRef idx="0">
-            <a:schemeClr val="accent1"/>
-          </a:fillRef>
-          <a:effectRef idx="0">
-            <a:schemeClr val="accent1"/>
-          </a:effectRef>
-          <a:fontRef idx="minor">
-            <a:schemeClr val="tx1"/>
-          </a:fontRef>
-        </p:style>
-      </p:cxnSp>
-      <p:sp>
-        <p:nvSpPr>
-          <p:cNvPr id="13" name="Date Placeholder 12">
-            <a:extLst>
-              <a:ext uri="{FF2B5EF4-FFF2-40B4-BE49-F238E27FC236}">
-                <a16:creationId xmlns:a16="http://schemas.microsoft.com/office/drawing/2014/main" id="{26FBEBE3-A9F2-CB4A-A555-BD1769498DB6}"/>
-              </a:ext>
-            </a:extLst>
-          </p:cNvPr>
-          <p:cNvSpPr>
-            <a:spLocks noGrp="1"/>
-          </p:cNvSpPr>
-          <p:nvPr>
-            <p:ph type="dt" sz="half" idx="10"/>
-          </p:nvPr>
-        </p:nvSpPr>
-        <p:spPr/>
-        <p:txBody>
-          <a:bodyPr/>
-          <a:lstStyle/>
-          <a:p>
-            <a:fld id="{863596AC-079A-914A-A4AA-F10BF720D55E}" type="datetime1">
-              <a:rPr lang="en-US" smtClean="0"/>
-              <a:t>1/9/20</a:t>
-            </a:fld>
-            <a:endParaRPr lang="en-US" dirty="0"/>
-          </a:p>
-        </p:txBody>
-      </p:sp>
-      <p:cxnSp>
-        <p:nvCxnSpPr>
-          <p:cNvPr id="27" name="Straight Connector 26">
-            <a:extLst>
-              <a:ext uri="{FF2B5EF4-FFF2-40B4-BE49-F238E27FC236}">
-                <a16:creationId xmlns:a16="http://schemas.microsoft.com/office/drawing/2014/main" id="{486E758F-A6A6-A949-AEA6-3614F17201C4}"/>
-              </a:ext>
-            </a:extLst>
-          </p:cNvPr>
-          <p:cNvCxnSpPr>
-            <a:cxnSpLocks/>
-          </p:cNvCxnSpPr>
-          <p:nvPr/>
-        </p:nvCxnSpPr>
-        <p:spPr>
-          <a:xfrm>
-            <a:off x="4002403" y="0"/>
-            <a:ext cx="0" cy="6300788"/>
-          </a:xfrm>
-          <a:prstGeom prst="line">
-            <a:avLst/>
-          </a:prstGeom>
-          <a:ln w="25400">
-            <a:solidFill>
-              <a:srgbClr val="FF0000"/>
-            </a:solidFill>
-          </a:ln>
-        </p:spPr>
-        <p:style>
-          <a:lnRef idx="1">
-            <a:schemeClr val="accent1"/>
-          </a:lnRef>
-          <a:fillRef idx="0">
-            <a:schemeClr val="accent1"/>
-          </a:fillRef>
-          <a:effectRef idx="0">
-            <a:schemeClr val="accent1"/>
-          </a:effectRef>
-          <a:fontRef idx="minor">
-            <a:schemeClr val="tx1"/>
-          </a:fontRef>
-        </p:style>
-      </p:cxnSp>
-      <p:cxnSp>
-        <p:nvCxnSpPr>
-          <p:cNvPr id="28" name="Straight Connector 27">
-            <a:extLst>
-              <a:ext uri="{FF2B5EF4-FFF2-40B4-BE49-F238E27FC236}">
-                <a16:creationId xmlns:a16="http://schemas.microsoft.com/office/drawing/2014/main" id="{58BF1060-8244-AA47-BC85-432273E489FD}"/>
-              </a:ext>
-            </a:extLst>
-          </p:cNvPr>
-          <p:cNvCxnSpPr>
-            <a:cxnSpLocks/>
-          </p:cNvCxnSpPr>
-          <p:nvPr/>
-        </p:nvCxnSpPr>
-        <p:spPr>
-          <a:xfrm>
-            <a:off x="7974333" y="0"/>
-            <a:ext cx="0" cy="6300788"/>
-          </a:xfrm>
-          <a:prstGeom prst="line">
-            <a:avLst/>
-          </a:prstGeom>
-          <a:ln w="25400">
-            <a:solidFill>
-              <a:srgbClr val="FF0000"/>
-            </a:solidFill>
-          </a:ln>
-        </p:spPr>
-        <p:style>
-          <a:lnRef idx="1">
-            <a:schemeClr val="accent1"/>
-          </a:lnRef>
-          <a:fillRef idx="0">
-            <a:schemeClr val="accent1"/>
-          </a:fillRef>
-          <a:effectRef idx="0">
-            <a:schemeClr val="accent1"/>
-          </a:effectRef>
-          <a:fontRef idx="minor">
-            <a:schemeClr val="tx1"/>
-          </a:fontRef>
-        </p:style>
-      </p:cxnSp>
-      <p:cxnSp>
-        <p:nvCxnSpPr>
-          <p:cNvPr id="29" name="Straight Connector 28">
-            <a:extLst>
-              <a:ext uri="{FF2B5EF4-FFF2-40B4-BE49-F238E27FC236}">
-                <a16:creationId xmlns:a16="http://schemas.microsoft.com/office/drawing/2014/main" id="{1E569388-2E39-4547-A8E9-ED16C21F2D62}"/>
-              </a:ext>
-            </a:extLst>
-          </p:cNvPr>
-          <p:cNvCxnSpPr>
-            <a:cxnSpLocks/>
-          </p:cNvCxnSpPr>
-          <p:nvPr/>
-        </p:nvCxnSpPr>
-        <p:spPr>
-          <a:xfrm>
-            <a:off x="8055292" y="0"/>
-            <a:ext cx="0" cy="6300788"/>
-          </a:xfrm>
-          <a:prstGeom prst="line">
-            <a:avLst/>
-          </a:prstGeom>
-          <a:ln w="25400">
-            <a:solidFill>
-              <a:srgbClr val="00B050"/>
-            </a:solidFill>
-          </a:ln>
-        </p:spPr>
-        <p:style>
-          <a:lnRef idx="1">
-            <a:schemeClr val="accent1"/>
-          </a:lnRef>
-          <a:fillRef idx="0">
-            <a:schemeClr val="accent1"/>
-          </a:fillRef>
-          <a:effectRef idx="0">
-            <a:schemeClr val="accent1"/>
-          </a:effectRef>
-          <a:fontRef idx="minor">
-            <a:schemeClr val="tx1"/>
-          </a:fontRef>
-        </p:style>
-      </p:cxnSp>
-      <p:cxnSp>
-        <p:nvCxnSpPr>
-          <p:cNvPr id="30" name="Straight Connector 29">
-            <a:extLst>
-              <a:ext uri="{FF2B5EF4-FFF2-40B4-BE49-F238E27FC236}">
-                <a16:creationId xmlns:a16="http://schemas.microsoft.com/office/drawing/2014/main" id="{117EBB5D-182A-9547-9463-4339A9CA0668}"/>
-              </a:ext>
-            </a:extLst>
-          </p:cNvPr>
-          <p:cNvCxnSpPr>
-            <a:cxnSpLocks/>
-          </p:cNvCxnSpPr>
-          <p:nvPr/>
-        </p:nvCxnSpPr>
-        <p:spPr>
-          <a:xfrm>
-            <a:off x="12036747" y="14288"/>
-            <a:ext cx="0" cy="6300788"/>
-          </a:xfrm>
-          <a:prstGeom prst="line">
-            <a:avLst/>
-          </a:prstGeom>
-          <a:ln w="25400">
-            <a:solidFill>
-              <a:srgbClr val="00B050"/>
-            </a:solidFill>
-          </a:ln>
-        </p:spPr>
-        <p:style>
-          <a:lnRef idx="1">
-            <a:schemeClr val="accent1"/>
-          </a:lnRef>
-          <a:fillRef idx="0">
-            <a:schemeClr val="accent1"/>
-          </a:fillRef>
-          <a:effectRef idx="0">
-            <a:schemeClr val="accent1"/>
-          </a:effectRef>
-          <a:fontRef idx="minor">
-            <a:schemeClr val="tx1"/>
-          </a:fontRef>
-        </p:style>
-      </p:cxnSp>
-      <p:cxnSp>
-        <p:nvCxnSpPr>
-          <p:cNvPr id="18" name="Straight Connector 17">
-            <a:extLst>
-              <a:ext uri="{FF2B5EF4-FFF2-40B4-BE49-F238E27FC236}">
-                <a16:creationId xmlns:a16="http://schemas.microsoft.com/office/drawing/2014/main" id="{FA0B9E01-6EBC-A743-8BF6-5BD64D58800A}"/>
-              </a:ext>
-            </a:extLst>
-          </p:cNvPr>
-          <p:cNvCxnSpPr>
-            <a:cxnSpLocks/>
-          </p:cNvCxnSpPr>
-          <p:nvPr/>
-        </p:nvCxnSpPr>
-        <p:spPr>
-          <a:xfrm>
-            <a:off x="3935730" y="0"/>
-            <a:ext cx="0" cy="6300788"/>
-          </a:xfrm>
-          <a:prstGeom prst="line">
-            <a:avLst/>
-          </a:prstGeom>
-          <a:ln w="25400">
-            <a:solidFill>
-              <a:srgbClr val="00B0F0"/>
-            </a:solidFill>
-          </a:ln>
-        </p:spPr>
-        <p:style>
-          <a:lnRef idx="1">
-            <a:schemeClr val="accent1"/>
-          </a:lnRef>
-          <a:fillRef idx="0">
-            <a:schemeClr val="accent1"/>
-          </a:fillRef>
-          <a:effectRef idx="0">
-            <a:schemeClr val="accent1"/>
-          </a:effectRef>
-          <a:fontRef idx="minor">
-            <a:schemeClr val="tx1"/>
-          </a:fontRef>
-        </p:style>
-      </p:cxnSp>
-      <p:pic>
-        <p:nvPicPr>
-          <p:cNvPr id="7" name="Picture 6">
-            <a:extLst>
-              <a:ext uri="{FF2B5EF4-FFF2-40B4-BE49-F238E27FC236}">
-                <a16:creationId xmlns:a16="http://schemas.microsoft.com/office/drawing/2014/main" id="{250B60F4-7173-DE49-A675-17F71823A4B9}"/>
-              </a:ext>
-            </a:extLst>
-          </p:cNvPr>
-          <p:cNvPicPr>
-            <a:picLocks noChangeAspect="1"/>
-          </p:cNvPicPr>
-          <p:nvPr/>
-        </p:nvPicPr>
-        <p:blipFill>
-          <a:blip r:embed="rId2"/>
-          <a:stretch>
-            <a:fillRect/>
-          </a:stretch>
-        </p:blipFill>
-        <p:spPr>
-          <a:xfrm rot="5400000">
-            <a:off x="4597711" y="1520760"/>
-            <a:ext cx="2752979" cy="3816477"/>
-          </a:xfrm>
-          <a:prstGeom prst="rect">
-            <a:avLst/>
-          </a:prstGeom>
-        </p:spPr>
-      </p:pic>
-      <p:pic>
-        <p:nvPicPr>
-          <p:cNvPr id="14" name="Picture 13">
-            <a:extLst>
-              <a:ext uri="{FF2B5EF4-FFF2-40B4-BE49-F238E27FC236}">
-                <a16:creationId xmlns:a16="http://schemas.microsoft.com/office/drawing/2014/main" id="{89ABDA66-C027-284D-A1F2-7269E72DF64A}"/>
-              </a:ext>
-            </a:extLst>
-          </p:cNvPr>
-          <p:cNvPicPr>
-            <a:picLocks noChangeAspect="1"/>
-          </p:cNvPicPr>
-          <p:nvPr/>
-        </p:nvPicPr>
-        <p:blipFill>
-          <a:blip r:embed="rId3"/>
-          <a:stretch>
-            <a:fillRect/>
-          </a:stretch>
-        </p:blipFill>
-        <p:spPr>
-          <a:xfrm rot="5400000">
-            <a:off x="8734875" y="1520759"/>
-            <a:ext cx="2752979" cy="3816477"/>
-          </a:xfrm>
-          <a:prstGeom prst="rect">
-            <a:avLst/>
-          </a:prstGeom>
-        </p:spPr>
-      </p:pic>
-      <p:sp>
-        <p:nvSpPr>
-          <p:cNvPr id="32" name="Title 4">
-            <a:extLst>
-              <a:ext uri="{FF2B5EF4-FFF2-40B4-BE49-F238E27FC236}">
-                <a16:creationId xmlns:a16="http://schemas.microsoft.com/office/drawing/2014/main" id="{F99A7C50-63DB-A04F-B28D-F01966DF13E9}"/>
-              </a:ext>
-            </a:extLst>
-          </p:cNvPr>
-          <p:cNvSpPr txBox="1">
-            <a:spLocks/>
-          </p:cNvSpPr>
-          <p:nvPr/>
-        </p:nvSpPr>
-        <p:spPr>
-          <a:xfrm>
-            <a:off x="270168" y="482602"/>
-            <a:ext cx="6598766" cy="512916"/>
-          </a:xfrm>
-          <a:prstGeom prst="rect">
-            <a:avLst/>
-          </a:prstGeom>
-        </p:spPr>
-        <p:txBody>
-          <a:bodyPr vert="horz" lIns="91440" tIns="45720" rIns="91440" bIns="45720" rtlCol="0" anchor="b">
-            <a:noAutofit/>
-          </a:bodyPr>
-          <a:lstStyle>
-            <a:lvl1pPr algn="l" defTabSz="914400" rtl="0" eaLnBrk="1" latinLnBrk="0" hangingPunct="1">
-              <a:lnSpc>
-                <a:spcPct val="85000"/>
-              </a:lnSpc>
-              <a:spcBef>
-                <a:spcPct val="0"/>
-              </a:spcBef>
-              <a:buNone/>
-              <a:defRPr sz="4800" kern="1200" spc="-50" baseline="0">
-                <a:solidFill>
-                  <a:schemeClr val="tx1">
-                    <a:lumMod val="75000"/>
-                    <a:lumOff val="25000"/>
-                  </a:schemeClr>
-                </a:solidFill>
-                <a:latin typeface="+mj-lt"/>
-                <a:ea typeface="+mj-ea"/>
-                <a:cs typeface="+mj-cs"/>
-              </a:defRPr>
-            </a:lvl1pPr>
-          </a:lstStyle>
-          <a:p>
-            <a:r>
-              <a:rPr lang="en-GB" sz="2800" u="sng" dirty="0"/>
-              <a:t>Fiducial Measurements (</a:t>
-            </a:r>
-            <a:r>
-              <a:rPr lang="en-GB" sz="2800" u="sng" dirty="0" err="1"/>
-              <a:t>mJJ</a:t>
-            </a:r>
-            <a:r>
-              <a:rPr lang="en-GB" sz="2800" u="sng" dirty="0"/>
-              <a:t>) ABCD method and free eb</a:t>
-            </a:r>
-          </a:p>
-        </p:txBody>
-      </p:sp>
-      <p:pic>
-        <p:nvPicPr>
-          <p:cNvPr id="5" name="Picture 4">
-            <a:extLst>
-              <a:ext uri="{FF2B5EF4-FFF2-40B4-BE49-F238E27FC236}">
-                <a16:creationId xmlns:a16="http://schemas.microsoft.com/office/drawing/2014/main" id="{3885BE6B-FCC4-A845-B46F-55A32A95A1AC}"/>
-              </a:ext>
-            </a:extLst>
-          </p:cNvPr>
-          <p:cNvPicPr>
-            <a:picLocks noChangeAspect="1"/>
-          </p:cNvPicPr>
-          <p:nvPr/>
-        </p:nvPicPr>
-        <p:blipFill>
-          <a:blip r:embed="rId4"/>
-          <a:stretch>
-            <a:fillRect/>
-          </a:stretch>
-        </p:blipFill>
-        <p:spPr>
-          <a:xfrm rot="5400000">
-            <a:off x="616257" y="1520758"/>
-            <a:ext cx="2752979" cy="3816477"/>
-          </a:xfrm>
-          <a:prstGeom prst="rect">
-            <a:avLst/>
-          </a:prstGeom>
-        </p:spPr>
-      </p:pic>
-    </p:spTree>
-    <p:extLst>
-      <p:ext uri="{BB962C8B-B14F-4D97-AF65-F5344CB8AC3E}">
-        <p14:creationId xmlns:p14="http://schemas.microsoft.com/office/powerpoint/2010/main" val="497573080"/>
-      </p:ext>
-    </p:extLst>
-  </p:cSld>
-  <p:clrMapOvr>
-    <a:masterClrMapping/>
-  </p:clrMapOvr>
-</p:sld>
-</file>
-
-<file path=ppt/slides/slide6.xml><?xml version="1.0" encoding="utf-8"?>
-<p:sld xmlns:a="http://schemas.openxmlformats.org/drawingml/2006/main" xmlns:r="http://schemas.openxmlformats.org/officeDocument/2006/relationships" xmlns:p="http://schemas.openxmlformats.org/presentationml/2006/main">
-  <p:cSld>
-    <p:spTree>
-      <p:nvGrpSpPr>
-        <p:cNvPr id="1" name=""/>
-        <p:cNvGrpSpPr/>
-        <p:nvPr/>
-      </p:nvGrpSpPr>
-      <p:grpSpPr>
-        <a:xfrm>
-          <a:off x="0" y="0"/>
-          <a:ext cx="0" cy="0"/>
-          <a:chOff x="0" y="0"/>
-          <a:chExt cx="0" cy="0"/>
-        </a:xfrm>
-      </p:grpSpPr>
-      <p:sp>
-        <p:nvSpPr>
-          <p:cNvPr id="11" name="Footer Placeholder 7">
-            <a:extLst>
-              <a:ext uri="{FF2B5EF4-FFF2-40B4-BE49-F238E27FC236}">
-                <a16:creationId xmlns:a16="http://schemas.microsoft.com/office/drawing/2014/main" id="{59E26047-BD3C-504E-B955-20FE5C8AA1AA}"/>
-              </a:ext>
-            </a:extLst>
-          </p:cNvPr>
-          <p:cNvSpPr>
-            <a:spLocks noGrp="1"/>
-          </p:cNvSpPr>
-          <p:nvPr>
-            <p:ph type="ftr" sz="quarter" idx="11"/>
-          </p:nvPr>
-        </p:nvSpPr>
-        <p:spPr>
-          <a:xfrm>
-            <a:off x="3686185" y="6459785"/>
-            <a:ext cx="4822804" cy="365125"/>
-          </a:xfrm>
-        </p:spPr>
-        <p:txBody>
-          <a:bodyPr/>
-          <a:lstStyle/>
-          <a:p>
-            <a:r>
-              <a:rPr lang="fi-FI"/>
-              <a:t>NTUA G. Bakas</a:t>
-            </a:r>
-            <a:endParaRPr lang="en-US" dirty="0"/>
-          </a:p>
-        </p:txBody>
-      </p:sp>
-      <p:sp>
-        <p:nvSpPr>
-          <p:cNvPr id="2" name="Slide Number Placeholder 1">
-            <a:extLst>
-              <a:ext uri="{FF2B5EF4-FFF2-40B4-BE49-F238E27FC236}">
-                <a16:creationId xmlns:a16="http://schemas.microsoft.com/office/drawing/2014/main" id="{2BDF07F2-8A31-6F41-9C54-4431125619C4}"/>
-              </a:ext>
-            </a:extLst>
-          </p:cNvPr>
-          <p:cNvSpPr>
-            <a:spLocks noGrp="1"/>
-          </p:cNvSpPr>
-          <p:nvPr>
-            <p:ph type="sldNum" sz="quarter" idx="12"/>
-          </p:nvPr>
-        </p:nvSpPr>
-        <p:spPr/>
-        <p:txBody>
-          <a:bodyPr/>
-          <a:lstStyle/>
-          <a:p>
-            <a:fld id="{4FAB73BC-B049-4115-A692-8D63A059BFB8}" type="slidenum">
-              <a:rPr lang="en-US" smtClean="0"/>
-              <a:pPr/>
-              <a:t>6</a:t>
-            </a:fld>
-            <a:endParaRPr lang="en-US" dirty="0"/>
-          </a:p>
-        </p:txBody>
-      </p:sp>
-      <p:sp>
-        <p:nvSpPr>
-          <p:cNvPr id="13" name="Date Placeholder 12">
-            <a:extLst>
-              <a:ext uri="{FF2B5EF4-FFF2-40B4-BE49-F238E27FC236}">
-                <a16:creationId xmlns:a16="http://schemas.microsoft.com/office/drawing/2014/main" id="{26FBEBE3-A9F2-CB4A-A555-BD1769498DB6}"/>
-              </a:ext>
-            </a:extLst>
-          </p:cNvPr>
-          <p:cNvSpPr>
-            <a:spLocks noGrp="1"/>
-          </p:cNvSpPr>
-          <p:nvPr>
-            <p:ph type="dt" sz="half" idx="10"/>
-          </p:nvPr>
-        </p:nvSpPr>
-        <p:spPr/>
-        <p:txBody>
-          <a:bodyPr/>
-          <a:lstStyle/>
-          <a:p>
-            <a:fld id="{863596AC-079A-914A-A4AA-F10BF720D55E}" type="datetime1">
-              <a:rPr lang="en-US" smtClean="0"/>
-              <a:t>1/9/20</a:t>
-            </a:fld>
-            <a:endParaRPr lang="en-US" dirty="0"/>
-          </a:p>
-        </p:txBody>
-      </p:sp>
-      <p:sp>
-        <p:nvSpPr>
-          <p:cNvPr id="32" name="Title 4">
-            <a:extLst>
-              <a:ext uri="{FF2B5EF4-FFF2-40B4-BE49-F238E27FC236}">
-                <a16:creationId xmlns:a16="http://schemas.microsoft.com/office/drawing/2014/main" id="{F99A7C50-63DB-A04F-B28D-F01966DF13E9}"/>
-              </a:ext>
-            </a:extLst>
-          </p:cNvPr>
-          <p:cNvSpPr txBox="1">
-            <a:spLocks/>
-          </p:cNvSpPr>
-          <p:nvPr/>
-        </p:nvSpPr>
-        <p:spPr>
-          <a:xfrm>
-            <a:off x="270168" y="118951"/>
-            <a:ext cx="6598766" cy="512916"/>
-          </a:xfrm>
-          <a:prstGeom prst="rect">
-            <a:avLst/>
-          </a:prstGeom>
-        </p:spPr>
-        <p:txBody>
-          <a:bodyPr vert="horz" lIns="91440" tIns="45720" rIns="91440" bIns="45720" rtlCol="0" anchor="b">
-            <a:noAutofit/>
-          </a:bodyPr>
-          <a:lstStyle>
-            <a:lvl1pPr algn="l" defTabSz="914400" rtl="0" eaLnBrk="1" latinLnBrk="0" hangingPunct="1">
-              <a:lnSpc>
-                <a:spcPct val="85000"/>
-              </a:lnSpc>
-              <a:spcBef>
-                <a:spcPct val="0"/>
-              </a:spcBef>
-              <a:buNone/>
-              <a:defRPr sz="4800" kern="1200" spc="-50" baseline="0">
-                <a:solidFill>
-                  <a:schemeClr val="tx1">
-                    <a:lumMod val="75000"/>
-                    <a:lumOff val="25000"/>
-                  </a:schemeClr>
-                </a:solidFill>
-                <a:latin typeface="+mj-lt"/>
-                <a:ea typeface="+mj-ea"/>
-                <a:cs typeface="+mj-cs"/>
-              </a:defRPr>
-            </a:lvl1pPr>
-          </a:lstStyle>
-          <a:p>
-            <a:r>
-              <a:rPr lang="en-GB" sz="2800" u="sng" dirty="0"/>
-              <a:t>Fiducial Measurements for all years combined </a:t>
-            </a:r>
-          </a:p>
-        </p:txBody>
-      </p:sp>
-      <p:pic>
-        <p:nvPicPr>
-          <p:cNvPr id="10" name="Picture 9">
-            <a:extLst>
-              <a:ext uri="{FF2B5EF4-FFF2-40B4-BE49-F238E27FC236}">
-                <a16:creationId xmlns:a16="http://schemas.microsoft.com/office/drawing/2014/main" id="{6450D0CF-8DA2-8848-B20E-0659A2626562}"/>
-              </a:ext>
-            </a:extLst>
-          </p:cNvPr>
-          <p:cNvPicPr>
-            <a:picLocks noChangeAspect="1"/>
-          </p:cNvPicPr>
-          <p:nvPr/>
-        </p:nvPicPr>
-        <p:blipFill>
-          <a:blip r:embed="rId2"/>
-          <a:stretch>
-            <a:fillRect/>
-          </a:stretch>
-        </p:blipFill>
-        <p:spPr>
-          <a:xfrm rot="5400000">
-            <a:off x="976947" y="368618"/>
-            <a:ext cx="4166870" cy="6120765"/>
-          </a:xfrm>
-          <a:prstGeom prst="rect">
-            <a:avLst/>
-          </a:prstGeom>
-        </p:spPr>
-      </p:pic>
-      <p:pic>
-        <p:nvPicPr>
-          <p:cNvPr id="15" name="Picture 14">
-            <a:extLst>
-              <a:ext uri="{FF2B5EF4-FFF2-40B4-BE49-F238E27FC236}">
-                <a16:creationId xmlns:a16="http://schemas.microsoft.com/office/drawing/2014/main" id="{7915DB52-DD74-594B-8CA6-971597AE9D1B}"/>
-              </a:ext>
-            </a:extLst>
-          </p:cNvPr>
-          <p:cNvPicPr>
-            <a:picLocks noChangeAspect="1"/>
-          </p:cNvPicPr>
-          <p:nvPr/>
-        </p:nvPicPr>
-        <p:blipFill>
-          <a:blip r:embed="rId3"/>
-          <a:stretch>
-            <a:fillRect/>
-          </a:stretch>
-        </p:blipFill>
-        <p:spPr>
-          <a:xfrm rot="5400000">
-            <a:off x="6864815" y="368617"/>
-            <a:ext cx="4166870" cy="6120765"/>
-          </a:xfrm>
-          <a:prstGeom prst="rect">
-            <a:avLst/>
-          </a:prstGeom>
-        </p:spPr>
-      </p:pic>
-    </p:spTree>
-    <p:extLst>
-      <p:ext uri="{BB962C8B-B14F-4D97-AF65-F5344CB8AC3E}">
-        <p14:creationId xmlns:p14="http://schemas.microsoft.com/office/powerpoint/2010/main" val="2616482238"/>
-      </p:ext>
-    </p:extLst>
-  </p:cSld>
-  <p:clrMapOvr>
-    <a:masterClrMapping/>
-  </p:clrMapOvr>
-</p:sld>
-</file>
-
 <file path=ppt/theme/theme1.xml><?xml version="1.0" encoding="utf-8"?>
 <a:theme xmlns:a="http://schemas.openxmlformats.org/drawingml/2006/main" name="Retrospect">
   <a:themeElements>

</xml_diff>

<commit_message>
New plots for eff/acc and qcd closure/tt contamination. Also re-run template fit results for 2016_Loose as well as Fit result using MassFitNew.C which performs a fit only in the 2btag region (as in the 2016 analysis)
</commit_message>
<xml_diff>
--- a/Weekly Meetings/HEP_Weekly_10January2020.pptx
+++ b/Weekly Meetings/HEP_Weekly_10January2020.pptx
@@ -6,17 +6,23 @@
     <p:sldMasterId id="2147483661" r:id="rId2"/>
   </p:sldMasterIdLst>
   <p:notesMasterIdLst>
-    <p:notesMasterId r:id="rId8"/>
+    <p:notesMasterId r:id="rId14"/>
   </p:notesMasterIdLst>
   <p:handoutMasterIdLst>
-    <p:handoutMasterId r:id="rId9"/>
+    <p:handoutMasterId r:id="rId15"/>
   </p:handoutMasterIdLst>
   <p:sldIdLst>
     <p:sldId id="256" r:id="rId3"/>
     <p:sldId id="500" r:id="rId4"/>
     <p:sldId id="509" r:id="rId5"/>
-    <p:sldId id="513" r:id="rId6"/>
-    <p:sldId id="512" r:id="rId7"/>
+    <p:sldId id="514" r:id="rId6"/>
+    <p:sldId id="515" r:id="rId7"/>
+    <p:sldId id="516" r:id="rId8"/>
+    <p:sldId id="517" r:id="rId9"/>
+    <p:sldId id="513" r:id="rId10"/>
+    <p:sldId id="512" r:id="rId11"/>
+    <p:sldId id="518" r:id="rId12"/>
+    <p:sldId id="519" r:id="rId13"/>
   </p:sldIdLst>
   <p:sldSz cx="12192000" cy="6858000"/>
   <p:notesSz cx="6858000" cy="9144000"/>
@@ -208,7 +214,7 @@
           <a:p>
             <a:fld id="{8CD5EADE-870B-3C4D-92F6-FE927CFCE2A1}" type="datetime1">
               <a:rPr lang="en-US" smtClean="0"/>
-              <a:t>1/9/20</a:t>
+              <a:t>1/10/20</a:t>
             </a:fld>
             <a:endParaRPr lang="en-GB"/>
           </a:p>
@@ -414,7 +420,7 @@
           <a:p>
             <a:fld id="{4A3A8317-869C-EC49-8CB2-3286EE886873}" type="datetime1">
               <a:rPr lang="en-US" smtClean="0"/>
-              <a:t>1/9/20</a:t>
+              <a:t>1/10/20</a:t>
             </a:fld>
             <a:endParaRPr lang="en-GB"/>
           </a:p>
@@ -748,7 +754,7 @@
           <a:p>
             <a:fld id="{B49D5E6A-E658-F947-B519-3BD764463DDB}" type="datetime1">
               <a:rPr lang="en-US" smtClean="0"/>
-              <a:t>1/9/20</a:t>
+              <a:t>1/10/20</a:t>
             </a:fld>
             <a:endParaRPr lang="en-GB"/>
           </a:p>
@@ -1016,7 +1022,7 @@
           <a:p>
             <a:fld id="{3FD6B7D5-59BD-A94A-8259-AFB77C1C6F6C}" type="datetime1">
               <a:rPr lang="en-US" smtClean="0"/>
-              <a:t>1/9/20</a:t>
+              <a:t>1/10/20</a:t>
             </a:fld>
             <a:endParaRPr lang="en-US" dirty="0"/>
           </a:p>
@@ -1223,7 +1229,7 @@
           <a:p>
             <a:fld id="{22747042-83B4-2D44-B16D-692521656AEA}" type="datetime1">
               <a:rPr lang="en-US" smtClean="0"/>
-              <a:t>1/9/20</a:t>
+              <a:t>1/10/20</a:t>
             </a:fld>
             <a:endParaRPr lang="en-US" dirty="0"/>
           </a:p>
@@ -1478,7 +1484,7 @@
           <a:p>
             <a:fld id="{123C6174-D222-ED47-AF35-85B52783FDE1}" type="datetime1">
               <a:rPr lang="en-US" smtClean="0"/>
-              <a:t>1/9/20</a:t>
+              <a:t>1/10/20</a:t>
             </a:fld>
             <a:endParaRPr lang="en-US" dirty="0"/>
           </a:p>
@@ -1669,7 +1675,7 @@
           <a:p>
             <a:fld id="{92BB3830-AA68-4343-953F-F849943EB849}" type="datetime1">
               <a:rPr lang="en-US" smtClean="0"/>
-              <a:t>1/9/20</a:t>
+              <a:t>1/10/20</a:t>
             </a:fld>
             <a:endParaRPr lang="en-GB"/>
           </a:p>
@@ -1843,7 +1849,7 @@
           <a:p>
             <a:fld id="{13F0FE4D-A637-F644-BCB7-BB01E9473082}" type="datetime1">
               <a:rPr lang="en-US" smtClean="0"/>
-              <a:t>1/9/20</a:t>
+              <a:t>1/10/20</a:t>
             </a:fld>
             <a:endParaRPr lang="en-GB"/>
           </a:p>
@@ -2093,7 +2099,7 @@
           <a:p>
             <a:fld id="{7916914C-F633-3B4D-8E7C-AF9878FBCAB2}" type="datetime1">
               <a:rPr lang="en-US" smtClean="0"/>
-              <a:t>1/9/20</a:t>
+              <a:t>1/10/20</a:t>
             </a:fld>
             <a:endParaRPr lang="en-GB"/>
           </a:p>
@@ -2329,7 +2335,7 @@
           <a:p>
             <a:fld id="{1BEE493E-6ECC-2D49-AA37-47715FC69928}" type="datetime1">
               <a:rPr lang="en-US" smtClean="0"/>
-              <a:t>1/9/20</a:t>
+              <a:t>1/10/20</a:t>
             </a:fld>
             <a:endParaRPr lang="en-GB"/>
           </a:p>
@@ -2700,7 +2706,7 @@
           <a:p>
             <a:fld id="{44D2375D-BCDA-CD42-A7D1-F6C0DA2CE615}" type="datetime1">
               <a:rPr lang="en-US" smtClean="0"/>
-              <a:t>1/9/20</a:t>
+              <a:t>1/10/20</a:t>
             </a:fld>
             <a:endParaRPr lang="en-GB"/>
           </a:p>
@@ -2822,7 +2828,7 @@
           <a:p>
             <a:fld id="{DF706FF0-E883-3242-B340-EF59CDD02701}" type="datetime1">
               <a:rPr lang="en-US" smtClean="0"/>
-              <a:t>1/9/20</a:t>
+              <a:t>1/10/20</a:t>
             </a:fld>
             <a:endParaRPr lang="en-GB"/>
           </a:p>
@@ -2921,7 +2927,7 @@
           <a:p>
             <a:fld id="{A72B1547-4678-7444-8B0B-D61236993AA6}" type="datetime1">
               <a:rPr lang="en-US" smtClean="0"/>
-              <a:t>1/9/20</a:t>
+              <a:t>1/10/20</a:t>
             </a:fld>
             <a:endParaRPr lang="en-GB"/>
           </a:p>
@@ -3202,7 +3208,7 @@
           <a:p>
             <a:fld id="{F5C0FF04-D16D-9545-B9FE-2A2509161914}" type="datetime1">
               <a:rPr lang="en-US" smtClean="0"/>
-              <a:t>1/9/20</a:t>
+              <a:t>1/10/20</a:t>
             </a:fld>
             <a:endParaRPr lang="en-GB"/>
           </a:p>
@@ -3358,7 +3364,7 @@
           <a:p>
             <a:fld id="{739BCA09-01A4-7D40-97AF-A677405590ED}" type="datetime1">
               <a:rPr lang="en-US" smtClean="0"/>
-              <a:t>1/9/20</a:t>
+              <a:t>1/10/20</a:t>
             </a:fld>
             <a:endParaRPr lang="en-US" dirty="0"/>
           </a:p>
@@ -3639,7 +3645,7 @@
           <a:p>
             <a:fld id="{95430EDC-66BF-5B4F-9F6B-EF430B2635C2}" type="datetime1">
               <a:rPr lang="en-US" smtClean="0"/>
-              <a:t>1/9/20</a:t>
+              <a:t>1/10/20</a:t>
             </a:fld>
             <a:endParaRPr lang="en-GB"/>
           </a:p>
@@ -3813,7 +3819,7 @@
           <a:p>
             <a:fld id="{C40C6D0C-61E5-A14E-AA64-932059ABBCA0}" type="datetime1">
               <a:rPr lang="en-US" smtClean="0"/>
-              <a:t>1/9/20</a:t>
+              <a:t>1/10/20</a:t>
             </a:fld>
             <a:endParaRPr lang="en-GB"/>
           </a:p>
@@ -3997,7 +4003,7 @@
           <a:p>
             <a:fld id="{686993B2-94FA-8143-ACBD-1339E5A7C63D}" type="datetime1">
               <a:rPr lang="en-US" smtClean="0"/>
-              <a:t>1/9/20</a:t>
+              <a:t>1/10/20</a:t>
             </a:fld>
             <a:endParaRPr lang="en-GB"/>
           </a:p>
@@ -4344,7 +4350,7 @@
           <a:p>
             <a:fld id="{887F3A82-5004-DE46-9B8F-C8D1AE47BCDD}" type="datetime1">
               <a:rPr lang="en-US" smtClean="0"/>
-              <a:t>1/9/20</a:t>
+              <a:t>1/10/20</a:t>
             </a:fld>
             <a:endParaRPr lang="en-US" dirty="0"/>
           </a:p>
@@ -4618,7 +4624,7 @@
           <a:p>
             <a:fld id="{9609816B-101F-E649-A6DB-1B34F62305FD}" type="datetime1">
               <a:rPr lang="en-US" smtClean="0"/>
-              <a:t>1/9/20</a:t>
+              <a:t>1/10/20</a:t>
             </a:fld>
             <a:endParaRPr lang="en-US" dirty="0"/>
           </a:p>
@@ -4996,7 +5002,7 @@
           <a:p>
             <a:fld id="{B4B9C9C3-E10A-4046-99D1-D14A01669CB5}" type="datetime1">
               <a:rPr lang="en-US" smtClean="0"/>
-              <a:t>1/9/20</a:t>
+              <a:t>1/10/20</a:t>
             </a:fld>
             <a:endParaRPr lang="en-US" dirty="0"/>
           </a:p>
@@ -5113,7 +5119,7 @@
           <a:p>
             <a:fld id="{B20DF165-EA06-4348-9825-CC0EB7B994A5}" type="datetime1">
               <a:rPr lang="en-US" smtClean="0"/>
-              <a:t>1/9/20</a:t>
+              <a:t>1/10/20</a:t>
             </a:fld>
             <a:endParaRPr lang="en-US" dirty="0"/>
           </a:p>
@@ -5283,7 +5289,7 @@
           <a:p>
             <a:fld id="{BC939BB5-C2A2-354E-94F1-11C8ABC84871}" type="datetime1">
               <a:rPr lang="en-US" smtClean="0"/>
-              <a:t>1/9/20</a:t>
+              <a:t>1/10/20</a:t>
             </a:fld>
             <a:endParaRPr lang="en-US" dirty="0"/>
           </a:p>
@@ -5667,7 +5673,7 @@
           <a:p>
             <a:fld id="{6BC13A68-213D-F04B-9D09-F80EB8CDDAAA}" type="datetime1">
               <a:rPr lang="en-US" smtClean="0"/>
-              <a:t>1/9/20</a:t>
+              <a:t>1/10/20</a:t>
             </a:fld>
             <a:endParaRPr lang="en-US" dirty="0"/>
           </a:p>
@@ -6049,7 +6055,7 @@
           <a:p>
             <a:fld id="{3C9CB665-2448-6244-98A5-6DB781AF1920}" type="datetime1">
               <a:rPr lang="en-US" smtClean="0"/>
-              <a:t>1/9/20</a:t>
+              <a:t>1/10/20</a:t>
             </a:fld>
             <a:endParaRPr lang="en-US" dirty="0"/>
           </a:p>
@@ -6335,7 +6341,7 @@
           <a:p>
             <a:fld id="{0675E229-76FC-AB46-B5B7-99D6369AD45B}" type="datetime1">
               <a:rPr lang="en-US" smtClean="0"/>
-              <a:t>1/9/20</a:t>
+              <a:t>1/10/20</a:t>
             </a:fld>
             <a:endParaRPr lang="en-US" dirty="0"/>
           </a:p>
@@ -7025,7 +7031,7 @@
           <a:p>
             <a:fld id="{69C84D11-6659-6A4A-919D-F211F249C3CD}" type="datetime1">
               <a:rPr lang="en-US" smtClean="0"/>
-              <a:t>1/9/20</a:t>
+              <a:t>1/10/20</a:t>
             </a:fld>
             <a:endParaRPr lang="en-GB"/>
           </a:p>
@@ -7591,6 +7597,1002 @@
 </p:sld>
 </file>
 
+<file path=ppt/slides/slide10.xml><?xml version="1.0" encoding="utf-8"?>
+<p:sld xmlns:a="http://schemas.openxmlformats.org/drawingml/2006/main" xmlns:r="http://schemas.openxmlformats.org/officeDocument/2006/relationships" xmlns:p="http://schemas.openxmlformats.org/presentationml/2006/main">
+  <p:cSld>
+    <p:spTree>
+      <p:nvGrpSpPr>
+        <p:cNvPr id="1" name=""/>
+        <p:cNvGrpSpPr/>
+        <p:nvPr/>
+      </p:nvGrpSpPr>
+      <p:grpSpPr>
+        <a:xfrm>
+          <a:off x="0" y="0"/>
+          <a:ext cx="0" cy="0"/>
+          <a:chOff x="0" y="0"/>
+          <a:chExt cx="0" cy="0"/>
+        </a:xfrm>
+      </p:grpSpPr>
+      <p:sp>
+        <p:nvSpPr>
+          <p:cNvPr id="11" name="Footer Placeholder 7">
+            <a:extLst>
+              <a:ext uri="{FF2B5EF4-FFF2-40B4-BE49-F238E27FC236}">
+                <a16:creationId xmlns:a16="http://schemas.microsoft.com/office/drawing/2014/main" id="{59E26047-BD3C-504E-B955-20FE5C8AA1AA}"/>
+              </a:ext>
+            </a:extLst>
+          </p:cNvPr>
+          <p:cNvSpPr>
+            <a:spLocks noGrp="1"/>
+          </p:cNvSpPr>
+          <p:nvPr>
+            <p:ph type="ftr" sz="quarter" idx="11"/>
+          </p:nvPr>
+        </p:nvSpPr>
+        <p:spPr>
+          <a:xfrm>
+            <a:off x="3686185" y="6459785"/>
+            <a:ext cx="4822804" cy="365125"/>
+          </a:xfrm>
+        </p:spPr>
+        <p:txBody>
+          <a:bodyPr/>
+          <a:lstStyle/>
+          <a:p>
+            <a:r>
+              <a:rPr lang="fi-FI"/>
+              <a:t>NTUA G. Bakas</a:t>
+            </a:r>
+            <a:endParaRPr lang="en-US" dirty="0"/>
+          </a:p>
+        </p:txBody>
+      </p:sp>
+      <p:sp>
+        <p:nvSpPr>
+          <p:cNvPr id="2" name="Slide Number Placeholder 1">
+            <a:extLst>
+              <a:ext uri="{FF2B5EF4-FFF2-40B4-BE49-F238E27FC236}">
+                <a16:creationId xmlns:a16="http://schemas.microsoft.com/office/drawing/2014/main" id="{2BDF07F2-8A31-6F41-9C54-4431125619C4}"/>
+              </a:ext>
+            </a:extLst>
+          </p:cNvPr>
+          <p:cNvSpPr>
+            <a:spLocks noGrp="1"/>
+          </p:cNvSpPr>
+          <p:nvPr>
+            <p:ph type="sldNum" sz="quarter" idx="12"/>
+          </p:nvPr>
+        </p:nvSpPr>
+        <p:spPr/>
+        <p:txBody>
+          <a:bodyPr/>
+          <a:lstStyle/>
+          <a:p>
+            <a:fld id="{4FAB73BC-B049-4115-A692-8D63A059BFB8}" type="slidenum">
+              <a:rPr lang="en-US" smtClean="0"/>
+              <a:pPr/>
+              <a:t>10</a:t>
+            </a:fld>
+            <a:endParaRPr lang="en-US" dirty="0"/>
+          </a:p>
+        </p:txBody>
+      </p:sp>
+      <p:sp>
+        <p:nvSpPr>
+          <p:cNvPr id="13" name="Date Placeholder 12">
+            <a:extLst>
+              <a:ext uri="{FF2B5EF4-FFF2-40B4-BE49-F238E27FC236}">
+                <a16:creationId xmlns:a16="http://schemas.microsoft.com/office/drawing/2014/main" id="{26FBEBE3-A9F2-CB4A-A555-BD1769498DB6}"/>
+              </a:ext>
+            </a:extLst>
+          </p:cNvPr>
+          <p:cNvSpPr>
+            <a:spLocks noGrp="1"/>
+          </p:cNvSpPr>
+          <p:nvPr>
+            <p:ph type="dt" sz="half" idx="10"/>
+          </p:nvPr>
+        </p:nvSpPr>
+        <p:spPr/>
+        <p:txBody>
+          <a:bodyPr/>
+          <a:lstStyle/>
+          <a:p>
+            <a:fld id="{863596AC-079A-914A-A4AA-F10BF720D55E}" type="datetime1">
+              <a:rPr lang="en-US" smtClean="0"/>
+              <a:t>1/10/20</a:t>
+            </a:fld>
+            <a:endParaRPr lang="en-US" dirty="0"/>
+          </a:p>
+        </p:txBody>
+      </p:sp>
+      <p:sp>
+        <p:nvSpPr>
+          <p:cNvPr id="32" name="Title 4">
+            <a:extLst>
+              <a:ext uri="{FF2B5EF4-FFF2-40B4-BE49-F238E27FC236}">
+                <a16:creationId xmlns:a16="http://schemas.microsoft.com/office/drawing/2014/main" id="{F99A7C50-63DB-A04F-B28D-F01966DF13E9}"/>
+              </a:ext>
+            </a:extLst>
+          </p:cNvPr>
+          <p:cNvSpPr txBox="1">
+            <a:spLocks/>
+          </p:cNvSpPr>
+          <p:nvPr/>
+        </p:nvSpPr>
+        <p:spPr>
+          <a:xfrm>
+            <a:off x="270168" y="118951"/>
+            <a:ext cx="6598766" cy="512916"/>
+          </a:xfrm>
+          <a:prstGeom prst="rect">
+            <a:avLst/>
+          </a:prstGeom>
+        </p:spPr>
+        <p:txBody>
+          <a:bodyPr vert="horz" lIns="91440" tIns="45720" rIns="91440" bIns="45720" rtlCol="0" anchor="b">
+            <a:noAutofit/>
+          </a:bodyPr>
+          <a:lstStyle>
+            <a:lvl1pPr algn="l" defTabSz="914400" rtl="0" eaLnBrk="1" latinLnBrk="0" hangingPunct="1">
+              <a:lnSpc>
+                <a:spcPct val="85000"/>
+              </a:lnSpc>
+              <a:spcBef>
+                <a:spcPct val="0"/>
+              </a:spcBef>
+              <a:buNone/>
+              <a:defRPr sz="4800" kern="1200" spc="-50" baseline="0">
+                <a:solidFill>
+                  <a:schemeClr val="tx1">
+                    <a:lumMod val="75000"/>
+                    <a:lumOff val="25000"/>
+                  </a:schemeClr>
+                </a:solidFill>
+                <a:latin typeface="+mj-lt"/>
+                <a:ea typeface="+mj-ea"/>
+                <a:cs typeface="+mj-cs"/>
+              </a:defRPr>
+            </a:lvl1pPr>
+          </a:lstStyle>
+          <a:p>
+            <a:r>
+              <a:rPr lang="en-GB" sz="2800" u="sng" dirty="0"/>
+              <a:t>Template Fit Results for 2016</a:t>
+            </a:r>
+          </a:p>
+        </p:txBody>
+      </p:sp>
+      <p:pic>
+        <p:nvPicPr>
+          <p:cNvPr id="20" name="Picture 19">
+            <a:extLst>
+              <a:ext uri="{FF2B5EF4-FFF2-40B4-BE49-F238E27FC236}">
+                <a16:creationId xmlns:a16="http://schemas.microsoft.com/office/drawing/2014/main" id="{96F6194B-CCAF-A54A-A907-E64CD984CD8C}"/>
+              </a:ext>
+            </a:extLst>
+          </p:cNvPr>
+          <p:cNvPicPr>
+            <a:picLocks noChangeAspect="1"/>
+          </p:cNvPicPr>
+          <p:nvPr/>
+        </p:nvPicPr>
+        <p:blipFill>
+          <a:blip r:embed="rId2"/>
+          <a:stretch>
+            <a:fillRect/>
+          </a:stretch>
+        </p:blipFill>
+        <p:spPr>
+          <a:xfrm rot="5400000">
+            <a:off x="956730" y="46538"/>
+            <a:ext cx="2443353" cy="3816477"/>
+          </a:xfrm>
+          <a:prstGeom prst="rect">
+            <a:avLst/>
+          </a:prstGeom>
+        </p:spPr>
+      </p:pic>
+      <p:pic>
+        <p:nvPicPr>
+          <p:cNvPr id="22" name="Picture 21">
+            <a:extLst>
+              <a:ext uri="{FF2B5EF4-FFF2-40B4-BE49-F238E27FC236}">
+                <a16:creationId xmlns:a16="http://schemas.microsoft.com/office/drawing/2014/main" id="{62DE2722-3605-EE4D-A359-A0E1717C648A}"/>
+              </a:ext>
+            </a:extLst>
+          </p:cNvPr>
+          <p:cNvPicPr>
+            <a:picLocks noChangeAspect="1"/>
+          </p:cNvPicPr>
+          <p:nvPr/>
+        </p:nvPicPr>
+        <p:blipFill>
+          <a:blip r:embed="rId3"/>
+          <a:stretch>
+            <a:fillRect/>
+          </a:stretch>
+        </p:blipFill>
+        <p:spPr>
+          <a:xfrm rot="5400000">
+            <a:off x="956730" y="2830469"/>
+            <a:ext cx="2443353" cy="3816477"/>
+          </a:xfrm>
+          <a:prstGeom prst="rect">
+            <a:avLst/>
+          </a:prstGeom>
+        </p:spPr>
+      </p:pic>
+      <p:pic>
+        <p:nvPicPr>
+          <p:cNvPr id="24" name="Picture 23">
+            <a:extLst>
+              <a:ext uri="{FF2B5EF4-FFF2-40B4-BE49-F238E27FC236}">
+                <a16:creationId xmlns:a16="http://schemas.microsoft.com/office/drawing/2014/main" id="{62836704-65A6-9D44-AEE2-00FBED95B215}"/>
+              </a:ext>
+            </a:extLst>
+          </p:cNvPr>
+          <p:cNvPicPr>
+            <a:picLocks noChangeAspect="1"/>
+          </p:cNvPicPr>
+          <p:nvPr/>
+        </p:nvPicPr>
+        <p:blipFill>
+          <a:blip r:embed="rId4"/>
+          <a:stretch>
+            <a:fillRect/>
+          </a:stretch>
+        </p:blipFill>
+        <p:spPr>
+          <a:xfrm rot="5400000">
+            <a:off x="4773206" y="46539"/>
+            <a:ext cx="2443353" cy="3816477"/>
+          </a:xfrm>
+          <a:prstGeom prst="rect">
+            <a:avLst/>
+          </a:prstGeom>
+        </p:spPr>
+      </p:pic>
+      <p:pic>
+        <p:nvPicPr>
+          <p:cNvPr id="26" name="Picture 25">
+            <a:extLst>
+              <a:ext uri="{FF2B5EF4-FFF2-40B4-BE49-F238E27FC236}">
+                <a16:creationId xmlns:a16="http://schemas.microsoft.com/office/drawing/2014/main" id="{3870B744-AB96-BA4F-988A-034E80AC3F20}"/>
+              </a:ext>
+            </a:extLst>
+          </p:cNvPr>
+          <p:cNvPicPr>
+            <a:picLocks noChangeAspect="1"/>
+          </p:cNvPicPr>
+          <p:nvPr/>
+        </p:nvPicPr>
+        <p:blipFill>
+          <a:blip r:embed="rId5"/>
+          <a:stretch>
+            <a:fillRect/>
+          </a:stretch>
+        </p:blipFill>
+        <p:spPr>
+          <a:xfrm rot="5400000">
+            <a:off x="4773207" y="2830468"/>
+            <a:ext cx="2443353" cy="3816477"/>
+          </a:xfrm>
+          <a:prstGeom prst="rect">
+            <a:avLst/>
+          </a:prstGeom>
+        </p:spPr>
+      </p:pic>
+      <p:pic>
+        <p:nvPicPr>
+          <p:cNvPr id="28" name="Picture 27">
+            <a:extLst>
+              <a:ext uri="{FF2B5EF4-FFF2-40B4-BE49-F238E27FC236}">
+                <a16:creationId xmlns:a16="http://schemas.microsoft.com/office/drawing/2014/main" id="{1A88B5A0-7D60-BF49-AD8D-7A3791CD8A5D}"/>
+              </a:ext>
+            </a:extLst>
+          </p:cNvPr>
+          <p:cNvPicPr>
+            <a:picLocks noChangeAspect="1"/>
+          </p:cNvPicPr>
+          <p:nvPr/>
+        </p:nvPicPr>
+        <p:blipFill>
+          <a:blip r:embed="rId6"/>
+          <a:stretch>
+            <a:fillRect/>
+          </a:stretch>
+        </p:blipFill>
+        <p:spPr>
+          <a:xfrm rot="5400000">
+            <a:off x="8678781" y="2830467"/>
+            <a:ext cx="2443353" cy="3816477"/>
+          </a:xfrm>
+          <a:prstGeom prst="rect">
+            <a:avLst/>
+          </a:prstGeom>
+        </p:spPr>
+      </p:pic>
+      <p:pic>
+        <p:nvPicPr>
+          <p:cNvPr id="30" name="Picture 29">
+            <a:extLst>
+              <a:ext uri="{FF2B5EF4-FFF2-40B4-BE49-F238E27FC236}">
+                <a16:creationId xmlns:a16="http://schemas.microsoft.com/office/drawing/2014/main" id="{2D9B5F15-309C-4A4A-9077-3C32C3622872}"/>
+              </a:ext>
+            </a:extLst>
+          </p:cNvPr>
+          <p:cNvPicPr>
+            <a:picLocks noChangeAspect="1"/>
+          </p:cNvPicPr>
+          <p:nvPr/>
+        </p:nvPicPr>
+        <p:blipFill>
+          <a:blip r:embed="rId7"/>
+          <a:stretch>
+            <a:fillRect/>
+          </a:stretch>
+        </p:blipFill>
+        <p:spPr>
+          <a:xfrm rot="5400000">
+            <a:off x="8678780" y="46538"/>
+            <a:ext cx="2443353" cy="3816477"/>
+          </a:xfrm>
+          <a:prstGeom prst="rect">
+            <a:avLst/>
+          </a:prstGeom>
+        </p:spPr>
+      </p:pic>
+      <p:cxnSp>
+        <p:nvCxnSpPr>
+          <p:cNvPr id="33" name="Straight Connector 32">
+            <a:extLst>
+              <a:ext uri="{FF2B5EF4-FFF2-40B4-BE49-F238E27FC236}">
+                <a16:creationId xmlns:a16="http://schemas.microsoft.com/office/drawing/2014/main" id="{62A975B8-9E30-1746-A5C5-51A3B7F16081}"/>
+              </a:ext>
+            </a:extLst>
+          </p:cNvPr>
+          <p:cNvCxnSpPr>
+            <a:cxnSpLocks/>
+          </p:cNvCxnSpPr>
+          <p:nvPr/>
+        </p:nvCxnSpPr>
+        <p:spPr>
+          <a:xfrm>
+            <a:off x="0" y="3362929"/>
+            <a:ext cx="12192000" cy="0"/>
+          </a:xfrm>
+          <a:prstGeom prst="line">
+            <a:avLst/>
+          </a:prstGeom>
+          <a:ln w="25400">
+            <a:solidFill>
+              <a:schemeClr val="tx1">
+                <a:lumMod val="95000"/>
+                <a:lumOff val="5000"/>
+              </a:schemeClr>
+            </a:solidFill>
+          </a:ln>
+        </p:spPr>
+        <p:style>
+          <a:lnRef idx="1">
+            <a:schemeClr val="accent1"/>
+          </a:lnRef>
+          <a:fillRef idx="0">
+            <a:schemeClr val="accent1"/>
+          </a:fillRef>
+          <a:effectRef idx="0">
+            <a:schemeClr val="accent1"/>
+          </a:effectRef>
+          <a:fontRef idx="minor">
+            <a:schemeClr val="tx1"/>
+          </a:fontRef>
+        </p:style>
+      </p:cxnSp>
+      <p:sp>
+        <p:nvSpPr>
+          <p:cNvPr id="35" name="TextBox 34">
+            <a:extLst>
+              <a:ext uri="{FF2B5EF4-FFF2-40B4-BE49-F238E27FC236}">
+                <a16:creationId xmlns:a16="http://schemas.microsoft.com/office/drawing/2014/main" id="{AD910B35-B93D-774F-9D85-6C91FB298883}"/>
+              </a:ext>
+            </a:extLst>
+          </p:cNvPr>
+          <p:cNvSpPr txBox="1"/>
+          <p:nvPr/>
+        </p:nvSpPr>
+        <p:spPr>
+          <a:xfrm>
+            <a:off x="7300913" y="118951"/>
+            <a:ext cx="2371725" cy="369332"/>
+          </a:xfrm>
+          <a:prstGeom prst="rect">
+            <a:avLst/>
+          </a:prstGeom>
+          <a:noFill/>
+        </p:spPr>
+        <p:txBody>
+          <a:bodyPr wrap="square" rtlCol="0">
+            <a:spAutoFit/>
+          </a:bodyPr>
+          <a:lstStyle/>
+          <a:p>
+            <a:r>
+              <a:rPr lang="en-US" dirty="0"/>
+              <a:t>Ttbar templates</a:t>
+            </a:r>
+          </a:p>
+        </p:txBody>
+      </p:sp>
+      <p:sp>
+        <p:nvSpPr>
+          <p:cNvPr id="36" name="TextBox 35">
+            <a:extLst>
+              <a:ext uri="{FF2B5EF4-FFF2-40B4-BE49-F238E27FC236}">
+                <a16:creationId xmlns:a16="http://schemas.microsoft.com/office/drawing/2014/main" id="{DD9065C1-E166-7D4C-BCE7-89AAF8DF8F3C}"/>
+              </a:ext>
+            </a:extLst>
+          </p:cNvPr>
+          <p:cNvSpPr txBox="1"/>
+          <p:nvPr/>
+        </p:nvSpPr>
+        <p:spPr>
+          <a:xfrm>
+            <a:off x="4609033" y="5903977"/>
+            <a:ext cx="2973933" cy="369332"/>
+          </a:xfrm>
+          <a:prstGeom prst="rect">
+            <a:avLst/>
+          </a:prstGeom>
+          <a:noFill/>
+        </p:spPr>
+        <p:txBody>
+          <a:bodyPr wrap="square" rtlCol="0">
+            <a:spAutoFit/>
+          </a:bodyPr>
+          <a:lstStyle/>
+          <a:p>
+            <a:r>
+              <a:rPr lang="en-US" dirty="0"/>
+              <a:t>Subdominant </a:t>
+            </a:r>
+            <a:r>
+              <a:rPr lang="en-US" dirty="0" err="1"/>
+              <a:t>bkg</a:t>
+            </a:r>
+            <a:r>
+              <a:rPr lang="en-US" dirty="0"/>
+              <a:t> templates</a:t>
+            </a:r>
+          </a:p>
+        </p:txBody>
+      </p:sp>
+    </p:spTree>
+    <p:extLst>
+      <p:ext uri="{BB962C8B-B14F-4D97-AF65-F5344CB8AC3E}">
+        <p14:creationId xmlns:p14="http://schemas.microsoft.com/office/powerpoint/2010/main" val="4015902441"/>
+      </p:ext>
+    </p:extLst>
+  </p:cSld>
+  <p:clrMapOvr>
+    <a:masterClrMapping/>
+  </p:clrMapOvr>
+</p:sld>
+</file>
+
+<file path=ppt/slides/slide11.xml><?xml version="1.0" encoding="utf-8"?>
+<p:sld xmlns:a="http://schemas.openxmlformats.org/drawingml/2006/main" xmlns:r="http://schemas.openxmlformats.org/officeDocument/2006/relationships" xmlns:p="http://schemas.openxmlformats.org/presentationml/2006/main">
+  <p:cSld>
+    <p:spTree>
+      <p:nvGrpSpPr>
+        <p:cNvPr id="1" name=""/>
+        <p:cNvGrpSpPr/>
+        <p:nvPr/>
+      </p:nvGrpSpPr>
+      <p:grpSpPr>
+        <a:xfrm>
+          <a:off x="0" y="0"/>
+          <a:ext cx="0" cy="0"/>
+          <a:chOff x="0" y="0"/>
+          <a:chExt cx="0" cy="0"/>
+        </a:xfrm>
+      </p:grpSpPr>
+      <p:sp>
+        <p:nvSpPr>
+          <p:cNvPr id="11" name="Footer Placeholder 7">
+            <a:extLst>
+              <a:ext uri="{FF2B5EF4-FFF2-40B4-BE49-F238E27FC236}">
+                <a16:creationId xmlns:a16="http://schemas.microsoft.com/office/drawing/2014/main" id="{59E26047-BD3C-504E-B955-20FE5C8AA1AA}"/>
+              </a:ext>
+            </a:extLst>
+          </p:cNvPr>
+          <p:cNvSpPr>
+            <a:spLocks noGrp="1"/>
+          </p:cNvSpPr>
+          <p:nvPr>
+            <p:ph type="ftr" sz="quarter" idx="11"/>
+          </p:nvPr>
+        </p:nvSpPr>
+        <p:spPr>
+          <a:xfrm>
+            <a:off x="3686185" y="6459785"/>
+            <a:ext cx="4822804" cy="365125"/>
+          </a:xfrm>
+        </p:spPr>
+        <p:txBody>
+          <a:bodyPr/>
+          <a:lstStyle/>
+          <a:p>
+            <a:r>
+              <a:rPr lang="fi-FI"/>
+              <a:t>NTUA G. Bakas</a:t>
+            </a:r>
+            <a:endParaRPr lang="en-US" dirty="0"/>
+          </a:p>
+        </p:txBody>
+      </p:sp>
+      <p:sp>
+        <p:nvSpPr>
+          <p:cNvPr id="2" name="Slide Number Placeholder 1">
+            <a:extLst>
+              <a:ext uri="{FF2B5EF4-FFF2-40B4-BE49-F238E27FC236}">
+                <a16:creationId xmlns:a16="http://schemas.microsoft.com/office/drawing/2014/main" id="{2BDF07F2-8A31-6F41-9C54-4431125619C4}"/>
+              </a:ext>
+            </a:extLst>
+          </p:cNvPr>
+          <p:cNvSpPr>
+            <a:spLocks noGrp="1"/>
+          </p:cNvSpPr>
+          <p:nvPr>
+            <p:ph type="sldNum" sz="quarter" idx="12"/>
+          </p:nvPr>
+        </p:nvSpPr>
+        <p:spPr/>
+        <p:txBody>
+          <a:bodyPr/>
+          <a:lstStyle/>
+          <a:p>
+            <a:fld id="{4FAB73BC-B049-4115-A692-8D63A059BFB8}" type="slidenum">
+              <a:rPr lang="en-US" smtClean="0"/>
+              <a:pPr/>
+              <a:t>11</a:t>
+            </a:fld>
+            <a:endParaRPr lang="en-US" dirty="0"/>
+          </a:p>
+        </p:txBody>
+      </p:sp>
+      <p:sp>
+        <p:nvSpPr>
+          <p:cNvPr id="13" name="Date Placeholder 12">
+            <a:extLst>
+              <a:ext uri="{FF2B5EF4-FFF2-40B4-BE49-F238E27FC236}">
+                <a16:creationId xmlns:a16="http://schemas.microsoft.com/office/drawing/2014/main" id="{26FBEBE3-A9F2-CB4A-A555-BD1769498DB6}"/>
+              </a:ext>
+            </a:extLst>
+          </p:cNvPr>
+          <p:cNvSpPr>
+            <a:spLocks noGrp="1"/>
+          </p:cNvSpPr>
+          <p:nvPr>
+            <p:ph type="dt" sz="half" idx="10"/>
+          </p:nvPr>
+        </p:nvSpPr>
+        <p:spPr/>
+        <p:txBody>
+          <a:bodyPr/>
+          <a:lstStyle/>
+          <a:p>
+            <a:fld id="{863596AC-079A-914A-A4AA-F10BF720D55E}" type="datetime1">
+              <a:rPr lang="en-US" smtClean="0"/>
+              <a:t>1/10/20</a:t>
+            </a:fld>
+            <a:endParaRPr lang="en-US" dirty="0"/>
+          </a:p>
+        </p:txBody>
+      </p:sp>
+      <p:sp>
+        <p:nvSpPr>
+          <p:cNvPr id="32" name="Title 4">
+            <a:extLst>
+              <a:ext uri="{FF2B5EF4-FFF2-40B4-BE49-F238E27FC236}">
+                <a16:creationId xmlns:a16="http://schemas.microsoft.com/office/drawing/2014/main" id="{F99A7C50-63DB-A04F-B28D-F01966DF13E9}"/>
+              </a:ext>
+            </a:extLst>
+          </p:cNvPr>
+          <p:cNvSpPr txBox="1">
+            <a:spLocks/>
+          </p:cNvSpPr>
+          <p:nvPr/>
+        </p:nvSpPr>
+        <p:spPr>
+          <a:xfrm>
+            <a:off x="140550" y="33090"/>
+            <a:ext cx="6598766" cy="512916"/>
+          </a:xfrm>
+          <a:prstGeom prst="rect">
+            <a:avLst/>
+          </a:prstGeom>
+        </p:spPr>
+        <p:txBody>
+          <a:bodyPr vert="horz" lIns="91440" tIns="45720" rIns="91440" bIns="45720" rtlCol="0" anchor="b">
+            <a:noAutofit/>
+          </a:bodyPr>
+          <a:lstStyle>
+            <a:lvl1pPr algn="l" defTabSz="914400" rtl="0" eaLnBrk="1" latinLnBrk="0" hangingPunct="1">
+              <a:lnSpc>
+                <a:spcPct val="85000"/>
+              </a:lnSpc>
+              <a:spcBef>
+                <a:spcPct val="0"/>
+              </a:spcBef>
+              <a:buNone/>
+              <a:defRPr sz="4800" kern="1200" spc="-50" baseline="0">
+                <a:solidFill>
+                  <a:schemeClr val="tx1">
+                    <a:lumMod val="75000"/>
+                    <a:lumOff val="25000"/>
+                  </a:schemeClr>
+                </a:solidFill>
+                <a:latin typeface="+mj-lt"/>
+                <a:ea typeface="+mj-ea"/>
+                <a:cs typeface="+mj-cs"/>
+              </a:defRPr>
+            </a:lvl1pPr>
+          </a:lstStyle>
+          <a:p>
+            <a:r>
+              <a:rPr lang="en-GB" sz="2800" u="sng" dirty="0"/>
+              <a:t>Fit Result</a:t>
+            </a:r>
+          </a:p>
+        </p:txBody>
+      </p:sp>
+      <p:pic>
+        <p:nvPicPr>
+          <p:cNvPr id="4" name="Picture 3">
+            <a:extLst>
+              <a:ext uri="{FF2B5EF4-FFF2-40B4-BE49-F238E27FC236}">
+                <a16:creationId xmlns:a16="http://schemas.microsoft.com/office/drawing/2014/main" id="{B9521DB9-E6A3-B34B-85EC-2FFA6279147F}"/>
+              </a:ext>
+            </a:extLst>
+          </p:cNvPr>
+          <p:cNvPicPr>
+            <a:picLocks noChangeAspect="1"/>
+          </p:cNvPicPr>
+          <p:nvPr/>
+        </p:nvPicPr>
+        <p:blipFill>
+          <a:blip r:embed="rId2"/>
+          <a:stretch>
+            <a:fillRect/>
+          </a:stretch>
+        </p:blipFill>
+        <p:spPr>
+          <a:xfrm rot="5400000">
+            <a:off x="654599" y="0"/>
+            <a:ext cx="5829905" cy="6858000"/>
+          </a:xfrm>
+          <a:prstGeom prst="rect">
+            <a:avLst/>
+          </a:prstGeom>
+        </p:spPr>
+      </p:pic>
+      <p:sp>
+        <p:nvSpPr>
+          <p:cNvPr id="5" name="Rectangle 4">
+            <a:extLst>
+              <a:ext uri="{FF2B5EF4-FFF2-40B4-BE49-F238E27FC236}">
+                <a16:creationId xmlns:a16="http://schemas.microsoft.com/office/drawing/2014/main" id="{36074B0C-8887-894A-BDCA-ED7DA47F5A6D}"/>
+              </a:ext>
+            </a:extLst>
+          </p:cNvPr>
+          <p:cNvSpPr/>
+          <p:nvPr/>
+        </p:nvSpPr>
+        <p:spPr>
+          <a:xfrm>
+            <a:off x="6739316" y="1294001"/>
+            <a:ext cx="4822804" cy="3046988"/>
+          </a:xfrm>
+          <a:prstGeom prst="rect">
+            <a:avLst/>
+          </a:prstGeom>
+          <a:ln w="12700">
+            <a:solidFill>
+              <a:schemeClr val="tx1">
+                <a:lumMod val="95000"/>
+                <a:lumOff val="5000"/>
+              </a:schemeClr>
+            </a:solidFill>
+          </a:ln>
+        </p:spPr>
+        <p:txBody>
+          <a:bodyPr wrap="square">
+            <a:spAutoFit/>
+          </a:bodyPr>
+          <a:lstStyle/>
+          <a:p>
+            <a:r>
+              <a:rPr lang="en-US" sz="1200" dirty="0">
+                <a:solidFill>
+                  <a:srgbClr val="000000"/>
+                </a:solidFill>
+                <a:latin typeface="Menlo" panose="020B0609030804020204" pitchFamily="49" charset="0"/>
+              </a:rPr>
+              <a:t>    Floating Parameter    </a:t>
+            </a:r>
+            <a:r>
+              <a:rPr lang="en-US" sz="1200" dirty="0" err="1">
+                <a:solidFill>
+                  <a:srgbClr val="000000"/>
+                </a:solidFill>
+                <a:latin typeface="Menlo" panose="020B0609030804020204" pitchFamily="49" charset="0"/>
+              </a:rPr>
+              <a:t>FinalValue</a:t>
+            </a:r>
+            <a:r>
+              <a:rPr lang="en-US" sz="1200" dirty="0">
+                <a:solidFill>
+                  <a:srgbClr val="000000"/>
+                </a:solidFill>
+                <a:latin typeface="Menlo" panose="020B0609030804020204" pitchFamily="49" charset="0"/>
+              </a:rPr>
+              <a:t> +/-  Error   </a:t>
+            </a:r>
+          </a:p>
+          <a:p>
+            <a:r>
+              <a:rPr lang="en-US" sz="1200" dirty="0">
+                <a:solidFill>
+                  <a:srgbClr val="000000"/>
+                </a:solidFill>
+                <a:latin typeface="Menlo" panose="020B0609030804020204" pitchFamily="49" charset="0"/>
+              </a:rPr>
+              <a:t>  --------------------  --------------------------</a:t>
+            </a:r>
+          </a:p>
+          <a:p>
+            <a:r>
+              <a:rPr lang="en-US" sz="1200" dirty="0">
+                <a:solidFill>
+                  <a:srgbClr val="000000"/>
+                </a:solidFill>
+                <a:latin typeface="Menlo" panose="020B0609030804020204" pitchFamily="49" charset="0"/>
+              </a:rPr>
+              <a:t>            </a:t>
+            </a:r>
+            <a:r>
+              <a:rPr lang="en-US" sz="1200" dirty="0" err="1">
+                <a:solidFill>
+                  <a:srgbClr val="000000"/>
+                </a:solidFill>
+                <a:latin typeface="Menlo" panose="020B0609030804020204" pitchFamily="49" charset="0"/>
+              </a:rPr>
+              <a:t>kMassResol</a:t>
+            </a:r>
+            <a:r>
+              <a:rPr lang="en-US" sz="1200" dirty="0">
+                <a:solidFill>
+                  <a:srgbClr val="000000"/>
+                </a:solidFill>
+                <a:latin typeface="Menlo" panose="020B0609030804020204" pitchFamily="49" charset="0"/>
+              </a:rPr>
+              <a:t>    1.0522e+00 +/-  3.99e-02</a:t>
+            </a:r>
+          </a:p>
+          <a:p>
+            <a:r>
+              <a:rPr lang="en-US" sz="1200" dirty="0">
+                <a:solidFill>
+                  <a:srgbClr val="000000"/>
+                </a:solidFill>
+                <a:latin typeface="Menlo" panose="020B0609030804020204" pitchFamily="49" charset="0"/>
+              </a:rPr>
+              <a:t>            </a:t>
+            </a:r>
+            <a:r>
+              <a:rPr lang="en-US" sz="1200" dirty="0" err="1">
+                <a:solidFill>
+                  <a:srgbClr val="000000"/>
+                </a:solidFill>
+                <a:latin typeface="Menlo" panose="020B0609030804020204" pitchFamily="49" charset="0"/>
+              </a:rPr>
+              <a:t>kMassScale</a:t>
+            </a:r>
+            <a:r>
+              <a:rPr lang="en-US" sz="1200" dirty="0">
+                <a:solidFill>
+                  <a:srgbClr val="000000"/>
+                </a:solidFill>
+                <a:latin typeface="Menlo" panose="020B0609030804020204" pitchFamily="49" charset="0"/>
+              </a:rPr>
+              <a:t>    9.9932e-01 +/-  2.13e-03</a:t>
+            </a:r>
+          </a:p>
+          <a:p>
+            <a:r>
+              <a:rPr lang="en-US" sz="1200" dirty="0">
+                <a:solidFill>
+                  <a:srgbClr val="000000"/>
+                </a:solidFill>
+                <a:latin typeface="Menlo" panose="020B0609030804020204" pitchFamily="49" charset="0"/>
+              </a:rPr>
+              <a:t>               kQCD_2b   -2.2221e-03 +/-  8.40e-04</a:t>
+            </a:r>
+          </a:p>
+          <a:p>
+            <a:r>
+              <a:rPr lang="en-US" sz="1200" dirty="0">
+                <a:solidFill>
+                  <a:srgbClr val="000000"/>
+                </a:solidFill>
+                <a:latin typeface="Menlo" panose="020B0609030804020204" pitchFamily="49" charset="0"/>
+              </a:rPr>
+              <a:t>            nFitBkg_2b    2.6836e+03 +/-  5.94e+02</a:t>
+            </a:r>
+          </a:p>
+          <a:p>
+            <a:r>
+              <a:rPr lang="en-US" sz="1200" dirty="0">
+                <a:solidFill>
+                  <a:srgbClr val="000000"/>
+                </a:solidFill>
+                <a:latin typeface="Menlo" panose="020B0609030804020204" pitchFamily="49" charset="0"/>
+              </a:rPr>
+              <a:t>            nFitQCD_2b    2.2612e+04 +/-  6.91e+02</a:t>
+            </a:r>
+          </a:p>
+          <a:p>
+            <a:r>
+              <a:rPr lang="en-US" sz="1200" dirty="0">
+                <a:solidFill>
+                  <a:srgbClr val="000000"/>
+                </a:solidFill>
+                <a:latin typeface="Menlo" panose="020B0609030804020204" pitchFamily="49" charset="0"/>
+              </a:rPr>
+              <a:t>             nFitSig2b    1.2392e+04 +/-  7.16e+02</a:t>
+            </a:r>
+          </a:p>
+          <a:p>
+            <a:r>
+              <a:rPr lang="en-US" sz="1200" dirty="0">
+                <a:solidFill>
+                  <a:srgbClr val="000000"/>
+                </a:solidFill>
+                <a:latin typeface="Menlo" panose="020B0609030804020204" pitchFamily="49" charset="0"/>
+              </a:rPr>
+              <a:t>                qcd_b0    1.2781e+00 +/-  1.59e+00</a:t>
+            </a:r>
+          </a:p>
+          <a:p>
+            <a:r>
+              <a:rPr lang="en-US" sz="1200" dirty="0">
+                <a:solidFill>
+                  <a:srgbClr val="000000"/>
+                </a:solidFill>
+                <a:latin typeface="Menlo" panose="020B0609030804020204" pitchFamily="49" charset="0"/>
+              </a:rPr>
+              <a:t>                qcd_b1    3.1374e-02 +/-  1.60e-01</a:t>
+            </a:r>
+          </a:p>
+          <a:p>
+            <a:r>
+              <a:rPr lang="en-US" sz="1200" dirty="0">
+                <a:solidFill>
+                  <a:srgbClr val="000000"/>
+                </a:solidFill>
+                <a:latin typeface="Menlo" panose="020B0609030804020204" pitchFamily="49" charset="0"/>
+              </a:rPr>
+              <a:t>                qcd_b2    5.8115e-01 +/-  7.09e-01</a:t>
+            </a:r>
+          </a:p>
+          <a:p>
+            <a:r>
+              <a:rPr lang="en-US" sz="1200" dirty="0">
+                <a:solidFill>
+                  <a:srgbClr val="000000"/>
+                </a:solidFill>
+                <a:latin typeface="Menlo" panose="020B0609030804020204" pitchFamily="49" charset="0"/>
+              </a:rPr>
+              <a:t>                qcd_b3    4.9877e-05 +/-  1.32e+00</a:t>
+            </a:r>
+          </a:p>
+          <a:p>
+            <a:r>
+              <a:rPr lang="en-US" sz="1200" dirty="0">
+                <a:solidFill>
+                  <a:srgbClr val="000000"/>
+                </a:solidFill>
+                <a:latin typeface="Menlo" panose="020B0609030804020204" pitchFamily="49" charset="0"/>
+              </a:rPr>
+              <a:t>                qcd_b4    3.2530e-01 +/-  4.61e-01</a:t>
+            </a:r>
+          </a:p>
+          <a:p>
+            <a:r>
+              <a:rPr lang="en-US" sz="1200" dirty="0">
+                <a:solidFill>
+                  <a:srgbClr val="000000"/>
+                </a:solidFill>
+                <a:latin typeface="Menlo" panose="020B0609030804020204" pitchFamily="49" charset="0"/>
+              </a:rPr>
+              <a:t>                qcd_f1    1.8593e-01 +/-  1.13e-01</a:t>
+            </a:r>
+          </a:p>
+          <a:p>
+            <a:r>
+              <a:rPr lang="en-US" sz="1200" dirty="0">
+                <a:solidFill>
+                  <a:srgbClr val="000000"/>
+                </a:solidFill>
+                <a:latin typeface="Menlo" panose="020B0609030804020204" pitchFamily="49" charset="0"/>
+              </a:rPr>
+              <a:t>              </a:t>
+            </a:r>
+            <a:r>
+              <a:rPr lang="en-US" sz="1200" dirty="0" err="1">
+                <a:solidFill>
+                  <a:srgbClr val="000000"/>
+                </a:solidFill>
+                <a:latin typeface="Menlo" panose="020B0609030804020204" pitchFamily="49" charset="0"/>
+              </a:rPr>
+              <a:t>qcd_mean</a:t>
+            </a:r>
+            <a:r>
+              <a:rPr lang="en-US" sz="1200" dirty="0">
+                <a:solidFill>
+                  <a:srgbClr val="000000"/>
+                </a:solidFill>
+                <a:latin typeface="Menlo" panose="020B0609030804020204" pitchFamily="49" charset="0"/>
+              </a:rPr>
+              <a:t>    1.5516e+02 +/-  4.94e+00</a:t>
+            </a:r>
+          </a:p>
+          <a:p>
+            <a:r>
+              <a:rPr lang="en-US" sz="1200" dirty="0">
+                <a:solidFill>
+                  <a:srgbClr val="000000"/>
+                </a:solidFill>
+                <a:latin typeface="Menlo" panose="020B0609030804020204" pitchFamily="49" charset="0"/>
+              </a:rPr>
+              <a:t>             </a:t>
+            </a:r>
+            <a:r>
+              <a:rPr lang="en-US" sz="1200" dirty="0" err="1">
+                <a:solidFill>
+                  <a:srgbClr val="000000"/>
+                </a:solidFill>
+                <a:latin typeface="Menlo" panose="020B0609030804020204" pitchFamily="49" charset="0"/>
+              </a:rPr>
+              <a:t>qcd_sigma</a:t>
+            </a:r>
+            <a:r>
+              <a:rPr lang="en-US" sz="1200" dirty="0">
+                <a:solidFill>
+                  <a:srgbClr val="000000"/>
+                </a:solidFill>
+                <a:latin typeface="Menlo" panose="020B0609030804020204" pitchFamily="49" charset="0"/>
+              </a:rPr>
+              <a:t>    4.7968e+01 +/-  2.82e+00</a:t>
+            </a:r>
+          </a:p>
+        </p:txBody>
+      </p:sp>
+    </p:spTree>
+    <p:extLst>
+      <p:ext uri="{BB962C8B-B14F-4D97-AF65-F5344CB8AC3E}">
+        <p14:creationId xmlns:p14="http://schemas.microsoft.com/office/powerpoint/2010/main" val="1888085286"/>
+      </p:ext>
+    </p:extLst>
+  </p:cSld>
+  <p:clrMapOvr>
+    <a:masterClrMapping/>
+  </p:clrMapOvr>
+</p:sld>
+</file>
+
 <file path=ppt/slides/slide2.xml><?xml version="1.0" encoding="utf-8"?>
 <p:sld xmlns:a="http://schemas.openxmlformats.org/drawingml/2006/main" xmlns:r="http://schemas.openxmlformats.org/officeDocument/2006/relationships" xmlns:p="http://schemas.openxmlformats.org/presentationml/2006/main">
   <p:cSld>
@@ -7664,8 +8666,8 @@
           </a:p>
         </p:txBody>
       </p:sp>
-      <mc:AlternateContent xmlns:mc="http://schemas.openxmlformats.org/markup-compatibility/2006">
-        <mc:Choice xmlns:a14="http://schemas.microsoft.com/office/drawing/2010/main" Requires="a14">
+      <mc:AlternateContent xmlns:mc="http://schemas.openxmlformats.org/markup-compatibility/2006" xmlns:a14="http://schemas.microsoft.com/office/drawing/2010/main">
+        <mc:Choice Requires="a14">
           <p:sp>
             <p:nvSpPr>
               <p:cNvPr id="6" name="TextBox 5">
@@ -8379,7 +9381,7 @@
             </p:txBody>
           </p:sp>
         </mc:Choice>
-        <mc:Fallback>
+        <mc:Fallback xmlns="">
           <p:sp>
             <p:nvSpPr>
               <p:cNvPr id="6" name="TextBox 5">
@@ -8477,7 +9479,7 @@
           <a:p>
             <a:fld id="{A495A033-A54B-4F41-92C4-F7053274BB0C}" type="datetime1">
               <a:rPr lang="en-US" smtClean="0"/>
-              <a:t>1/9/20</a:t>
+              <a:t>1/10/20</a:t>
             </a:fld>
             <a:endParaRPr lang="en-US" dirty="0"/>
           </a:p>
@@ -8820,7 +9822,7 @@
           <a:p>
             <a:fld id="{863596AC-079A-914A-A4AA-F10BF720D55E}" type="datetime1">
               <a:rPr lang="en-US" smtClean="0"/>
-              <a:t>1/9/20</a:t>
+              <a:t>1/10/20</a:t>
             </a:fld>
             <a:endParaRPr lang="en-US" dirty="0"/>
           </a:p>
@@ -9041,6 +10043,96 @@
           </a:fontRef>
         </p:style>
       </p:cxnSp>
+      <p:pic>
+        <p:nvPicPr>
+          <p:cNvPr id="6" name="Picture 5">
+            <a:extLst>
+              <a:ext uri="{FF2B5EF4-FFF2-40B4-BE49-F238E27FC236}">
+                <a16:creationId xmlns:a16="http://schemas.microsoft.com/office/drawing/2014/main" id="{5C6317AD-CDBB-1342-868A-918623CEB23A}"/>
+              </a:ext>
+            </a:extLst>
+          </p:cNvPr>
+          <p:cNvPicPr>
+            <a:picLocks noChangeAspect="1"/>
+          </p:cNvPicPr>
+          <p:nvPr/>
+        </p:nvPicPr>
+        <p:blipFill>
+          <a:blip r:embed="rId2"/>
+          <a:stretch>
+            <a:fillRect/>
+          </a:stretch>
+        </p:blipFill>
+        <p:spPr>
+          <a:xfrm rot="5400000">
+            <a:off x="394845" y="1256387"/>
+            <a:ext cx="3143377" cy="3816477"/>
+          </a:xfrm>
+          <a:prstGeom prst="rect">
+            <a:avLst/>
+          </a:prstGeom>
+        </p:spPr>
+      </p:pic>
+      <p:pic>
+        <p:nvPicPr>
+          <p:cNvPr id="8" name="Picture 7">
+            <a:extLst>
+              <a:ext uri="{FF2B5EF4-FFF2-40B4-BE49-F238E27FC236}">
+                <a16:creationId xmlns:a16="http://schemas.microsoft.com/office/drawing/2014/main" id="{B3BFF95A-EDCF-A842-B1D4-53763B539DF2}"/>
+              </a:ext>
+            </a:extLst>
+          </p:cNvPr>
+          <p:cNvPicPr>
+            <a:picLocks noChangeAspect="1"/>
+          </p:cNvPicPr>
+          <p:nvPr/>
+        </p:nvPicPr>
+        <p:blipFill>
+          <a:blip r:embed="rId3"/>
+          <a:stretch>
+            <a:fillRect/>
+          </a:stretch>
+        </p:blipFill>
+        <p:spPr>
+          <a:xfrm rot="5400000">
+            <a:off x="4469069" y="1314257"/>
+            <a:ext cx="3143377" cy="3816477"/>
+          </a:xfrm>
+          <a:prstGeom prst="rect">
+            <a:avLst/>
+          </a:prstGeom>
+        </p:spPr>
+      </p:pic>
+      <p:pic>
+        <p:nvPicPr>
+          <p:cNvPr id="10" name="Picture 9">
+            <a:extLst>
+              <a:ext uri="{FF2B5EF4-FFF2-40B4-BE49-F238E27FC236}">
+                <a16:creationId xmlns:a16="http://schemas.microsoft.com/office/drawing/2014/main" id="{C23045B4-6433-5A45-9C81-543DB7DEE906}"/>
+              </a:ext>
+            </a:extLst>
+          </p:cNvPr>
+          <p:cNvPicPr>
+            <a:picLocks noChangeAspect="1"/>
+          </p:cNvPicPr>
+          <p:nvPr/>
+        </p:nvPicPr>
+        <p:blipFill>
+          <a:blip r:embed="rId4"/>
+          <a:stretch>
+            <a:fillRect/>
+          </a:stretch>
+        </p:blipFill>
+        <p:spPr>
+          <a:xfrm rot="5400000">
+            <a:off x="8571108" y="1314257"/>
+            <a:ext cx="3143377" cy="3816477"/>
+          </a:xfrm>
+          <a:prstGeom prst="rect">
+            <a:avLst/>
+          </a:prstGeom>
+        </p:spPr>
+      </p:pic>
     </p:spTree>
     <p:extLst>
       <p:ext uri="{BB962C8B-B14F-4D97-AF65-F5344CB8AC3E}">
@@ -9107,69 +10199,10 @@
       </p:sp>
       <p:sp>
         <p:nvSpPr>
-          <p:cNvPr id="2" name="Slide Number Placeholder 1">
+          <p:cNvPr id="12" name="Title 4">
             <a:extLst>
               <a:ext uri="{FF2B5EF4-FFF2-40B4-BE49-F238E27FC236}">
-                <a16:creationId xmlns:a16="http://schemas.microsoft.com/office/drawing/2014/main" id="{2BDF07F2-8A31-6F41-9C54-4431125619C4}"/>
-              </a:ext>
-            </a:extLst>
-          </p:cNvPr>
-          <p:cNvSpPr>
-            <a:spLocks noGrp="1"/>
-          </p:cNvSpPr>
-          <p:nvPr>
-            <p:ph type="sldNum" sz="quarter" idx="12"/>
-          </p:nvPr>
-        </p:nvSpPr>
-        <p:spPr/>
-        <p:txBody>
-          <a:bodyPr/>
-          <a:lstStyle/>
-          <a:p>
-            <a:fld id="{4FAB73BC-B049-4115-A692-8D63A059BFB8}" type="slidenum">
-              <a:rPr lang="en-US" smtClean="0"/>
-              <a:pPr/>
-              <a:t>4</a:t>
-            </a:fld>
-            <a:endParaRPr lang="en-US" dirty="0"/>
-          </a:p>
-        </p:txBody>
-      </p:sp>
-      <p:sp>
-        <p:nvSpPr>
-          <p:cNvPr id="13" name="Date Placeholder 12">
-            <a:extLst>
-              <a:ext uri="{FF2B5EF4-FFF2-40B4-BE49-F238E27FC236}">
-                <a16:creationId xmlns:a16="http://schemas.microsoft.com/office/drawing/2014/main" id="{26FBEBE3-A9F2-CB4A-A555-BD1769498DB6}"/>
-              </a:ext>
-            </a:extLst>
-          </p:cNvPr>
-          <p:cNvSpPr>
-            <a:spLocks noGrp="1"/>
-          </p:cNvSpPr>
-          <p:nvPr>
-            <p:ph type="dt" sz="half" idx="10"/>
-          </p:nvPr>
-        </p:nvSpPr>
-        <p:spPr/>
-        <p:txBody>
-          <a:bodyPr/>
-          <a:lstStyle/>
-          <a:p>
-            <a:fld id="{863596AC-079A-914A-A4AA-F10BF720D55E}" type="datetime1">
-              <a:rPr lang="en-US" smtClean="0"/>
-              <a:t>1/9/20</a:t>
-            </a:fld>
-            <a:endParaRPr lang="en-US" dirty="0"/>
-          </a:p>
-        </p:txBody>
-      </p:sp>
-      <p:sp>
-        <p:nvSpPr>
-          <p:cNvPr id="32" name="Title 4">
-            <a:extLst>
-              <a:ext uri="{FF2B5EF4-FFF2-40B4-BE49-F238E27FC236}">
-                <a16:creationId xmlns:a16="http://schemas.microsoft.com/office/drawing/2014/main" id="{F99A7C50-63DB-A04F-B28D-F01966DF13E9}"/>
+                <a16:creationId xmlns:a16="http://schemas.microsoft.com/office/drawing/2014/main" id="{CCE472BB-DFA4-B349-8F30-2673C528FF7C}"/>
               </a:ext>
             </a:extLst>
           </p:cNvPr>
@@ -9180,7 +10213,7 @@
         </p:nvSpPr>
         <p:spPr>
           <a:xfrm>
-            <a:off x="270168" y="118951"/>
+            <a:off x="270168" y="174788"/>
             <a:ext cx="6598766" cy="512916"/>
           </a:xfrm>
           <a:prstGeom prst="rect">
@@ -9216,17 +10249,454 @@
           <a:p>
             <a:r>
               <a:rPr lang="en-GB" sz="2800" u="sng" dirty="0"/>
-              <a:t>Efficiency And Acceptance for all years</a:t>
-            </a:r>
-          </a:p>
-        </p:txBody>
-      </p:sp>
+              <a:t>TT contamination with Loose b-tagging WP</a:t>
+            </a:r>
+          </a:p>
+        </p:txBody>
+      </p:sp>
+      <p:sp>
+        <p:nvSpPr>
+          <p:cNvPr id="24" name="TextBox 23">
+            <a:extLst>
+              <a:ext uri="{FF2B5EF4-FFF2-40B4-BE49-F238E27FC236}">
+                <a16:creationId xmlns:a16="http://schemas.microsoft.com/office/drawing/2014/main" id="{6467259F-D55B-834E-9B9E-F410C9440440}"/>
+              </a:ext>
+            </a:extLst>
+          </p:cNvPr>
+          <p:cNvSpPr txBox="1"/>
+          <p:nvPr/>
+        </p:nvSpPr>
+        <p:spPr>
+          <a:xfrm>
+            <a:off x="1131570" y="1136599"/>
+            <a:ext cx="2057400" cy="369332"/>
+          </a:xfrm>
+          <a:prstGeom prst="rect">
+            <a:avLst/>
+          </a:prstGeom>
+          <a:noFill/>
+        </p:spPr>
+        <p:txBody>
+          <a:bodyPr wrap="square" rtlCol="0">
+            <a:spAutoFit/>
+          </a:bodyPr>
+          <a:lstStyle/>
+          <a:p>
+            <a:pPr algn="ctr"/>
+            <a:r>
+              <a:rPr lang="en-US" dirty="0">
+                <a:solidFill>
+                  <a:srgbClr val="00B0F0"/>
+                </a:solidFill>
+              </a:rPr>
+              <a:t>2016</a:t>
+            </a:r>
+          </a:p>
+        </p:txBody>
+      </p:sp>
+      <p:sp>
+        <p:nvSpPr>
+          <p:cNvPr id="25" name="TextBox 24">
+            <a:extLst>
+              <a:ext uri="{FF2B5EF4-FFF2-40B4-BE49-F238E27FC236}">
+                <a16:creationId xmlns:a16="http://schemas.microsoft.com/office/drawing/2014/main" id="{DE28F087-3562-8B49-AF03-25095E9C5C74}"/>
+              </a:ext>
+            </a:extLst>
+          </p:cNvPr>
+          <p:cNvSpPr txBox="1"/>
+          <p:nvPr/>
+        </p:nvSpPr>
+        <p:spPr>
+          <a:xfrm>
+            <a:off x="5067300" y="1136599"/>
+            <a:ext cx="2057400" cy="369332"/>
+          </a:xfrm>
+          <a:prstGeom prst="rect">
+            <a:avLst/>
+          </a:prstGeom>
+          <a:noFill/>
+        </p:spPr>
+        <p:txBody>
+          <a:bodyPr wrap="square" rtlCol="0">
+            <a:spAutoFit/>
+          </a:bodyPr>
+          <a:lstStyle/>
+          <a:p>
+            <a:pPr algn="ctr"/>
+            <a:r>
+              <a:rPr lang="en-US" dirty="0">
+                <a:solidFill>
+                  <a:srgbClr val="FF0000"/>
+                </a:solidFill>
+              </a:rPr>
+              <a:t>2017</a:t>
+            </a:r>
+          </a:p>
+        </p:txBody>
+      </p:sp>
+      <p:sp>
+        <p:nvSpPr>
+          <p:cNvPr id="26" name="TextBox 25">
+            <a:extLst>
+              <a:ext uri="{FF2B5EF4-FFF2-40B4-BE49-F238E27FC236}">
+                <a16:creationId xmlns:a16="http://schemas.microsoft.com/office/drawing/2014/main" id="{D81097FE-8411-3A41-813A-135B44833012}"/>
+              </a:ext>
+            </a:extLst>
+          </p:cNvPr>
+          <p:cNvSpPr txBox="1"/>
+          <p:nvPr/>
+        </p:nvSpPr>
+        <p:spPr>
+          <a:xfrm>
+            <a:off x="8871758" y="1134606"/>
+            <a:ext cx="2057400" cy="369332"/>
+          </a:xfrm>
+          <a:prstGeom prst="rect">
+            <a:avLst/>
+          </a:prstGeom>
+          <a:noFill/>
+        </p:spPr>
+        <p:txBody>
+          <a:bodyPr wrap="square" rtlCol="0">
+            <a:spAutoFit/>
+          </a:bodyPr>
+          <a:lstStyle/>
+          <a:p>
+            <a:pPr algn="ctr"/>
+            <a:r>
+              <a:rPr lang="en-US" dirty="0">
+                <a:solidFill>
+                  <a:srgbClr val="00B050"/>
+                </a:solidFill>
+              </a:rPr>
+              <a:t>2018</a:t>
+            </a:r>
+          </a:p>
+        </p:txBody>
+      </p:sp>
+      <p:sp>
+        <p:nvSpPr>
+          <p:cNvPr id="2" name="Slide Number Placeholder 1">
+            <a:extLst>
+              <a:ext uri="{FF2B5EF4-FFF2-40B4-BE49-F238E27FC236}">
+                <a16:creationId xmlns:a16="http://schemas.microsoft.com/office/drawing/2014/main" id="{2BDF07F2-8A31-6F41-9C54-4431125619C4}"/>
+              </a:ext>
+            </a:extLst>
+          </p:cNvPr>
+          <p:cNvSpPr>
+            <a:spLocks noGrp="1"/>
+          </p:cNvSpPr>
+          <p:nvPr>
+            <p:ph type="sldNum" sz="quarter" idx="12"/>
+          </p:nvPr>
+        </p:nvSpPr>
+        <p:spPr/>
+        <p:txBody>
+          <a:bodyPr/>
+          <a:lstStyle/>
+          <a:p>
+            <a:fld id="{4FAB73BC-B049-4115-A692-8D63A059BFB8}" type="slidenum">
+              <a:rPr lang="en-US" smtClean="0"/>
+              <a:pPr/>
+              <a:t>4</a:t>
+            </a:fld>
+            <a:endParaRPr lang="en-US" dirty="0"/>
+          </a:p>
+        </p:txBody>
+      </p:sp>
+      <p:cxnSp>
+        <p:nvCxnSpPr>
+          <p:cNvPr id="31" name="Straight Connector 30">
+            <a:extLst>
+              <a:ext uri="{FF2B5EF4-FFF2-40B4-BE49-F238E27FC236}">
+                <a16:creationId xmlns:a16="http://schemas.microsoft.com/office/drawing/2014/main" id="{39FD2651-9624-6645-A8FB-B6EDFBEACC24}"/>
+              </a:ext>
+            </a:extLst>
+          </p:cNvPr>
+          <p:cNvCxnSpPr>
+            <a:cxnSpLocks/>
+          </p:cNvCxnSpPr>
+          <p:nvPr/>
+        </p:nvCxnSpPr>
+        <p:spPr>
+          <a:xfrm>
+            <a:off x="30480" y="72102"/>
+            <a:ext cx="0" cy="6300788"/>
+          </a:xfrm>
+          <a:prstGeom prst="line">
+            <a:avLst/>
+          </a:prstGeom>
+          <a:ln w="25400">
+            <a:solidFill>
+              <a:srgbClr val="00B0F0"/>
+            </a:solidFill>
+          </a:ln>
+        </p:spPr>
+        <p:style>
+          <a:lnRef idx="1">
+            <a:schemeClr val="accent1"/>
+          </a:lnRef>
+          <a:fillRef idx="0">
+            <a:schemeClr val="accent1"/>
+          </a:fillRef>
+          <a:effectRef idx="0">
+            <a:schemeClr val="accent1"/>
+          </a:effectRef>
+          <a:fontRef idx="minor">
+            <a:schemeClr val="tx1"/>
+          </a:fontRef>
+        </p:style>
+      </p:cxnSp>
+      <p:sp>
+        <p:nvSpPr>
+          <p:cNvPr id="13" name="Date Placeholder 12">
+            <a:extLst>
+              <a:ext uri="{FF2B5EF4-FFF2-40B4-BE49-F238E27FC236}">
+                <a16:creationId xmlns:a16="http://schemas.microsoft.com/office/drawing/2014/main" id="{26FBEBE3-A9F2-CB4A-A555-BD1769498DB6}"/>
+              </a:ext>
+            </a:extLst>
+          </p:cNvPr>
+          <p:cNvSpPr>
+            <a:spLocks noGrp="1"/>
+          </p:cNvSpPr>
+          <p:nvPr>
+            <p:ph type="dt" sz="half" idx="10"/>
+          </p:nvPr>
+        </p:nvSpPr>
+        <p:spPr/>
+        <p:txBody>
+          <a:bodyPr/>
+          <a:lstStyle/>
+          <a:p>
+            <a:fld id="{863596AC-079A-914A-A4AA-F10BF720D55E}" type="datetime1">
+              <a:rPr lang="en-US" smtClean="0"/>
+              <a:t>1/10/20</a:t>
+            </a:fld>
+            <a:endParaRPr lang="en-US" dirty="0"/>
+          </a:p>
+        </p:txBody>
+      </p:sp>
+      <p:cxnSp>
+        <p:nvCxnSpPr>
+          <p:cNvPr id="27" name="Straight Connector 26">
+            <a:extLst>
+              <a:ext uri="{FF2B5EF4-FFF2-40B4-BE49-F238E27FC236}">
+                <a16:creationId xmlns:a16="http://schemas.microsoft.com/office/drawing/2014/main" id="{486E758F-A6A6-A949-AEA6-3614F17201C4}"/>
+              </a:ext>
+            </a:extLst>
+          </p:cNvPr>
+          <p:cNvCxnSpPr>
+            <a:cxnSpLocks/>
+          </p:cNvCxnSpPr>
+          <p:nvPr/>
+        </p:nvCxnSpPr>
+        <p:spPr>
+          <a:xfrm>
+            <a:off x="4002403" y="0"/>
+            <a:ext cx="0" cy="5049078"/>
+          </a:xfrm>
+          <a:prstGeom prst="line">
+            <a:avLst/>
+          </a:prstGeom>
+          <a:ln w="25400">
+            <a:solidFill>
+              <a:srgbClr val="FF0000"/>
+            </a:solidFill>
+          </a:ln>
+        </p:spPr>
+        <p:style>
+          <a:lnRef idx="1">
+            <a:schemeClr val="accent1"/>
+          </a:lnRef>
+          <a:fillRef idx="0">
+            <a:schemeClr val="accent1"/>
+          </a:fillRef>
+          <a:effectRef idx="0">
+            <a:schemeClr val="accent1"/>
+          </a:effectRef>
+          <a:fontRef idx="minor">
+            <a:schemeClr val="tx1"/>
+          </a:fontRef>
+        </p:style>
+      </p:cxnSp>
+      <p:cxnSp>
+        <p:nvCxnSpPr>
+          <p:cNvPr id="28" name="Straight Connector 27">
+            <a:extLst>
+              <a:ext uri="{FF2B5EF4-FFF2-40B4-BE49-F238E27FC236}">
+                <a16:creationId xmlns:a16="http://schemas.microsoft.com/office/drawing/2014/main" id="{58BF1060-8244-AA47-BC85-432273E489FD}"/>
+              </a:ext>
+            </a:extLst>
+          </p:cNvPr>
+          <p:cNvCxnSpPr>
+            <a:cxnSpLocks/>
+          </p:cNvCxnSpPr>
+          <p:nvPr/>
+        </p:nvCxnSpPr>
+        <p:spPr>
+          <a:xfrm flipH="1">
+            <a:off x="7974333" y="0"/>
+            <a:ext cx="1" cy="5049078"/>
+          </a:xfrm>
+          <a:prstGeom prst="line">
+            <a:avLst/>
+          </a:prstGeom>
+          <a:ln w="25400">
+            <a:solidFill>
+              <a:srgbClr val="FF0000"/>
+            </a:solidFill>
+          </a:ln>
+        </p:spPr>
+        <p:style>
+          <a:lnRef idx="1">
+            <a:schemeClr val="accent1"/>
+          </a:lnRef>
+          <a:fillRef idx="0">
+            <a:schemeClr val="accent1"/>
+          </a:fillRef>
+          <a:effectRef idx="0">
+            <a:schemeClr val="accent1"/>
+          </a:effectRef>
+          <a:fontRef idx="minor">
+            <a:schemeClr val="tx1"/>
+          </a:fontRef>
+        </p:style>
+      </p:cxnSp>
+      <p:cxnSp>
+        <p:nvCxnSpPr>
+          <p:cNvPr id="29" name="Straight Connector 28">
+            <a:extLst>
+              <a:ext uri="{FF2B5EF4-FFF2-40B4-BE49-F238E27FC236}">
+                <a16:creationId xmlns:a16="http://schemas.microsoft.com/office/drawing/2014/main" id="{1E569388-2E39-4547-A8E9-ED16C21F2D62}"/>
+              </a:ext>
+            </a:extLst>
+          </p:cNvPr>
+          <p:cNvCxnSpPr>
+            <a:cxnSpLocks/>
+          </p:cNvCxnSpPr>
+          <p:nvPr/>
+        </p:nvCxnSpPr>
+        <p:spPr>
+          <a:xfrm>
+            <a:off x="8055292" y="0"/>
+            <a:ext cx="0" cy="5049078"/>
+          </a:xfrm>
+          <a:prstGeom prst="line">
+            <a:avLst/>
+          </a:prstGeom>
+          <a:ln w="25400">
+            <a:solidFill>
+              <a:srgbClr val="00B050"/>
+            </a:solidFill>
+          </a:ln>
+        </p:spPr>
+        <p:style>
+          <a:lnRef idx="1">
+            <a:schemeClr val="accent1"/>
+          </a:lnRef>
+          <a:fillRef idx="0">
+            <a:schemeClr val="accent1"/>
+          </a:fillRef>
+          <a:effectRef idx="0">
+            <a:schemeClr val="accent1"/>
+          </a:effectRef>
+          <a:fontRef idx="minor">
+            <a:schemeClr val="tx1"/>
+          </a:fontRef>
+        </p:style>
+      </p:cxnSp>
+      <p:cxnSp>
+        <p:nvCxnSpPr>
+          <p:cNvPr id="30" name="Straight Connector 29">
+            <a:extLst>
+              <a:ext uri="{FF2B5EF4-FFF2-40B4-BE49-F238E27FC236}">
+                <a16:creationId xmlns:a16="http://schemas.microsoft.com/office/drawing/2014/main" id="{117EBB5D-182A-9547-9463-4339A9CA0668}"/>
+              </a:ext>
+            </a:extLst>
+          </p:cNvPr>
+          <p:cNvCxnSpPr>
+            <a:cxnSpLocks/>
+          </p:cNvCxnSpPr>
+          <p:nvPr/>
+        </p:nvCxnSpPr>
+        <p:spPr>
+          <a:xfrm>
+            <a:off x="12051035" y="14288"/>
+            <a:ext cx="0" cy="6300788"/>
+          </a:xfrm>
+          <a:prstGeom prst="line">
+            <a:avLst/>
+          </a:prstGeom>
+          <a:ln w="25400">
+            <a:solidFill>
+              <a:srgbClr val="00B050"/>
+            </a:solidFill>
+          </a:ln>
+        </p:spPr>
+        <p:style>
+          <a:lnRef idx="1">
+            <a:schemeClr val="accent1"/>
+          </a:lnRef>
+          <a:fillRef idx="0">
+            <a:schemeClr val="accent1"/>
+          </a:fillRef>
+          <a:effectRef idx="0">
+            <a:schemeClr val="accent1"/>
+          </a:effectRef>
+          <a:fontRef idx="minor">
+            <a:schemeClr val="tx1"/>
+          </a:fontRef>
+        </p:style>
+      </p:cxnSp>
+      <p:cxnSp>
+        <p:nvCxnSpPr>
+          <p:cNvPr id="18" name="Straight Connector 17">
+            <a:extLst>
+              <a:ext uri="{FF2B5EF4-FFF2-40B4-BE49-F238E27FC236}">
+                <a16:creationId xmlns:a16="http://schemas.microsoft.com/office/drawing/2014/main" id="{FA0B9E01-6EBC-A743-8BF6-5BD64D58800A}"/>
+              </a:ext>
+            </a:extLst>
+          </p:cNvPr>
+          <p:cNvCxnSpPr>
+            <a:cxnSpLocks/>
+          </p:cNvCxnSpPr>
+          <p:nvPr/>
+        </p:nvCxnSpPr>
+        <p:spPr>
+          <a:xfrm>
+            <a:off x="3935730" y="0"/>
+            <a:ext cx="0" cy="5049078"/>
+          </a:xfrm>
+          <a:prstGeom prst="line">
+            <a:avLst/>
+          </a:prstGeom>
+          <a:ln w="25400">
+            <a:solidFill>
+              <a:srgbClr val="00B0F0"/>
+            </a:solidFill>
+          </a:ln>
+        </p:spPr>
+        <p:style>
+          <a:lnRef idx="1">
+            <a:schemeClr val="accent1"/>
+          </a:lnRef>
+          <a:fillRef idx="0">
+            <a:schemeClr val="accent1"/>
+          </a:fillRef>
+          <a:effectRef idx="0">
+            <a:schemeClr val="accent1"/>
+          </a:effectRef>
+          <a:fontRef idx="minor">
+            <a:schemeClr val="tx1"/>
+          </a:fontRef>
+        </p:style>
+      </p:cxnSp>
       <p:pic>
         <p:nvPicPr>
-          <p:cNvPr id="10" name="Picture 9">
+          <p:cNvPr id="4" name="Picture 3">
             <a:extLst>
               <a:ext uri="{FF2B5EF4-FFF2-40B4-BE49-F238E27FC236}">
-                <a16:creationId xmlns:a16="http://schemas.microsoft.com/office/drawing/2014/main" id="{6450D0CF-8DA2-8848-B20E-0659A2626562}"/>
+                <a16:creationId xmlns:a16="http://schemas.microsoft.com/office/drawing/2014/main" id="{33EA4022-D747-DE4E-9AE2-4E527C68E4B9}"/>
               </a:ext>
             </a:extLst>
           </p:cNvPr>
@@ -9243,8 +10713,8 @@
         </p:blipFill>
         <p:spPr>
           <a:xfrm rot="5400000">
-            <a:off x="976947" y="368618"/>
-            <a:ext cx="4166870" cy="6120765"/>
+            <a:off x="426083" y="1314257"/>
+            <a:ext cx="3143377" cy="3816477"/>
           </a:xfrm>
           <a:prstGeom prst="rect">
             <a:avLst/>
@@ -9253,10 +10723,10 @@
       </p:pic>
       <p:pic>
         <p:nvPicPr>
-          <p:cNvPr id="15" name="Picture 14">
+          <p:cNvPr id="6" name="Picture 5">
             <a:extLst>
               <a:ext uri="{FF2B5EF4-FFF2-40B4-BE49-F238E27FC236}">
-                <a16:creationId xmlns:a16="http://schemas.microsoft.com/office/drawing/2014/main" id="{7915DB52-DD74-594B-8CA6-971597AE9D1B}"/>
+                <a16:creationId xmlns:a16="http://schemas.microsoft.com/office/drawing/2014/main" id="{53AB3519-FBFF-CE4D-8352-1228F2E8C232}"/>
               </a:ext>
             </a:extLst>
           </p:cNvPr>
@@ -9273,8 +10743,2222 @@
         </p:blipFill>
         <p:spPr>
           <a:xfrm rot="5400000">
-            <a:off x="6864815" y="368617"/>
-            <a:ext cx="4166870" cy="6120765"/>
+            <a:off x="4447826" y="1314257"/>
+            <a:ext cx="3143377" cy="3816477"/>
+          </a:xfrm>
+          <a:prstGeom prst="rect">
+            <a:avLst/>
+          </a:prstGeom>
+        </p:spPr>
+      </p:pic>
+      <p:pic>
+        <p:nvPicPr>
+          <p:cNvPr id="8" name="Picture 7">
+            <a:extLst>
+              <a:ext uri="{FF2B5EF4-FFF2-40B4-BE49-F238E27FC236}">
+                <a16:creationId xmlns:a16="http://schemas.microsoft.com/office/drawing/2014/main" id="{4A81E50C-D054-864E-A939-30A59D453B16}"/>
+              </a:ext>
+            </a:extLst>
+          </p:cNvPr>
+          <p:cNvPicPr>
+            <a:picLocks noChangeAspect="1"/>
+          </p:cNvPicPr>
+          <p:nvPr/>
+        </p:nvPicPr>
+        <p:blipFill>
+          <a:blip r:embed="rId4"/>
+          <a:stretch>
+            <a:fillRect/>
+          </a:stretch>
+        </p:blipFill>
+        <p:spPr>
+          <a:xfrm rot="5400000">
+            <a:off x="8494259" y="1314257"/>
+            <a:ext cx="3143377" cy="3816477"/>
+          </a:xfrm>
+          <a:prstGeom prst="rect">
+            <a:avLst/>
+          </a:prstGeom>
+        </p:spPr>
+      </p:pic>
+    </p:spTree>
+    <p:extLst>
+      <p:ext uri="{BB962C8B-B14F-4D97-AF65-F5344CB8AC3E}">
+        <p14:creationId xmlns:p14="http://schemas.microsoft.com/office/powerpoint/2010/main" val="3496997662"/>
+      </p:ext>
+    </p:extLst>
+  </p:cSld>
+  <p:clrMapOvr>
+    <a:masterClrMapping/>
+  </p:clrMapOvr>
+</p:sld>
+</file>
+
+<file path=ppt/slides/slide5.xml><?xml version="1.0" encoding="utf-8"?>
+<p:sld xmlns:a="http://schemas.openxmlformats.org/drawingml/2006/main" xmlns:r="http://schemas.openxmlformats.org/officeDocument/2006/relationships" xmlns:p="http://schemas.openxmlformats.org/presentationml/2006/main">
+  <p:cSld>
+    <p:spTree>
+      <p:nvGrpSpPr>
+        <p:cNvPr id="1" name=""/>
+        <p:cNvGrpSpPr/>
+        <p:nvPr/>
+      </p:nvGrpSpPr>
+      <p:grpSpPr>
+        <a:xfrm>
+          <a:off x="0" y="0"/>
+          <a:ext cx="0" cy="0"/>
+          <a:chOff x="0" y="0"/>
+          <a:chExt cx="0" cy="0"/>
+        </a:xfrm>
+      </p:grpSpPr>
+      <p:sp>
+        <p:nvSpPr>
+          <p:cNvPr id="11" name="Footer Placeholder 7">
+            <a:extLst>
+              <a:ext uri="{FF2B5EF4-FFF2-40B4-BE49-F238E27FC236}">
+                <a16:creationId xmlns:a16="http://schemas.microsoft.com/office/drawing/2014/main" id="{59E26047-BD3C-504E-B955-20FE5C8AA1AA}"/>
+              </a:ext>
+            </a:extLst>
+          </p:cNvPr>
+          <p:cNvSpPr>
+            <a:spLocks noGrp="1"/>
+          </p:cNvSpPr>
+          <p:nvPr>
+            <p:ph type="ftr" sz="quarter" idx="11"/>
+          </p:nvPr>
+        </p:nvSpPr>
+        <p:spPr>
+          <a:xfrm>
+            <a:off x="3686185" y="6459785"/>
+            <a:ext cx="4822804" cy="365125"/>
+          </a:xfrm>
+        </p:spPr>
+        <p:txBody>
+          <a:bodyPr/>
+          <a:lstStyle/>
+          <a:p>
+            <a:r>
+              <a:rPr lang="fi-FI"/>
+              <a:t>NTUA G. Bakas</a:t>
+            </a:r>
+            <a:endParaRPr lang="en-US" dirty="0"/>
+          </a:p>
+        </p:txBody>
+      </p:sp>
+      <p:sp>
+        <p:nvSpPr>
+          <p:cNvPr id="12" name="Title 4">
+            <a:extLst>
+              <a:ext uri="{FF2B5EF4-FFF2-40B4-BE49-F238E27FC236}">
+                <a16:creationId xmlns:a16="http://schemas.microsoft.com/office/drawing/2014/main" id="{CCE472BB-DFA4-B349-8F30-2673C528FF7C}"/>
+              </a:ext>
+            </a:extLst>
+          </p:cNvPr>
+          <p:cNvSpPr txBox="1">
+            <a:spLocks/>
+          </p:cNvSpPr>
+          <p:nvPr/>
+        </p:nvSpPr>
+        <p:spPr>
+          <a:xfrm>
+            <a:off x="270168" y="174788"/>
+            <a:ext cx="6598766" cy="512916"/>
+          </a:xfrm>
+          <a:prstGeom prst="rect">
+            <a:avLst/>
+          </a:prstGeom>
+        </p:spPr>
+        <p:txBody>
+          <a:bodyPr vert="horz" lIns="91440" tIns="45720" rIns="91440" bIns="45720" rtlCol="0" anchor="b">
+            <a:noAutofit/>
+          </a:bodyPr>
+          <a:lstStyle>
+            <a:lvl1pPr algn="l" defTabSz="914400" rtl="0" eaLnBrk="1" latinLnBrk="0" hangingPunct="1">
+              <a:lnSpc>
+                <a:spcPct val="85000"/>
+              </a:lnSpc>
+              <a:spcBef>
+                <a:spcPct val="0"/>
+              </a:spcBef>
+              <a:buNone/>
+              <a:defRPr sz="4800" kern="1200" spc="-50" baseline="0">
+                <a:solidFill>
+                  <a:schemeClr val="tx1">
+                    <a:lumMod val="75000"/>
+                    <a:lumOff val="25000"/>
+                  </a:schemeClr>
+                </a:solidFill>
+                <a:latin typeface="+mj-lt"/>
+                <a:ea typeface="+mj-ea"/>
+                <a:cs typeface="+mj-cs"/>
+              </a:defRPr>
+            </a:lvl1pPr>
+          </a:lstStyle>
+          <a:p>
+            <a:r>
+              <a:rPr lang="en-GB" sz="2800" u="sng" dirty="0"/>
+              <a:t>TT contamination with Loose b-tagging WP</a:t>
+            </a:r>
+          </a:p>
+        </p:txBody>
+      </p:sp>
+      <p:sp>
+        <p:nvSpPr>
+          <p:cNvPr id="24" name="TextBox 23">
+            <a:extLst>
+              <a:ext uri="{FF2B5EF4-FFF2-40B4-BE49-F238E27FC236}">
+                <a16:creationId xmlns:a16="http://schemas.microsoft.com/office/drawing/2014/main" id="{6467259F-D55B-834E-9B9E-F410C9440440}"/>
+              </a:ext>
+            </a:extLst>
+          </p:cNvPr>
+          <p:cNvSpPr txBox="1"/>
+          <p:nvPr/>
+        </p:nvSpPr>
+        <p:spPr>
+          <a:xfrm>
+            <a:off x="1131570" y="1136599"/>
+            <a:ext cx="2057400" cy="369332"/>
+          </a:xfrm>
+          <a:prstGeom prst="rect">
+            <a:avLst/>
+          </a:prstGeom>
+          <a:noFill/>
+        </p:spPr>
+        <p:txBody>
+          <a:bodyPr wrap="square" rtlCol="0">
+            <a:spAutoFit/>
+          </a:bodyPr>
+          <a:lstStyle/>
+          <a:p>
+            <a:pPr algn="ctr"/>
+            <a:r>
+              <a:rPr lang="en-US" dirty="0">
+                <a:solidFill>
+                  <a:srgbClr val="00B0F0"/>
+                </a:solidFill>
+              </a:rPr>
+              <a:t>2016</a:t>
+            </a:r>
+          </a:p>
+        </p:txBody>
+      </p:sp>
+      <p:sp>
+        <p:nvSpPr>
+          <p:cNvPr id="25" name="TextBox 24">
+            <a:extLst>
+              <a:ext uri="{FF2B5EF4-FFF2-40B4-BE49-F238E27FC236}">
+                <a16:creationId xmlns:a16="http://schemas.microsoft.com/office/drawing/2014/main" id="{DE28F087-3562-8B49-AF03-25095E9C5C74}"/>
+              </a:ext>
+            </a:extLst>
+          </p:cNvPr>
+          <p:cNvSpPr txBox="1"/>
+          <p:nvPr/>
+        </p:nvSpPr>
+        <p:spPr>
+          <a:xfrm>
+            <a:off x="5067300" y="1136599"/>
+            <a:ext cx="2057400" cy="369332"/>
+          </a:xfrm>
+          <a:prstGeom prst="rect">
+            <a:avLst/>
+          </a:prstGeom>
+          <a:noFill/>
+        </p:spPr>
+        <p:txBody>
+          <a:bodyPr wrap="square" rtlCol="0">
+            <a:spAutoFit/>
+          </a:bodyPr>
+          <a:lstStyle/>
+          <a:p>
+            <a:pPr algn="ctr"/>
+            <a:r>
+              <a:rPr lang="en-US" dirty="0">
+                <a:solidFill>
+                  <a:srgbClr val="FF0000"/>
+                </a:solidFill>
+              </a:rPr>
+              <a:t>2017</a:t>
+            </a:r>
+          </a:p>
+        </p:txBody>
+      </p:sp>
+      <p:sp>
+        <p:nvSpPr>
+          <p:cNvPr id="26" name="TextBox 25">
+            <a:extLst>
+              <a:ext uri="{FF2B5EF4-FFF2-40B4-BE49-F238E27FC236}">
+                <a16:creationId xmlns:a16="http://schemas.microsoft.com/office/drawing/2014/main" id="{D81097FE-8411-3A41-813A-135B44833012}"/>
+              </a:ext>
+            </a:extLst>
+          </p:cNvPr>
+          <p:cNvSpPr txBox="1"/>
+          <p:nvPr/>
+        </p:nvSpPr>
+        <p:spPr>
+          <a:xfrm>
+            <a:off x="8871758" y="1134606"/>
+            <a:ext cx="2057400" cy="369332"/>
+          </a:xfrm>
+          <a:prstGeom prst="rect">
+            <a:avLst/>
+          </a:prstGeom>
+          <a:noFill/>
+        </p:spPr>
+        <p:txBody>
+          <a:bodyPr wrap="square" rtlCol="0">
+            <a:spAutoFit/>
+          </a:bodyPr>
+          <a:lstStyle/>
+          <a:p>
+            <a:pPr algn="ctr"/>
+            <a:r>
+              <a:rPr lang="en-US" dirty="0">
+                <a:solidFill>
+                  <a:srgbClr val="00B050"/>
+                </a:solidFill>
+              </a:rPr>
+              <a:t>2018</a:t>
+            </a:r>
+          </a:p>
+        </p:txBody>
+      </p:sp>
+      <p:sp>
+        <p:nvSpPr>
+          <p:cNvPr id="2" name="Slide Number Placeholder 1">
+            <a:extLst>
+              <a:ext uri="{FF2B5EF4-FFF2-40B4-BE49-F238E27FC236}">
+                <a16:creationId xmlns:a16="http://schemas.microsoft.com/office/drawing/2014/main" id="{2BDF07F2-8A31-6F41-9C54-4431125619C4}"/>
+              </a:ext>
+            </a:extLst>
+          </p:cNvPr>
+          <p:cNvSpPr>
+            <a:spLocks noGrp="1"/>
+          </p:cNvSpPr>
+          <p:nvPr>
+            <p:ph type="sldNum" sz="quarter" idx="12"/>
+          </p:nvPr>
+        </p:nvSpPr>
+        <p:spPr/>
+        <p:txBody>
+          <a:bodyPr/>
+          <a:lstStyle/>
+          <a:p>
+            <a:fld id="{4FAB73BC-B049-4115-A692-8D63A059BFB8}" type="slidenum">
+              <a:rPr lang="en-US" smtClean="0"/>
+              <a:pPr/>
+              <a:t>5</a:t>
+            </a:fld>
+            <a:endParaRPr lang="en-US" dirty="0"/>
+          </a:p>
+        </p:txBody>
+      </p:sp>
+      <p:cxnSp>
+        <p:nvCxnSpPr>
+          <p:cNvPr id="31" name="Straight Connector 30">
+            <a:extLst>
+              <a:ext uri="{FF2B5EF4-FFF2-40B4-BE49-F238E27FC236}">
+                <a16:creationId xmlns:a16="http://schemas.microsoft.com/office/drawing/2014/main" id="{39FD2651-9624-6645-A8FB-B6EDFBEACC24}"/>
+              </a:ext>
+            </a:extLst>
+          </p:cNvPr>
+          <p:cNvCxnSpPr>
+            <a:cxnSpLocks/>
+          </p:cNvCxnSpPr>
+          <p:nvPr/>
+        </p:nvCxnSpPr>
+        <p:spPr>
+          <a:xfrm>
+            <a:off x="30480" y="72102"/>
+            <a:ext cx="0" cy="6300788"/>
+          </a:xfrm>
+          <a:prstGeom prst="line">
+            <a:avLst/>
+          </a:prstGeom>
+          <a:ln w="25400">
+            <a:solidFill>
+              <a:srgbClr val="00B0F0"/>
+            </a:solidFill>
+          </a:ln>
+        </p:spPr>
+        <p:style>
+          <a:lnRef idx="1">
+            <a:schemeClr val="accent1"/>
+          </a:lnRef>
+          <a:fillRef idx="0">
+            <a:schemeClr val="accent1"/>
+          </a:fillRef>
+          <a:effectRef idx="0">
+            <a:schemeClr val="accent1"/>
+          </a:effectRef>
+          <a:fontRef idx="minor">
+            <a:schemeClr val="tx1"/>
+          </a:fontRef>
+        </p:style>
+      </p:cxnSp>
+      <p:sp>
+        <p:nvSpPr>
+          <p:cNvPr id="13" name="Date Placeholder 12">
+            <a:extLst>
+              <a:ext uri="{FF2B5EF4-FFF2-40B4-BE49-F238E27FC236}">
+                <a16:creationId xmlns:a16="http://schemas.microsoft.com/office/drawing/2014/main" id="{26FBEBE3-A9F2-CB4A-A555-BD1769498DB6}"/>
+              </a:ext>
+            </a:extLst>
+          </p:cNvPr>
+          <p:cNvSpPr>
+            <a:spLocks noGrp="1"/>
+          </p:cNvSpPr>
+          <p:nvPr>
+            <p:ph type="dt" sz="half" idx="10"/>
+          </p:nvPr>
+        </p:nvSpPr>
+        <p:spPr/>
+        <p:txBody>
+          <a:bodyPr/>
+          <a:lstStyle/>
+          <a:p>
+            <a:fld id="{863596AC-079A-914A-A4AA-F10BF720D55E}" type="datetime1">
+              <a:rPr lang="en-US" smtClean="0"/>
+              <a:t>1/10/20</a:t>
+            </a:fld>
+            <a:endParaRPr lang="en-US" dirty="0"/>
+          </a:p>
+        </p:txBody>
+      </p:sp>
+      <p:cxnSp>
+        <p:nvCxnSpPr>
+          <p:cNvPr id="27" name="Straight Connector 26">
+            <a:extLst>
+              <a:ext uri="{FF2B5EF4-FFF2-40B4-BE49-F238E27FC236}">
+                <a16:creationId xmlns:a16="http://schemas.microsoft.com/office/drawing/2014/main" id="{486E758F-A6A6-A949-AEA6-3614F17201C4}"/>
+              </a:ext>
+            </a:extLst>
+          </p:cNvPr>
+          <p:cNvCxnSpPr>
+            <a:cxnSpLocks/>
+          </p:cNvCxnSpPr>
+          <p:nvPr/>
+        </p:nvCxnSpPr>
+        <p:spPr>
+          <a:xfrm>
+            <a:off x="4002403" y="0"/>
+            <a:ext cx="0" cy="5049078"/>
+          </a:xfrm>
+          <a:prstGeom prst="line">
+            <a:avLst/>
+          </a:prstGeom>
+          <a:ln w="25400">
+            <a:solidFill>
+              <a:srgbClr val="FF0000"/>
+            </a:solidFill>
+          </a:ln>
+        </p:spPr>
+        <p:style>
+          <a:lnRef idx="1">
+            <a:schemeClr val="accent1"/>
+          </a:lnRef>
+          <a:fillRef idx="0">
+            <a:schemeClr val="accent1"/>
+          </a:fillRef>
+          <a:effectRef idx="0">
+            <a:schemeClr val="accent1"/>
+          </a:effectRef>
+          <a:fontRef idx="minor">
+            <a:schemeClr val="tx1"/>
+          </a:fontRef>
+        </p:style>
+      </p:cxnSp>
+      <p:cxnSp>
+        <p:nvCxnSpPr>
+          <p:cNvPr id="28" name="Straight Connector 27">
+            <a:extLst>
+              <a:ext uri="{FF2B5EF4-FFF2-40B4-BE49-F238E27FC236}">
+                <a16:creationId xmlns:a16="http://schemas.microsoft.com/office/drawing/2014/main" id="{58BF1060-8244-AA47-BC85-432273E489FD}"/>
+              </a:ext>
+            </a:extLst>
+          </p:cNvPr>
+          <p:cNvCxnSpPr>
+            <a:cxnSpLocks/>
+          </p:cNvCxnSpPr>
+          <p:nvPr/>
+        </p:nvCxnSpPr>
+        <p:spPr>
+          <a:xfrm flipH="1">
+            <a:off x="7974333" y="0"/>
+            <a:ext cx="1" cy="5049078"/>
+          </a:xfrm>
+          <a:prstGeom prst="line">
+            <a:avLst/>
+          </a:prstGeom>
+          <a:ln w="25400">
+            <a:solidFill>
+              <a:srgbClr val="FF0000"/>
+            </a:solidFill>
+          </a:ln>
+        </p:spPr>
+        <p:style>
+          <a:lnRef idx="1">
+            <a:schemeClr val="accent1"/>
+          </a:lnRef>
+          <a:fillRef idx="0">
+            <a:schemeClr val="accent1"/>
+          </a:fillRef>
+          <a:effectRef idx="0">
+            <a:schemeClr val="accent1"/>
+          </a:effectRef>
+          <a:fontRef idx="minor">
+            <a:schemeClr val="tx1"/>
+          </a:fontRef>
+        </p:style>
+      </p:cxnSp>
+      <p:cxnSp>
+        <p:nvCxnSpPr>
+          <p:cNvPr id="29" name="Straight Connector 28">
+            <a:extLst>
+              <a:ext uri="{FF2B5EF4-FFF2-40B4-BE49-F238E27FC236}">
+                <a16:creationId xmlns:a16="http://schemas.microsoft.com/office/drawing/2014/main" id="{1E569388-2E39-4547-A8E9-ED16C21F2D62}"/>
+              </a:ext>
+            </a:extLst>
+          </p:cNvPr>
+          <p:cNvCxnSpPr>
+            <a:cxnSpLocks/>
+          </p:cNvCxnSpPr>
+          <p:nvPr/>
+        </p:nvCxnSpPr>
+        <p:spPr>
+          <a:xfrm>
+            <a:off x="8055292" y="0"/>
+            <a:ext cx="0" cy="5049078"/>
+          </a:xfrm>
+          <a:prstGeom prst="line">
+            <a:avLst/>
+          </a:prstGeom>
+          <a:ln w="25400">
+            <a:solidFill>
+              <a:srgbClr val="00B050"/>
+            </a:solidFill>
+          </a:ln>
+        </p:spPr>
+        <p:style>
+          <a:lnRef idx="1">
+            <a:schemeClr val="accent1"/>
+          </a:lnRef>
+          <a:fillRef idx="0">
+            <a:schemeClr val="accent1"/>
+          </a:fillRef>
+          <a:effectRef idx="0">
+            <a:schemeClr val="accent1"/>
+          </a:effectRef>
+          <a:fontRef idx="minor">
+            <a:schemeClr val="tx1"/>
+          </a:fontRef>
+        </p:style>
+      </p:cxnSp>
+      <p:cxnSp>
+        <p:nvCxnSpPr>
+          <p:cNvPr id="30" name="Straight Connector 29">
+            <a:extLst>
+              <a:ext uri="{FF2B5EF4-FFF2-40B4-BE49-F238E27FC236}">
+                <a16:creationId xmlns:a16="http://schemas.microsoft.com/office/drawing/2014/main" id="{117EBB5D-182A-9547-9463-4339A9CA0668}"/>
+              </a:ext>
+            </a:extLst>
+          </p:cNvPr>
+          <p:cNvCxnSpPr>
+            <a:cxnSpLocks/>
+          </p:cNvCxnSpPr>
+          <p:nvPr/>
+        </p:nvCxnSpPr>
+        <p:spPr>
+          <a:xfrm>
+            <a:off x="12051035" y="14288"/>
+            <a:ext cx="0" cy="6300788"/>
+          </a:xfrm>
+          <a:prstGeom prst="line">
+            <a:avLst/>
+          </a:prstGeom>
+          <a:ln w="25400">
+            <a:solidFill>
+              <a:srgbClr val="00B050"/>
+            </a:solidFill>
+          </a:ln>
+        </p:spPr>
+        <p:style>
+          <a:lnRef idx="1">
+            <a:schemeClr val="accent1"/>
+          </a:lnRef>
+          <a:fillRef idx="0">
+            <a:schemeClr val="accent1"/>
+          </a:fillRef>
+          <a:effectRef idx="0">
+            <a:schemeClr val="accent1"/>
+          </a:effectRef>
+          <a:fontRef idx="minor">
+            <a:schemeClr val="tx1"/>
+          </a:fontRef>
+        </p:style>
+      </p:cxnSp>
+      <p:cxnSp>
+        <p:nvCxnSpPr>
+          <p:cNvPr id="18" name="Straight Connector 17">
+            <a:extLst>
+              <a:ext uri="{FF2B5EF4-FFF2-40B4-BE49-F238E27FC236}">
+                <a16:creationId xmlns:a16="http://schemas.microsoft.com/office/drawing/2014/main" id="{FA0B9E01-6EBC-A743-8BF6-5BD64D58800A}"/>
+              </a:ext>
+            </a:extLst>
+          </p:cNvPr>
+          <p:cNvCxnSpPr>
+            <a:cxnSpLocks/>
+          </p:cNvCxnSpPr>
+          <p:nvPr/>
+        </p:nvCxnSpPr>
+        <p:spPr>
+          <a:xfrm>
+            <a:off x="3935730" y="0"/>
+            <a:ext cx="0" cy="5049078"/>
+          </a:xfrm>
+          <a:prstGeom prst="line">
+            <a:avLst/>
+          </a:prstGeom>
+          <a:ln w="25400">
+            <a:solidFill>
+              <a:srgbClr val="00B0F0"/>
+            </a:solidFill>
+          </a:ln>
+        </p:spPr>
+        <p:style>
+          <a:lnRef idx="1">
+            <a:schemeClr val="accent1"/>
+          </a:lnRef>
+          <a:fillRef idx="0">
+            <a:schemeClr val="accent1"/>
+          </a:fillRef>
+          <a:effectRef idx="0">
+            <a:schemeClr val="accent1"/>
+          </a:effectRef>
+          <a:fontRef idx="minor">
+            <a:schemeClr val="tx1"/>
+          </a:fontRef>
+        </p:style>
+      </p:cxnSp>
+      <p:pic>
+        <p:nvPicPr>
+          <p:cNvPr id="5" name="Picture 4">
+            <a:extLst>
+              <a:ext uri="{FF2B5EF4-FFF2-40B4-BE49-F238E27FC236}">
+                <a16:creationId xmlns:a16="http://schemas.microsoft.com/office/drawing/2014/main" id="{481B6F26-51AE-8742-B961-DB89BAA92CE1}"/>
+              </a:ext>
+            </a:extLst>
+          </p:cNvPr>
+          <p:cNvPicPr>
+            <a:picLocks noChangeAspect="1"/>
+          </p:cNvPicPr>
+          <p:nvPr/>
+        </p:nvPicPr>
+        <p:blipFill>
+          <a:blip r:embed="rId2"/>
+          <a:stretch>
+            <a:fillRect/>
+          </a:stretch>
+        </p:blipFill>
+        <p:spPr>
+          <a:xfrm rot="5400000">
+            <a:off x="409553" y="1344815"/>
+            <a:ext cx="3143377" cy="3816477"/>
+          </a:xfrm>
+          <a:prstGeom prst="rect">
+            <a:avLst/>
+          </a:prstGeom>
+        </p:spPr>
+      </p:pic>
+      <p:pic>
+        <p:nvPicPr>
+          <p:cNvPr id="7" name="Picture 6">
+            <a:extLst>
+              <a:ext uri="{FF2B5EF4-FFF2-40B4-BE49-F238E27FC236}">
+                <a16:creationId xmlns:a16="http://schemas.microsoft.com/office/drawing/2014/main" id="{A6A02BB7-7F56-F043-A83D-2011392CCC99}"/>
+              </a:ext>
+            </a:extLst>
+          </p:cNvPr>
+          <p:cNvPicPr>
+            <a:picLocks noChangeAspect="1"/>
+          </p:cNvPicPr>
+          <p:nvPr/>
+        </p:nvPicPr>
+        <p:blipFill>
+          <a:blip r:embed="rId3"/>
+          <a:stretch>
+            <a:fillRect/>
+          </a:stretch>
+        </p:blipFill>
+        <p:spPr>
+          <a:xfrm rot="5400000">
+            <a:off x="4427728" y="1344815"/>
+            <a:ext cx="3143377" cy="3816477"/>
+          </a:xfrm>
+          <a:prstGeom prst="rect">
+            <a:avLst/>
+          </a:prstGeom>
+        </p:spPr>
+      </p:pic>
+      <p:pic>
+        <p:nvPicPr>
+          <p:cNvPr id="9" name="Picture 8">
+            <a:extLst>
+              <a:ext uri="{FF2B5EF4-FFF2-40B4-BE49-F238E27FC236}">
+                <a16:creationId xmlns:a16="http://schemas.microsoft.com/office/drawing/2014/main" id="{9E026641-93B0-3B49-B121-84DD860BFFA0}"/>
+              </a:ext>
+            </a:extLst>
+          </p:cNvPr>
+          <p:cNvPicPr>
+            <a:picLocks noChangeAspect="1"/>
+          </p:cNvPicPr>
+          <p:nvPr/>
+        </p:nvPicPr>
+        <p:blipFill>
+          <a:blip r:embed="rId4"/>
+          <a:stretch>
+            <a:fillRect/>
+          </a:stretch>
+        </p:blipFill>
+        <p:spPr>
+          <a:xfrm rot="5400000">
+            <a:off x="8567721" y="1344815"/>
+            <a:ext cx="3143377" cy="3816477"/>
+          </a:xfrm>
+          <a:prstGeom prst="rect">
+            <a:avLst/>
+          </a:prstGeom>
+        </p:spPr>
+      </p:pic>
+    </p:spTree>
+    <p:extLst>
+      <p:ext uri="{BB962C8B-B14F-4D97-AF65-F5344CB8AC3E}">
+        <p14:creationId xmlns:p14="http://schemas.microsoft.com/office/powerpoint/2010/main" val="92826825"/>
+      </p:ext>
+    </p:extLst>
+  </p:cSld>
+  <p:clrMapOvr>
+    <a:masterClrMapping/>
+  </p:clrMapOvr>
+</p:sld>
+</file>
+
+<file path=ppt/slides/slide6.xml><?xml version="1.0" encoding="utf-8"?>
+<p:sld xmlns:a="http://schemas.openxmlformats.org/drawingml/2006/main" xmlns:r="http://schemas.openxmlformats.org/officeDocument/2006/relationships" xmlns:p="http://schemas.openxmlformats.org/presentationml/2006/main">
+  <p:cSld>
+    <p:spTree>
+      <p:nvGrpSpPr>
+        <p:cNvPr id="1" name=""/>
+        <p:cNvGrpSpPr/>
+        <p:nvPr/>
+      </p:nvGrpSpPr>
+      <p:grpSpPr>
+        <a:xfrm>
+          <a:off x="0" y="0"/>
+          <a:ext cx="0" cy="0"/>
+          <a:chOff x="0" y="0"/>
+          <a:chExt cx="0" cy="0"/>
+        </a:xfrm>
+      </p:grpSpPr>
+      <p:sp>
+        <p:nvSpPr>
+          <p:cNvPr id="11" name="Footer Placeholder 7">
+            <a:extLst>
+              <a:ext uri="{FF2B5EF4-FFF2-40B4-BE49-F238E27FC236}">
+                <a16:creationId xmlns:a16="http://schemas.microsoft.com/office/drawing/2014/main" id="{59E26047-BD3C-504E-B955-20FE5C8AA1AA}"/>
+              </a:ext>
+            </a:extLst>
+          </p:cNvPr>
+          <p:cNvSpPr>
+            <a:spLocks noGrp="1"/>
+          </p:cNvSpPr>
+          <p:nvPr>
+            <p:ph type="ftr" sz="quarter" idx="11"/>
+          </p:nvPr>
+        </p:nvSpPr>
+        <p:spPr>
+          <a:xfrm>
+            <a:off x="3686185" y="6459785"/>
+            <a:ext cx="4822804" cy="365125"/>
+          </a:xfrm>
+        </p:spPr>
+        <p:txBody>
+          <a:bodyPr/>
+          <a:lstStyle/>
+          <a:p>
+            <a:r>
+              <a:rPr lang="fi-FI"/>
+              <a:t>NTUA G. Bakas</a:t>
+            </a:r>
+            <a:endParaRPr lang="en-US" dirty="0"/>
+          </a:p>
+        </p:txBody>
+      </p:sp>
+      <p:sp>
+        <p:nvSpPr>
+          <p:cNvPr id="12" name="Title 4">
+            <a:extLst>
+              <a:ext uri="{FF2B5EF4-FFF2-40B4-BE49-F238E27FC236}">
+                <a16:creationId xmlns:a16="http://schemas.microsoft.com/office/drawing/2014/main" id="{CCE472BB-DFA4-B349-8F30-2673C528FF7C}"/>
+              </a:ext>
+            </a:extLst>
+          </p:cNvPr>
+          <p:cNvSpPr txBox="1">
+            <a:spLocks/>
+          </p:cNvSpPr>
+          <p:nvPr/>
+        </p:nvSpPr>
+        <p:spPr>
+          <a:xfrm>
+            <a:off x="270168" y="174788"/>
+            <a:ext cx="6598766" cy="512916"/>
+          </a:xfrm>
+          <a:prstGeom prst="rect">
+            <a:avLst/>
+          </a:prstGeom>
+        </p:spPr>
+        <p:txBody>
+          <a:bodyPr vert="horz" lIns="91440" tIns="45720" rIns="91440" bIns="45720" rtlCol="0" anchor="b">
+            <a:noAutofit/>
+          </a:bodyPr>
+          <a:lstStyle>
+            <a:lvl1pPr algn="l" defTabSz="914400" rtl="0" eaLnBrk="1" latinLnBrk="0" hangingPunct="1">
+              <a:lnSpc>
+                <a:spcPct val="85000"/>
+              </a:lnSpc>
+              <a:spcBef>
+                <a:spcPct val="0"/>
+              </a:spcBef>
+              <a:buNone/>
+              <a:defRPr sz="4800" kern="1200" spc="-50" baseline="0">
+                <a:solidFill>
+                  <a:schemeClr val="tx1">
+                    <a:lumMod val="75000"/>
+                    <a:lumOff val="25000"/>
+                  </a:schemeClr>
+                </a:solidFill>
+                <a:latin typeface="+mj-lt"/>
+                <a:ea typeface="+mj-ea"/>
+                <a:cs typeface="+mj-cs"/>
+              </a:defRPr>
+            </a:lvl1pPr>
+          </a:lstStyle>
+          <a:p>
+            <a:r>
+              <a:rPr lang="en-GB" sz="2800" u="sng" dirty="0"/>
+              <a:t>QCD Closure tests with Loose b-tagging WP</a:t>
+            </a:r>
+          </a:p>
+        </p:txBody>
+      </p:sp>
+      <p:sp>
+        <p:nvSpPr>
+          <p:cNvPr id="24" name="TextBox 23">
+            <a:extLst>
+              <a:ext uri="{FF2B5EF4-FFF2-40B4-BE49-F238E27FC236}">
+                <a16:creationId xmlns:a16="http://schemas.microsoft.com/office/drawing/2014/main" id="{6467259F-D55B-834E-9B9E-F410C9440440}"/>
+              </a:ext>
+            </a:extLst>
+          </p:cNvPr>
+          <p:cNvSpPr txBox="1"/>
+          <p:nvPr/>
+        </p:nvSpPr>
+        <p:spPr>
+          <a:xfrm>
+            <a:off x="1131570" y="1136599"/>
+            <a:ext cx="2057400" cy="369332"/>
+          </a:xfrm>
+          <a:prstGeom prst="rect">
+            <a:avLst/>
+          </a:prstGeom>
+          <a:noFill/>
+        </p:spPr>
+        <p:txBody>
+          <a:bodyPr wrap="square" rtlCol="0">
+            <a:spAutoFit/>
+          </a:bodyPr>
+          <a:lstStyle/>
+          <a:p>
+            <a:pPr algn="ctr"/>
+            <a:r>
+              <a:rPr lang="en-US" dirty="0">
+                <a:solidFill>
+                  <a:srgbClr val="00B0F0"/>
+                </a:solidFill>
+              </a:rPr>
+              <a:t>2016</a:t>
+            </a:r>
+          </a:p>
+        </p:txBody>
+      </p:sp>
+      <p:sp>
+        <p:nvSpPr>
+          <p:cNvPr id="25" name="TextBox 24">
+            <a:extLst>
+              <a:ext uri="{FF2B5EF4-FFF2-40B4-BE49-F238E27FC236}">
+                <a16:creationId xmlns:a16="http://schemas.microsoft.com/office/drawing/2014/main" id="{DE28F087-3562-8B49-AF03-25095E9C5C74}"/>
+              </a:ext>
+            </a:extLst>
+          </p:cNvPr>
+          <p:cNvSpPr txBox="1"/>
+          <p:nvPr/>
+        </p:nvSpPr>
+        <p:spPr>
+          <a:xfrm>
+            <a:off x="5067300" y="1136599"/>
+            <a:ext cx="2057400" cy="369332"/>
+          </a:xfrm>
+          <a:prstGeom prst="rect">
+            <a:avLst/>
+          </a:prstGeom>
+          <a:noFill/>
+        </p:spPr>
+        <p:txBody>
+          <a:bodyPr wrap="square" rtlCol="0">
+            <a:spAutoFit/>
+          </a:bodyPr>
+          <a:lstStyle/>
+          <a:p>
+            <a:pPr algn="ctr"/>
+            <a:r>
+              <a:rPr lang="en-US" dirty="0">
+                <a:solidFill>
+                  <a:srgbClr val="FF0000"/>
+                </a:solidFill>
+              </a:rPr>
+              <a:t>2017</a:t>
+            </a:r>
+          </a:p>
+        </p:txBody>
+      </p:sp>
+      <p:sp>
+        <p:nvSpPr>
+          <p:cNvPr id="26" name="TextBox 25">
+            <a:extLst>
+              <a:ext uri="{FF2B5EF4-FFF2-40B4-BE49-F238E27FC236}">
+                <a16:creationId xmlns:a16="http://schemas.microsoft.com/office/drawing/2014/main" id="{D81097FE-8411-3A41-813A-135B44833012}"/>
+              </a:ext>
+            </a:extLst>
+          </p:cNvPr>
+          <p:cNvSpPr txBox="1"/>
+          <p:nvPr/>
+        </p:nvSpPr>
+        <p:spPr>
+          <a:xfrm>
+            <a:off x="8871758" y="1134606"/>
+            <a:ext cx="2057400" cy="369332"/>
+          </a:xfrm>
+          <a:prstGeom prst="rect">
+            <a:avLst/>
+          </a:prstGeom>
+          <a:noFill/>
+        </p:spPr>
+        <p:txBody>
+          <a:bodyPr wrap="square" rtlCol="0">
+            <a:spAutoFit/>
+          </a:bodyPr>
+          <a:lstStyle/>
+          <a:p>
+            <a:pPr algn="ctr"/>
+            <a:r>
+              <a:rPr lang="en-US" dirty="0">
+                <a:solidFill>
+                  <a:srgbClr val="00B050"/>
+                </a:solidFill>
+              </a:rPr>
+              <a:t>2018</a:t>
+            </a:r>
+          </a:p>
+        </p:txBody>
+      </p:sp>
+      <p:sp>
+        <p:nvSpPr>
+          <p:cNvPr id="2" name="Slide Number Placeholder 1">
+            <a:extLst>
+              <a:ext uri="{FF2B5EF4-FFF2-40B4-BE49-F238E27FC236}">
+                <a16:creationId xmlns:a16="http://schemas.microsoft.com/office/drawing/2014/main" id="{2BDF07F2-8A31-6F41-9C54-4431125619C4}"/>
+              </a:ext>
+            </a:extLst>
+          </p:cNvPr>
+          <p:cNvSpPr>
+            <a:spLocks noGrp="1"/>
+          </p:cNvSpPr>
+          <p:nvPr>
+            <p:ph type="sldNum" sz="quarter" idx="12"/>
+          </p:nvPr>
+        </p:nvSpPr>
+        <p:spPr/>
+        <p:txBody>
+          <a:bodyPr/>
+          <a:lstStyle/>
+          <a:p>
+            <a:fld id="{4FAB73BC-B049-4115-A692-8D63A059BFB8}" type="slidenum">
+              <a:rPr lang="en-US" smtClean="0"/>
+              <a:pPr/>
+              <a:t>6</a:t>
+            </a:fld>
+            <a:endParaRPr lang="en-US" dirty="0"/>
+          </a:p>
+        </p:txBody>
+      </p:sp>
+      <p:cxnSp>
+        <p:nvCxnSpPr>
+          <p:cNvPr id="31" name="Straight Connector 30">
+            <a:extLst>
+              <a:ext uri="{FF2B5EF4-FFF2-40B4-BE49-F238E27FC236}">
+                <a16:creationId xmlns:a16="http://schemas.microsoft.com/office/drawing/2014/main" id="{39FD2651-9624-6645-A8FB-B6EDFBEACC24}"/>
+              </a:ext>
+            </a:extLst>
+          </p:cNvPr>
+          <p:cNvCxnSpPr>
+            <a:cxnSpLocks/>
+          </p:cNvCxnSpPr>
+          <p:nvPr/>
+        </p:nvCxnSpPr>
+        <p:spPr>
+          <a:xfrm>
+            <a:off x="30480" y="72102"/>
+            <a:ext cx="0" cy="6300788"/>
+          </a:xfrm>
+          <a:prstGeom prst="line">
+            <a:avLst/>
+          </a:prstGeom>
+          <a:ln w="25400">
+            <a:solidFill>
+              <a:srgbClr val="00B0F0"/>
+            </a:solidFill>
+          </a:ln>
+        </p:spPr>
+        <p:style>
+          <a:lnRef idx="1">
+            <a:schemeClr val="accent1"/>
+          </a:lnRef>
+          <a:fillRef idx="0">
+            <a:schemeClr val="accent1"/>
+          </a:fillRef>
+          <a:effectRef idx="0">
+            <a:schemeClr val="accent1"/>
+          </a:effectRef>
+          <a:fontRef idx="minor">
+            <a:schemeClr val="tx1"/>
+          </a:fontRef>
+        </p:style>
+      </p:cxnSp>
+      <p:sp>
+        <p:nvSpPr>
+          <p:cNvPr id="13" name="Date Placeholder 12">
+            <a:extLst>
+              <a:ext uri="{FF2B5EF4-FFF2-40B4-BE49-F238E27FC236}">
+                <a16:creationId xmlns:a16="http://schemas.microsoft.com/office/drawing/2014/main" id="{26FBEBE3-A9F2-CB4A-A555-BD1769498DB6}"/>
+              </a:ext>
+            </a:extLst>
+          </p:cNvPr>
+          <p:cNvSpPr>
+            <a:spLocks noGrp="1"/>
+          </p:cNvSpPr>
+          <p:nvPr>
+            <p:ph type="dt" sz="half" idx="10"/>
+          </p:nvPr>
+        </p:nvSpPr>
+        <p:spPr/>
+        <p:txBody>
+          <a:bodyPr/>
+          <a:lstStyle/>
+          <a:p>
+            <a:fld id="{863596AC-079A-914A-A4AA-F10BF720D55E}" type="datetime1">
+              <a:rPr lang="en-US" smtClean="0"/>
+              <a:t>1/10/20</a:t>
+            </a:fld>
+            <a:endParaRPr lang="en-US" dirty="0"/>
+          </a:p>
+        </p:txBody>
+      </p:sp>
+      <p:cxnSp>
+        <p:nvCxnSpPr>
+          <p:cNvPr id="27" name="Straight Connector 26">
+            <a:extLst>
+              <a:ext uri="{FF2B5EF4-FFF2-40B4-BE49-F238E27FC236}">
+                <a16:creationId xmlns:a16="http://schemas.microsoft.com/office/drawing/2014/main" id="{486E758F-A6A6-A949-AEA6-3614F17201C4}"/>
+              </a:ext>
+            </a:extLst>
+          </p:cNvPr>
+          <p:cNvCxnSpPr>
+            <a:cxnSpLocks/>
+          </p:cNvCxnSpPr>
+          <p:nvPr/>
+        </p:nvCxnSpPr>
+        <p:spPr>
+          <a:xfrm>
+            <a:off x="4002403" y="0"/>
+            <a:ext cx="0" cy="5049078"/>
+          </a:xfrm>
+          <a:prstGeom prst="line">
+            <a:avLst/>
+          </a:prstGeom>
+          <a:ln w="25400">
+            <a:solidFill>
+              <a:srgbClr val="FF0000"/>
+            </a:solidFill>
+          </a:ln>
+        </p:spPr>
+        <p:style>
+          <a:lnRef idx="1">
+            <a:schemeClr val="accent1"/>
+          </a:lnRef>
+          <a:fillRef idx="0">
+            <a:schemeClr val="accent1"/>
+          </a:fillRef>
+          <a:effectRef idx="0">
+            <a:schemeClr val="accent1"/>
+          </a:effectRef>
+          <a:fontRef idx="minor">
+            <a:schemeClr val="tx1"/>
+          </a:fontRef>
+        </p:style>
+      </p:cxnSp>
+      <p:cxnSp>
+        <p:nvCxnSpPr>
+          <p:cNvPr id="28" name="Straight Connector 27">
+            <a:extLst>
+              <a:ext uri="{FF2B5EF4-FFF2-40B4-BE49-F238E27FC236}">
+                <a16:creationId xmlns:a16="http://schemas.microsoft.com/office/drawing/2014/main" id="{58BF1060-8244-AA47-BC85-432273E489FD}"/>
+              </a:ext>
+            </a:extLst>
+          </p:cNvPr>
+          <p:cNvCxnSpPr>
+            <a:cxnSpLocks/>
+          </p:cNvCxnSpPr>
+          <p:nvPr/>
+        </p:nvCxnSpPr>
+        <p:spPr>
+          <a:xfrm flipH="1">
+            <a:off x="7974333" y="0"/>
+            <a:ext cx="1" cy="5049078"/>
+          </a:xfrm>
+          <a:prstGeom prst="line">
+            <a:avLst/>
+          </a:prstGeom>
+          <a:ln w="25400">
+            <a:solidFill>
+              <a:srgbClr val="FF0000"/>
+            </a:solidFill>
+          </a:ln>
+        </p:spPr>
+        <p:style>
+          <a:lnRef idx="1">
+            <a:schemeClr val="accent1"/>
+          </a:lnRef>
+          <a:fillRef idx="0">
+            <a:schemeClr val="accent1"/>
+          </a:fillRef>
+          <a:effectRef idx="0">
+            <a:schemeClr val="accent1"/>
+          </a:effectRef>
+          <a:fontRef idx="minor">
+            <a:schemeClr val="tx1"/>
+          </a:fontRef>
+        </p:style>
+      </p:cxnSp>
+      <p:cxnSp>
+        <p:nvCxnSpPr>
+          <p:cNvPr id="29" name="Straight Connector 28">
+            <a:extLst>
+              <a:ext uri="{FF2B5EF4-FFF2-40B4-BE49-F238E27FC236}">
+                <a16:creationId xmlns:a16="http://schemas.microsoft.com/office/drawing/2014/main" id="{1E569388-2E39-4547-A8E9-ED16C21F2D62}"/>
+              </a:ext>
+            </a:extLst>
+          </p:cNvPr>
+          <p:cNvCxnSpPr>
+            <a:cxnSpLocks/>
+          </p:cNvCxnSpPr>
+          <p:nvPr/>
+        </p:nvCxnSpPr>
+        <p:spPr>
+          <a:xfrm>
+            <a:off x="8055292" y="0"/>
+            <a:ext cx="0" cy="5049078"/>
+          </a:xfrm>
+          <a:prstGeom prst="line">
+            <a:avLst/>
+          </a:prstGeom>
+          <a:ln w="25400">
+            <a:solidFill>
+              <a:srgbClr val="00B050"/>
+            </a:solidFill>
+          </a:ln>
+        </p:spPr>
+        <p:style>
+          <a:lnRef idx="1">
+            <a:schemeClr val="accent1"/>
+          </a:lnRef>
+          <a:fillRef idx="0">
+            <a:schemeClr val="accent1"/>
+          </a:fillRef>
+          <a:effectRef idx="0">
+            <a:schemeClr val="accent1"/>
+          </a:effectRef>
+          <a:fontRef idx="minor">
+            <a:schemeClr val="tx1"/>
+          </a:fontRef>
+        </p:style>
+      </p:cxnSp>
+      <p:cxnSp>
+        <p:nvCxnSpPr>
+          <p:cNvPr id="30" name="Straight Connector 29">
+            <a:extLst>
+              <a:ext uri="{FF2B5EF4-FFF2-40B4-BE49-F238E27FC236}">
+                <a16:creationId xmlns:a16="http://schemas.microsoft.com/office/drawing/2014/main" id="{117EBB5D-182A-9547-9463-4339A9CA0668}"/>
+              </a:ext>
+            </a:extLst>
+          </p:cNvPr>
+          <p:cNvCxnSpPr>
+            <a:cxnSpLocks/>
+          </p:cNvCxnSpPr>
+          <p:nvPr/>
+        </p:nvCxnSpPr>
+        <p:spPr>
+          <a:xfrm>
+            <a:off x="12051035" y="14288"/>
+            <a:ext cx="0" cy="6300788"/>
+          </a:xfrm>
+          <a:prstGeom prst="line">
+            <a:avLst/>
+          </a:prstGeom>
+          <a:ln w="25400">
+            <a:solidFill>
+              <a:srgbClr val="00B050"/>
+            </a:solidFill>
+          </a:ln>
+        </p:spPr>
+        <p:style>
+          <a:lnRef idx="1">
+            <a:schemeClr val="accent1"/>
+          </a:lnRef>
+          <a:fillRef idx="0">
+            <a:schemeClr val="accent1"/>
+          </a:fillRef>
+          <a:effectRef idx="0">
+            <a:schemeClr val="accent1"/>
+          </a:effectRef>
+          <a:fontRef idx="minor">
+            <a:schemeClr val="tx1"/>
+          </a:fontRef>
+        </p:style>
+      </p:cxnSp>
+      <p:cxnSp>
+        <p:nvCxnSpPr>
+          <p:cNvPr id="18" name="Straight Connector 17">
+            <a:extLst>
+              <a:ext uri="{FF2B5EF4-FFF2-40B4-BE49-F238E27FC236}">
+                <a16:creationId xmlns:a16="http://schemas.microsoft.com/office/drawing/2014/main" id="{FA0B9E01-6EBC-A743-8BF6-5BD64D58800A}"/>
+              </a:ext>
+            </a:extLst>
+          </p:cNvPr>
+          <p:cNvCxnSpPr>
+            <a:cxnSpLocks/>
+          </p:cNvCxnSpPr>
+          <p:nvPr/>
+        </p:nvCxnSpPr>
+        <p:spPr>
+          <a:xfrm>
+            <a:off x="3935730" y="0"/>
+            <a:ext cx="0" cy="5049078"/>
+          </a:xfrm>
+          <a:prstGeom prst="line">
+            <a:avLst/>
+          </a:prstGeom>
+          <a:ln w="25400">
+            <a:solidFill>
+              <a:srgbClr val="00B0F0"/>
+            </a:solidFill>
+          </a:ln>
+        </p:spPr>
+        <p:style>
+          <a:lnRef idx="1">
+            <a:schemeClr val="accent1"/>
+          </a:lnRef>
+          <a:fillRef idx="0">
+            <a:schemeClr val="accent1"/>
+          </a:fillRef>
+          <a:effectRef idx="0">
+            <a:schemeClr val="accent1"/>
+          </a:effectRef>
+          <a:fontRef idx="minor">
+            <a:schemeClr val="tx1"/>
+          </a:fontRef>
+        </p:style>
+      </p:cxnSp>
+      <p:pic>
+        <p:nvPicPr>
+          <p:cNvPr id="4" name="Picture 3">
+            <a:extLst>
+              <a:ext uri="{FF2B5EF4-FFF2-40B4-BE49-F238E27FC236}">
+                <a16:creationId xmlns:a16="http://schemas.microsoft.com/office/drawing/2014/main" id="{14D2224B-BE2E-B941-B9B6-1214F0B7E990}"/>
+              </a:ext>
+            </a:extLst>
+          </p:cNvPr>
+          <p:cNvPicPr>
+            <a:picLocks noChangeAspect="1"/>
+          </p:cNvPicPr>
+          <p:nvPr/>
+        </p:nvPicPr>
+        <p:blipFill>
+          <a:blip r:embed="rId2"/>
+          <a:stretch>
+            <a:fillRect/>
+          </a:stretch>
+        </p:blipFill>
+        <p:spPr>
+          <a:xfrm rot="5400000">
+            <a:off x="8501931" y="1419008"/>
+            <a:ext cx="3143377" cy="3816477"/>
+          </a:xfrm>
+          <a:prstGeom prst="rect">
+            <a:avLst/>
+          </a:prstGeom>
+        </p:spPr>
+      </p:pic>
+      <p:pic>
+        <p:nvPicPr>
+          <p:cNvPr id="8" name="Picture 7">
+            <a:extLst>
+              <a:ext uri="{FF2B5EF4-FFF2-40B4-BE49-F238E27FC236}">
+                <a16:creationId xmlns:a16="http://schemas.microsoft.com/office/drawing/2014/main" id="{08902430-3159-FD48-A933-9AD3C7591FED}"/>
+              </a:ext>
+            </a:extLst>
+          </p:cNvPr>
+          <p:cNvPicPr>
+            <a:picLocks noChangeAspect="1"/>
+          </p:cNvPicPr>
+          <p:nvPr/>
+        </p:nvPicPr>
+        <p:blipFill>
+          <a:blip r:embed="rId3"/>
+          <a:stretch>
+            <a:fillRect/>
+          </a:stretch>
+        </p:blipFill>
+        <p:spPr>
+          <a:xfrm rot="5400000">
+            <a:off x="4425230" y="1419008"/>
+            <a:ext cx="3143377" cy="3816477"/>
+          </a:xfrm>
+          <a:prstGeom prst="rect">
+            <a:avLst/>
+          </a:prstGeom>
+        </p:spPr>
+      </p:pic>
+      <p:pic>
+        <p:nvPicPr>
+          <p:cNvPr id="14" name="Picture 13">
+            <a:extLst>
+              <a:ext uri="{FF2B5EF4-FFF2-40B4-BE49-F238E27FC236}">
+                <a16:creationId xmlns:a16="http://schemas.microsoft.com/office/drawing/2014/main" id="{8B21CDF7-ADD8-6342-BCE5-2892B4284607}"/>
+              </a:ext>
+            </a:extLst>
+          </p:cNvPr>
+          <p:cNvPicPr>
+            <a:picLocks noChangeAspect="1"/>
+          </p:cNvPicPr>
+          <p:nvPr/>
+        </p:nvPicPr>
+        <p:blipFill>
+          <a:blip r:embed="rId4"/>
+          <a:stretch>
+            <a:fillRect/>
+          </a:stretch>
+        </p:blipFill>
+        <p:spPr>
+          <a:xfrm rot="5400000">
+            <a:off x="441518" y="1419008"/>
+            <a:ext cx="3143377" cy="3816477"/>
+          </a:xfrm>
+          <a:prstGeom prst="rect">
+            <a:avLst/>
+          </a:prstGeom>
+        </p:spPr>
+      </p:pic>
+    </p:spTree>
+    <p:extLst>
+      <p:ext uri="{BB962C8B-B14F-4D97-AF65-F5344CB8AC3E}">
+        <p14:creationId xmlns:p14="http://schemas.microsoft.com/office/powerpoint/2010/main" val="1529643704"/>
+      </p:ext>
+    </p:extLst>
+  </p:cSld>
+  <p:clrMapOvr>
+    <a:masterClrMapping/>
+  </p:clrMapOvr>
+</p:sld>
+</file>
+
+<file path=ppt/slides/slide7.xml><?xml version="1.0" encoding="utf-8"?>
+<p:sld xmlns:a="http://schemas.openxmlformats.org/drawingml/2006/main" xmlns:r="http://schemas.openxmlformats.org/officeDocument/2006/relationships" xmlns:p="http://schemas.openxmlformats.org/presentationml/2006/main">
+  <p:cSld>
+    <p:spTree>
+      <p:nvGrpSpPr>
+        <p:cNvPr id="1" name=""/>
+        <p:cNvGrpSpPr/>
+        <p:nvPr/>
+      </p:nvGrpSpPr>
+      <p:grpSpPr>
+        <a:xfrm>
+          <a:off x="0" y="0"/>
+          <a:ext cx="0" cy="0"/>
+          <a:chOff x="0" y="0"/>
+          <a:chExt cx="0" cy="0"/>
+        </a:xfrm>
+      </p:grpSpPr>
+      <p:sp>
+        <p:nvSpPr>
+          <p:cNvPr id="11" name="Footer Placeholder 7">
+            <a:extLst>
+              <a:ext uri="{FF2B5EF4-FFF2-40B4-BE49-F238E27FC236}">
+                <a16:creationId xmlns:a16="http://schemas.microsoft.com/office/drawing/2014/main" id="{59E26047-BD3C-504E-B955-20FE5C8AA1AA}"/>
+              </a:ext>
+            </a:extLst>
+          </p:cNvPr>
+          <p:cNvSpPr>
+            <a:spLocks noGrp="1"/>
+          </p:cNvSpPr>
+          <p:nvPr>
+            <p:ph type="ftr" sz="quarter" idx="11"/>
+          </p:nvPr>
+        </p:nvSpPr>
+        <p:spPr>
+          <a:xfrm>
+            <a:off x="3686185" y="6459785"/>
+            <a:ext cx="4822804" cy="365125"/>
+          </a:xfrm>
+        </p:spPr>
+        <p:txBody>
+          <a:bodyPr/>
+          <a:lstStyle/>
+          <a:p>
+            <a:r>
+              <a:rPr lang="fi-FI"/>
+              <a:t>NTUA G. Bakas</a:t>
+            </a:r>
+            <a:endParaRPr lang="en-US" dirty="0"/>
+          </a:p>
+        </p:txBody>
+      </p:sp>
+      <p:sp>
+        <p:nvSpPr>
+          <p:cNvPr id="12" name="Title 4">
+            <a:extLst>
+              <a:ext uri="{FF2B5EF4-FFF2-40B4-BE49-F238E27FC236}">
+                <a16:creationId xmlns:a16="http://schemas.microsoft.com/office/drawing/2014/main" id="{CCE472BB-DFA4-B349-8F30-2673C528FF7C}"/>
+              </a:ext>
+            </a:extLst>
+          </p:cNvPr>
+          <p:cNvSpPr txBox="1">
+            <a:spLocks/>
+          </p:cNvSpPr>
+          <p:nvPr/>
+        </p:nvSpPr>
+        <p:spPr>
+          <a:xfrm>
+            <a:off x="270168" y="174788"/>
+            <a:ext cx="6598766" cy="512916"/>
+          </a:xfrm>
+          <a:prstGeom prst="rect">
+            <a:avLst/>
+          </a:prstGeom>
+        </p:spPr>
+        <p:txBody>
+          <a:bodyPr vert="horz" lIns="91440" tIns="45720" rIns="91440" bIns="45720" rtlCol="0" anchor="b">
+            <a:noAutofit/>
+          </a:bodyPr>
+          <a:lstStyle>
+            <a:lvl1pPr algn="l" defTabSz="914400" rtl="0" eaLnBrk="1" latinLnBrk="0" hangingPunct="1">
+              <a:lnSpc>
+                <a:spcPct val="85000"/>
+              </a:lnSpc>
+              <a:spcBef>
+                <a:spcPct val="0"/>
+              </a:spcBef>
+              <a:buNone/>
+              <a:defRPr sz="4800" kern="1200" spc="-50" baseline="0">
+                <a:solidFill>
+                  <a:schemeClr val="tx1">
+                    <a:lumMod val="75000"/>
+                    <a:lumOff val="25000"/>
+                  </a:schemeClr>
+                </a:solidFill>
+                <a:latin typeface="+mj-lt"/>
+                <a:ea typeface="+mj-ea"/>
+                <a:cs typeface="+mj-cs"/>
+              </a:defRPr>
+            </a:lvl1pPr>
+          </a:lstStyle>
+          <a:p>
+            <a:r>
+              <a:rPr lang="en-GB" sz="2800" u="sng" dirty="0"/>
+              <a:t>QCD Closure tests with Loose b-tagging WP</a:t>
+            </a:r>
+          </a:p>
+        </p:txBody>
+      </p:sp>
+      <p:sp>
+        <p:nvSpPr>
+          <p:cNvPr id="24" name="TextBox 23">
+            <a:extLst>
+              <a:ext uri="{FF2B5EF4-FFF2-40B4-BE49-F238E27FC236}">
+                <a16:creationId xmlns:a16="http://schemas.microsoft.com/office/drawing/2014/main" id="{6467259F-D55B-834E-9B9E-F410C9440440}"/>
+              </a:ext>
+            </a:extLst>
+          </p:cNvPr>
+          <p:cNvSpPr txBox="1"/>
+          <p:nvPr/>
+        </p:nvSpPr>
+        <p:spPr>
+          <a:xfrm>
+            <a:off x="1131570" y="1136599"/>
+            <a:ext cx="2057400" cy="369332"/>
+          </a:xfrm>
+          <a:prstGeom prst="rect">
+            <a:avLst/>
+          </a:prstGeom>
+          <a:noFill/>
+        </p:spPr>
+        <p:txBody>
+          <a:bodyPr wrap="square" rtlCol="0">
+            <a:spAutoFit/>
+          </a:bodyPr>
+          <a:lstStyle/>
+          <a:p>
+            <a:pPr algn="ctr"/>
+            <a:r>
+              <a:rPr lang="en-US" dirty="0">
+                <a:solidFill>
+                  <a:srgbClr val="00B0F0"/>
+                </a:solidFill>
+              </a:rPr>
+              <a:t>2016</a:t>
+            </a:r>
+          </a:p>
+        </p:txBody>
+      </p:sp>
+      <p:sp>
+        <p:nvSpPr>
+          <p:cNvPr id="25" name="TextBox 24">
+            <a:extLst>
+              <a:ext uri="{FF2B5EF4-FFF2-40B4-BE49-F238E27FC236}">
+                <a16:creationId xmlns:a16="http://schemas.microsoft.com/office/drawing/2014/main" id="{DE28F087-3562-8B49-AF03-25095E9C5C74}"/>
+              </a:ext>
+            </a:extLst>
+          </p:cNvPr>
+          <p:cNvSpPr txBox="1"/>
+          <p:nvPr/>
+        </p:nvSpPr>
+        <p:spPr>
+          <a:xfrm>
+            <a:off x="5067300" y="1136599"/>
+            <a:ext cx="2057400" cy="369332"/>
+          </a:xfrm>
+          <a:prstGeom prst="rect">
+            <a:avLst/>
+          </a:prstGeom>
+          <a:noFill/>
+        </p:spPr>
+        <p:txBody>
+          <a:bodyPr wrap="square" rtlCol="0">
+            <a:spAutoFit/>
+          </a:bodyPr>
+          <a:lstStyle/>
+          <a:p>
+            <a:pPr algn="ctr"/>
+            <a:r>
+              <a:rPr lang="en-US" dirty="0">
+                <a:solidFill>
+                  <a:srgbClr val="FF0000"/>
+                </a:solidFill>
+              </a:rPr>
+              <a:t>2017</a:t>
+            </a:r>
+          </a:p>
+        </p:txBody>
+      </p:sp>
+      <p:sp>
+        <p:nvSpPr>
+          <p:cNvPr id="26" name="TextBox 25">
+            <a:extLst>
+              <a:ext uri="{FF2B5EF4-FFF2-40B4-BE49-F238E27FC236}">
+                <a16:creationId xmlns:a16="http://schemas.microsoft.com/office/drawing/2014/main" id="{D81097FE-8411-3A41-813A-135B44833012}"/>
+              </a:ext>
+            </a:extLst>
+          </p:cNvPr>
+          <p:cNvSpPr txBox="1"/>
+          <p:nvPr/>
+        </p:nvSpPr>
+        <p:spPr>
+          <a:xfrm>
+            <a:off x="8871758" y="1134606"/>
+            <a:ext cx="2057400" cy="369332"/>
+          </a:xfrm>
+          <a:prstGeom prst="rect">
+            <a:avLst/>
+          </a:prstGeom>
+          <a:noFill/>
+        </p:spPr>
+        <p:txBody>
+          <a:bodyPr wrap="square" rtlCol="0">
+            <a:spAutoFit/>
+          </a:bodyPr>
+          <a:lstStyle/>
+          <a:p>
+            <a:pPr algn="ctr"/>
+            <a:r>
+              <a:rPr lang="en-US" dirty="0">
+                <a:solidFill>
+                  <a:srgbClr val="00B050"/>
+                </a:solidFill>
+              </a:rPr>
+              <a:t>2018</a:t>
+            </a:r>
+          </a:p>
+        </p:txBody>
+      </p:sp>
+      <p:sp>
+        <p:nvSpPr>
+          <p:cNvPr id="2" name="Slide Number Placeholder 1">
+            <a:extLst>
+              <a:ext uri="{FF2B5EF4-FFF2-40B4-BE49-F238E27FC236}">
+                <a16:creationId xmlns:a16="http://schemas.microsoft.com/office/drawing/2014/main" id="{2BDF07F2-8A31-6F41-9C54-4431125619C4}"/>
+              </a:ext>
+            </a:extLst>
+          </p:cNvPr>
+          <p:cNvSpPr>
+            <a:spLocks noGrp="1"/>
+          </p:cNvSpPr>
+          <p:nvPr>
+            <p:ph type="sldNum" sz="quarter" idx="12"/>
+          </p:nvPr>
+        </p:nvSpPr>
+        <p:spPr/>
+        <p:txBody>
+          <a:bodyPr/>
+          <a:lstStyle/>
+          <a:p>
+            <a:fld id="{4FAB73BC-B049-4115-A692-8D63A059BFB8}" type="slidenum">
+              <a:rPr lang="en-US" smtClean="0"/>
+              <a:pPr/>
+              <a:t>7</a:t>
+            </a:fld>
+            <a:endParaRPr lang="en-US" dirty="0"/>
+          </a:p>
+        </p:txBody>
+      </p:sp>
+      <p:cxnSp>
+        <p:nvCxnSpPr>
+          <p:cNvPr id="31" name="Straight Connector 30">
+            <a:extLst>
+              <a:ext uri="{FF2B5EF4-FFF2-40B4-BE49-F238E27FC236}">
+                <a16:creationId xmlns:a16="http://schemas.microsoft.com/office/drawing/2014/main" id="{39FD2651-9624-6645-A8FB-B6EDFBEACC24}"/>
+              </a:ext>
+            </a:extLst>
+          </p:cNvPr>
+          <p:cNvCxnSpPr>
+            <a:cxnSpLocks/>
+          </p:cNvCxnSpPr>
+          <p:nvPr/>
+        </p:nvCxnSpPr>
+        <p:spPr>
+          <a:xfrm>
+            <a:off x="30480" y="72102"/>
+            <a:ext cx="0" cy="6300788"/>
+          </a:xfrm>
+          <a:prstGeom prst="line">
+            <a:avLst/>
+          </a:prstGeom>
+          <a:ln w="25400">
+            <a:solidFill>
+              <a:srgbClr val="00B0F0"/>
+            </a:solidFill>
+          </a:ln>
+        </p:spPr>
+        <p:style>
+          <a:lnRef idx="1">
+            <a:schemeClr val="accent1"/>
+          </a:lnRef>
+          <a:fillRef idx="0">
+            <a:schemeClr val="accent1"/>
+          </a:fillRef>
+          <a:effectRef idx="0">
+            <a:schemeClr val="accent1"/>
+          </a:effectRef>
+          <a:fontRef idx="minor">
+            <a:schemeClr val="tx1"/>
+          </a:fontRef>
+        </p:style>
+      </p:cxnSp>
+      <p:sp>
+        <p:nvSpPr>
+          <p:cNvPr id="13" name="Date Placeholder 12">
+            <a:extLst>
+              <a:ext uri="{FF2B5EF4-FFF2-40B4-BE49-F238E27FC236}">
+                <a16:creationId xmlns:a16="http://schemas.microsoft.com/office/drawing/2014/main" id="{26FBEBE3-A9F2-CB4A-A555-BD1769498DB6}"/>
+              </a:ext>
+            </a:extLst>
+          </p:cNvPr>
+          <p:cNvSpPr>
+            <a:spLocks noGrp="1"/>
+          </p:cNvSpPr>
+          <p:nvPr>
+            <p:ph type="dt" sz="half" idx="10"/>
+          </p:nvPr>
+        </p:nvSpPr>
+        <p:spPr/>
+        <p:txBody>
+          <a:bodyPr/>
+          <a:lstStyle/>
+          <a:p>
+            <a:fld id="{863596AC-079A-914A-A4AA-F10BF720D55E}" type="datetime1">
+              <a:rPr lang="en-US" smtClean="0"/>
+              <a:t>1/10/20</a:t>
+            </a:fld>
+            <a:endParaRPr lang="en-US" dirty="0"/>
+          </a:p>
+        </p:txBody>
+      </p:sp>
+      <p:cxnSp>
+        <p:nvCxnSpPr>
+          <p:cNvPr id="27" name="Straight Connector 26">
+            <a:extLst>
+              <a:ext uri="{FF2B5EF4-FFF2-40B4-BE49-F238E27FC236}">
+                <a16:creationId xmlns:a16="http://schemas.microsoft.com/office/drawing/2014/main" id="{486E758F-A6A6-A949-AEA6-3614F17201C4}"/>
+              </a:ext>
+            </a:extLst>
+          </p:cNvPr>
+          <p:cNvCxnSpPr>
+            <a:cxnSpLocks/>
+          </p:cNvCxnSpPr>
+          <p:nvPr/>
+        </p:nvCxnSpPr>
+        <p:spPr>
+          <a:xfrm>
+            <a:off x="4002403" y="0"/>
+            <a:ext cx="0" cy="5049078"/>
+          </a:xfrm>
+          <a:prstGeom prst="line">
+            <a:avLst/>
+          </a:prstGeom>
+          <a:ln w="25400">
+            <a:solidFill>
+              <a:srgbClr val="FF0000"/>
+            </a:solidFill>
+          </a:ln>
+        </p:spPr>
+        <p:style>
+          <a:lnRef idx="1">
+            <a:schemeClr val="accent1"/>
+          </a:lnRef>
+          <a:fillRef idx="0">
+            <a:schemeClr val="accent1"/>
+          </a:fillRef>
+          <a:effectRef idx="0">
+            <a:schemeClr val="accent1"/>
+          </a:effectRef>
+          <a:fontRef idx="minor">
+            <a:schemeClr val="tx1"/>
+          </a:fontRef>
+        </p:style>
+      </p:cxnSp>
+      <p:cxnSp>
+        <p:nvCxnSpPr>
+          <p:cNvPr id="28" name="Straight Connector 27">
+            <a:extLst>
+              <a:ext uri="{FF2B5EF4-FFF2-40B4-BE49-F238E27FC236}">
+                <a16:creationId xmlns:a16="http://schemas.microsoft.com/office/drawing/2014/main" id="{58BF1060-8244-AA47-BC85-432273E489FD}"/>
+              </a:ext>
+            </a:extLst>
+          </p:cNvPr>
+          <p:cNvCxnSpPr>
+            <a:cxnSpLocks/>
+          </p:cNvCxnSpPr>
+          <p:nvPr/>
+        </p:nvCxnSpPr>
+        <p:spPr>
+          <a:xfrm flipH="1">
+            <a:off x="7974333" y="0"/>
+            <a:ext cx="1" cy="5049078"/>
+          </a:xfrm>
+          <a:prstGeom prst="line">
+            <a:avLst/>
+          </a:prstGeom>
+          <a:ln w="25400">
+            <a:solidFill>
+              <a:srgbClr val="FF0000"/>
+            </a:solidFill>
+          </a:ln>
+        </p:spPr>
+        <p:style>
+          <a:lnRef idx="1">
+            <a:schemeClr val="accent1"/>
+          </a:lnRef>
+          <a:fillRef idx="0">
+            <a:schemeClr val="accent1"/>
+          </a:fillRef>
+          <a:effectRef idx="0">
+            <a:schemeClr val="accent1"/>
+          </a:effectRef>
+          <a:fontRef idx="minor">
+            <a:schemeClr val="tx1"/>
+          </a:fontRef>
+        </p:style>
+      </p:cxnSp>
+      <p:cxnSp>
+        <p:nvCxnSpPr>
+          <p:cNvPr id="29" name="Straight Connector 28">
+            <a:extLst>
+              <a:ext uri="{FF2B5EF4-FFF2-40B4-BE49-F238E27FC236}">
+                <a16:creationId xmlns:a16="http://schemas.microsoft.com/office/drawing/2014/main" id="{1E569388-2E39-4547-A8E9-ED16C21F2D62}"/>
+              </a:ext>
+            </a:extLst>
+          </p:cNvPr>
+          <p:cNvCxnSpPr>
+            <a:cxnSpLocks/>
+          </p:cNvCxnSpPr>
+          <p:nvPr/>
+        </p:nvCxnSpPr>
+        <p:spPr>
+          <a:xfrm>
+            <a:off x="8055292" y="0"/>
+            <a:ext cx="0" cy="5049078"/>
+          </a:xfrm>
+          <a:prstGeom prst="line">
+            <a:avLst/>
+          </a:prstGeom>
+          <a:ln w="25400">
+            <a:solidFill>
+              <a:srgbClr val="00B050"/>
+            </a:solidFill>
+          </a:ln>
+        </p:spPr>
+        <p:style>
+          <a:lnRef idx="1">
+            <a:schemeClr val="accent1"/>
+          </a:lnRef>
+          <a:fillRef idx="0">
+            <a:schemeClr val="accent1"/>
+          </a:fillRef>
+          <a:effectRef idx="0">
+            <a:schemeClr val="accent1"/>
+          </a:effectRef>
+          <a:fontRef idx="minor">
+            <a:schemeClr val="tx1"/>
+          </a:fontRef>
+        </p:style>
+      </p:cxnSp>
+      <p:cxnSp>
+        <p:nvCxnSpPr>
+          <p:cNvPr id="30" name="Straight Connector 29">
+            <a:extLst>
+              <a:ext uri="{FF2B5EF4-FFF2-40B4-BE49-F238E27FC236}">
+                <a16:creationId xmlns:a16="http://schemas.microsoft.com/office/drawing/2014/main" id="{117EBB5D-182A-9547-9463-4339A9CA0668}"/>
+              </a:ext>
+            </a:extLst>
+          </p:cNvPr>
+          <p:cNvCxnSpPr>
+            <a:cxnSpLocks/>
+          </p:cNvCxnSpPr>
+          <p:nvPr/>
+        </p:nvCxnSpPr>
+        <p:spPr>
+          <a:xfrm>
+            <a:off x="12051035" y="14288"/>
+            <a:ext cx="0" cy="6300788"/>
+          </a:xfrm>
+          <a:prstGeom prst="line">
+            <a:avLst/>
+          </a:prstGeom>
+          <a:ln w="25400">
+            <a:solidFill>
+              <a:srgbClr val="00B050"/>
+            </a:solidFill>
+          </a:ln>
+        </p:spPr>
+        <p:style>
+          <a:lnRef idx="1">
+            <a:schemeClr val="accent1"/>
+          </a:lnRef>
+          <a:fillRef idx="0">
+            <a:schemeClr val="accent1"/>
+          </a:fillRef>
+          <a:effectRef idx="0">
+            <a:schemeClr val="accent1"/>
+          </a:effectRef>
+          <a:fontRef idx="minor">
+            <a:schemeClr val="tx1"/>
+          </a:fontRef>
+        </p:style>
+      </p:cxnSp>
+      <p:cxnSp>
+        <p:nvCxnSpPr>
+          <p:cNvPr id="18" name="Straight Connector 17">
+            <a:extLst>
+              <a:ext uri="{FF2B5EF4-FFF2-40B4-BE49-F238E27FC236}">
+                <a16:creationId xmlns:a16="http://schemas.microsoft.com/office/drawing/2014/main" id="{FA0B9E01-6EBC-A743-8BF6-5BD64D58800A}"/>
+              </a:ext>
+            </a:extLst>
+          </p:cNvPr>
+          <p:cNvCxnSpPr>
+            <a:cxnSpLocks/>
+          </p:cNvCxnSpPr>
+          <p:nvPr/>
+        </p:nvCxnSpPr>
+        <p:spPr>
+          <a:xfrm>
+            <a:off x="3935730" y="0"/>
+            <a:ext cx="0" cy="5049078"/>
+          </a:xfrm>
+          <a:prstGeom prst="line">
+            <a:avLst/>
+          </a:prstGeom>
+          <a:ln w="25400">
+            <a:solidFill>
+              <a:srgbClr val="00B0F0"/>
+            </a:solidFill>
+          </a:ln>
+        </p:spPr>
+        <p:style>
+          <a:lnRef idx="1">
+            <a:schemeClr val="accent1"/>
+          </a:lnRef>
+          <a:fillRef idx="0">
+            <a:schemeClr val="accent1"/>
+          </a:fillRef>
+          <a:effectRef idx="0">
+            <a:schemeClr val="accent1"/>
+          </a:effectRef>
+          <a:fontRef idx="minor">
+            <a:schemeClr val="tx1"/>
+          </a:fontRef>
+        </p:style>
+      </p:cxnSp>
+      <p:pic>
+        <p:nvPicPr>
+          <p:cNvPr id="4" name="Picture 3">
+            <a:extLst>
+              <a:ext uri="{FF2B5EF4-FFF2-40B4-BE49-F238E27FC236}">
+                <a16:creationId xmlns:a16="http://schemas.microsoft.com/office/drawing/2014/main" id="{B1F377D7-416B-554D-9884-32E6633204DD}"/>
+              </a:ext>
+            </a:extLst>
+          </p:cNvPr>
+          <p:cNvPicPr>
+            <a:picLocks noChangeAspect="1"/>
+          </p:cNvPicPr>
+          <p:nvPr/>
+        </p:nvPicPr>
+        <p:blipFill>
+          <a:blip r:embed="rId2"/>
+          <a:stretch>
+            <a:fillRect/>
+          </a:stretch>
+        </p:blipFill>
+        <p:spPr>
+          <a:xfrm rot="5400000">
+            <a:off x="397174" y="1438308"/>
+            <a:ext cx="3143377" cy="3816477"/>
+          </a:xfrm>
+          <a:prstGeom prst="rect">
+            <a:avLst/>
+          </a:prstGeom>
+        </p:spPr>
+      </p:pic>
+      <p:pic>
+        <p:nvPicPr>
+          <p:cNvPr id="6" name="Picture 5">
+            <a:extLst>
+              <a:ext uri="{FF2B5EF4-FFF2-40B4-BE49-F238E27FC236}">
+                <a16:creationId xmlns:a16="http://schemas.microsoft.com/office/drawing/2014/main" id="{140F2EA9-321E-8049-8959-9F468DD9B8CD}"/>
+              </a:ext>
+            </a:extLst>
+          </p:cNvPr>
+          <p:cNvPicPr>
+            <a:picLocks noChangeAspect="1"/>
+          </p:cNvPicPr>
+          <p:nvPr/>
+        </p:nvPicPr>
+        <p:blipFill>
+          <a:blip r:embed="rId3"/>
+          <a:stretch>
+            <a:fillRect/>
+          </a:stretch>
+        </p:blipFill>
+        <p:spPr>
+          <a:xfrm rot="5400000">
+            <a:off x="4431310" y="1438307"/>
+            <a:ext cx="3143377" cy="3816477"/>
+          </a:xfrm>
+          <a:prstGeom prst="rect">
+            <a:avLst/>
+          </a:prstGeom>
+        </p:spPr>
+      </p:pic>
+      <p:pic>
+        <p:nvPicPr>
+          <p:cNvPr id="8" name="Picture 7">
+            <a:extLst>
+              <a:ext uri="{FF2B5EF4-FFF2-40B4-BE49-F238E27FC236}">
+                <a16:creationId xmlns:a16="http://schemas.microsoft.com/office/drawing/2014/main" id="{77DFA9AB-B2BE-1D43-B872-4CA06ECC91A7}"/>
+              </a:ext>
+            </a:extLst>
+          </p:cNvPr>
+          <p:cNvPicPr>
+            <a:picLocks noChangeAspect="1"/>
+          </p:cNvPicPr>
+          <p:nvPr/>
+        </p:nvPicPr>
+        <p:blipFill>
+          <a:blip r:embed="rId4"/>
+          <a:stretch>
+            <a:fillRect/>
+          </a:stretch>
+        </p:blipFill>
+        <p:spPr>
+          <a:xfrm rot="5400000">
+            <a:off x="8531360" y="1438306"/>
+            <a:ext cx="3143377" cy="3816477"/>
+          </a:xfrm>
+          <a:prstGeom prst="rect">
+            <a:avLst/>
+          </a:prstGeom>
+        </p:spPr>
+      </p:pic>
+    </p:spTree>
+    <p:extLst>
+      <p:ext uri="{BB962C8B-B14F-4D97-AF65-F5344CB8AC3E}">
+        <p14:creationId xmlns:p14="http://schemas.microsoft.com/office/powerpoint/2010/main" val="4071831974"/>
+      </p:ext>
+    </p:extLst>
+  </p:cSld>
+  <p:clrMapOvr>
+    <a:masterClrMapping/>
+  </p:clrMapOvr>
+</p:sld>
+</file>
+
+<file path=ppt/slides/slide8.xml><?xml version="1.0" encoding="utf-8"?>
+<p:sld xmlns:a="http://schemas.openxmlformats.org/drawingml/2006/main" xmlns:r="http://schemas.openxmlformats.org/officeDocument/2006/relationships" xmlns:p="http://schemas.openxmlformats.org/presentationml/2006/main">
+  <p:cSld>
+    <p:spTree>
+      <p:nvGrpSpPr>
+        <p:cNvPr id="1" name=""/>
+        <p:cNvGrpSpPr/>
+        <p:nvPr/>
+      </p:nvGrpSpPr>
+      <p:grpSpPr>
+        <a:xfrm>
+          <a:off x="0" y="0"/>
+          <a:ext cx="0" cy="0"/>
+          <a:chOff x="0" y="0"/>
+          <a:chExt cx="0" cy="0"/>
+        </a:xfrm>
+      </p:grpSpPr>
+      <p:sp>
+        <p:nvSpPr>
+          <p:cNvPr id="11" name="Footer Placeholder 7">
+            <a:extLst>
+              <a:ext uri="{FF2B5EF4-FFF2-40B4-BE49-F238E27FC236}">
+                <a16:creationId xmlns:a16="http://schemas.microsoft.com/office/drawing/2014/main" id="{59E26047-BD3C-504E-B955-20FE5C8AA1AA}"/>
+              </a:ext>
+            </a:extLst>
+          </p:cNvPr>
+          <p:cNvSpPr>
+            <a:spLocks noGrp="1"/>
+          </p:cNvSpPr>
+          <p:nvPr>
+            <p:ph type="ftr" sz="quarter" idx="11"/>
+          </p:nvPr>
+        </p:nvSpPr>
+        <p:spPr>
+          <a:xfrm>
+            <a:off x="3686185" y="6459785"/>
+            <a:ext cx="4822804" cy="365125"/>
+          </a:xfrm>
+        </p:spPr>
+        <p:txBody>
+          <a:bodyPr/>
+          <a:lstStyle/>
+          <a:p>
+            <a:r>
+              <a:rPr lang="fi-FI"/>
+              <a:t>NTUA G. Bakas</a:t>
+            </a:r>
+            <a:endParaRPr lang="en-US" dirty="0"/>
+          </a:p>
+        </p:txBody>
+      </p:sp>
+      <p:sp>
+        <p:nvSpPr>
+          <p:cNvPr id="2" name="Slide Number Placeholder 1">
+            <a:extLst>
+              <a:ext uri="{FF2B5EF4-FFF2-40B4-BE49-F238E27FC236}">
+                <a16:creationId xmlns:a16="http://schemas.microsoft.com/office/drawing/2014/main" id="{2BDF07F2-8A31-6F41-9C54-4431125619C4}"/>
+              </a:ext>
+            </a:extLst>
+          </p:cNvPr>
+          <p:cNvSpPr>
+            <a:spLocks noGrp="1"/>
+          </p:cNvSpPr>
+          <p:nvPr>
+            <p:ph type="sldNum" sz="quarter" idx="12"/>
+          </p:nvPr>
+        </p:nvSpPr>
+        <p:spPr/>
+        <p:txBody>
+          <a:bodyPr/>
+          <a:lstStyle/>
+          <a:p>
+            <a:fld id="{4FAB73BC-B049-4115-A692-8D63A059BFB8}" type="slidenum">
+              <a:rPr lang="en-US" smtClean="0"/>
+              <a:pPr/>
+              <a:t>8</a:t>
+            </a:fld>
+            <a:endParaRPr lang="en-US" dirty="0"/>
+          </a:p>
+        </p:txBody>
+      </p:sp>
+      <p:sp>
+        <p:nvSpPr>
+          <p:cNvPr id="13" name="Date Placeholder 12">
+            <a:extLst>
+              <a:ext uri="{FF2B5EF4-FFF2-40B4-BE49-F238E27FC236}">
+                <a16:creationId xmlns:a16="http://schemas.microsoft.com/office/drawing/2014/main" id="{26FBEBE3-A9F2-CB4A-A555-BD1769498DB6}"/>
+              </a:ext>
+            </a:extLst>
+          </p:cNvPr>
+          <p:cNvSpPr>
+            <a:spLocks noGrp="1"/>
+          </p:cNvSpPr>
+          <p:nvPr>
+            <p:ph type="dt" sz="half" idx="10"/>
+          </p:nvPr>
+        </p:nvSpPr>
+        <p:spPr/>
+        <p:txBody>
+          <a:bodyPr/>
+          <a:lstStyle/>
+          <a:p>
+            <a:fld id="{863596AC-079A-914A-A4AA-F10BF720D55E}" type="datetime1">
+              <a:rPr lang="en-US" smtClean="0"/>
+              <a:t>1/10/20</a:t>
+            </a:fld>
+            <a:endParaRPr lang="en-US" dirty="0"/>
+          </a:p>
+        </p:txBody>
+      </p:sp>
+      <p:sp>
+        <p:nvSpPr>
+          <p:cNvPr id="32" name="Title 4">
+            <a:extLst>
+              <a:ext uri="{FF2B5EF4-FFF2-40B4-BE49-F238E27FC236}">
+                <a16:creationId xmlns:a16="http://schemas.microsoft.com/office/drawing/2014/main" id="{F99A7C50-63DB-A04F-B28D-F01966DF13E9}"/>
+              </a:ext>
+            </a:extLst>
+          </p:cNvPr>
+          <p:cNvSpPr txBox="1">
+            <a:spLocks/>
+          </p:cNvSpPr>
+          <p:nvPr/>
+        </p:nvSpPr>
+        <p:spPr>
+          <a:xfrm>
+            <a:off x="270168" y="118951"/>
+            <a:ext cx="6598766" cy="512916"/>
+          </a:xfrm>
+          <a:prstGeom prst="rect">
+            <a:avLst/>
+          </a:prstGeom>
+        </p:spPr>
+        <p:txBody>
+          <a:bodyPr vert="horz" lIns="91440" tIns="45720" rIns="91440" bIns="45720" rtlCol="0" anchor="b">
+            <a:noAutofit/>
+          </a:bodyPr>
+          <a:lstStyle>
+            <a:lvl1pPr algn="l" defTabSz="914400" rtl="0" eaLnBrk="1" latinLnBrk="0" hangingPunct="1">
+              <a:lnSpc>
+                <a:spcPct val="85000"/>
+              </a:lnSpc>
+              <a:spcBef>
+                <a:spcPct val="0"/>
+              </a:spcBef>
+              <a:buNone/>
+              <a:defRPr sz="4800" kern="1200" spc="-50" baseline="0">
+                <a:solidFill>
+                  <a:schemeClr val="tx1">
+                    <a:lumMod val="75000"/>
+                    <a:lumOff val="25000"/>
+                  </a:schemeClr>
+                </a:solidFill>
+                <a:latin typeface="+mj-lt"/>
+                <a:ea typeface="+mj-ea"/>
+                <a:cs typeface="+mj-cs"/>
+              </a:defRPr>
+            </a:lvl1pPr>
+          </a:lstStyle>
+          <a:p>
+            <a:r>
+              <a:rPr lang="en-GB" sz="2800" u="sng" dirty="0"/>
+              <a:t>Efficiency And Acceptance for all years</a:t>
+            </a:r>
+          </a:p>
+        </p:txBody>
+      </p:sp>
+      <p:pic>
+        <p:nvPicPr>
+          <p:cNvPr id="4" name="Picture 3">
+            <a:extLst>
+              <a:ext uri="{FF2B5EF4-FFF2-40B4-BE49-F238E27FC236}">
+                <a16:creationId xmlns:a16="http://schemas.microsoft.com/office/drawing/2014/main" id="{5D2EC405-B3A3-2F42-B642-F30A101E86C4}"/>
+              </a:ext>
+            </a:extLst>
+          </p:cNvPr>
+          <p:cNvPicPr>
+            <a:picLocks noChangeAspect="1"/>
+          </p:cNvPicPr>
+          <p:nvPr/>
+        </p:nvPicPr>
+        <p:blipFill>
+          <a:blip r:embed="rId2"/>
+          <a:stretch>
+            <a:fillRect/>
+          </a:stretch>
+        </p:blipFill>
+        <p:spPr>
+          <a:xfrm rot="5400000">
+            <a:off x="539750" y="222505"/>
+            <a:ext cx="5041265" cy="6120765"/>
+          </a:xfrm>
+          <a:prstGeom prst="rect">
+            <a:avLst/>
+          </a:prstGeom>
+        </p:spPr>
+      </p:pic>
+      <p:pic>
+        <p:nvPicPr>
+          <p:cNvPr id="6" name="Picture 5">
+            <a:extLst>
+              <a:ext uri="{FF2B5EF4-FFF2-40B4-BE49-F238E27FC236}">
+                <a16:creationId xmlns:a16="http://schemas.microsoft.com/office/drawing/2014/main" id="{141417D6-A163-8F48-A9DC-24BA0F3D84ED}"/>
+              </a:ext>
+            </a:extLst>
+          </p:cNvPr>
+          <p:cNvPicPr>
+            <a:picLocks noChangeAspect="1"/>
+          </p:cNvPicPr>
+          <p:nvPr/>
+        </p:nvPicPr>
+        <p:blipFill>
+          <a:blip r:embed="rId3"/>
+          <a:stretch>
+            <a:fillRect/>
+          </a:stretch>
+        </p:blipFill>
+        <p:spPr>
+          <a:xfrm rot="5400000">
+            <a:off x="6610985" y="222505"/>
+            <a:ext cx="5041265" cy="6120765"/>
           </a:xfrm>
           <a:prstGeom prst="rect">
             <a:avLst/>
@@ -9294,7 +12978,7 @@
 </p:sld>
 </file>
 
-<file path=ppt/slides/slide5.xml><?xml version="1.0" encoding="utf-8"?>
+<file path=ppt/slides/slide9.xml><?xml version="1.0" encoding="utf-8"?>
 <p:sld xmlns:a="http://schemas.openxmlformats.org/drawingml/2006/main" xmlns:r="http://schemas.openxmlformats.org/officeDocument/2006/relationships" xmlns:p="http://schemas.openxmlformats.org/presentationml/2006/main">
   <p:cSld>
     <p:spTree>
@@ -10001,7 +13685,7 @@
         <p:spPr>
           <a:xfrm>
             <a:off x="3731101" y="2586299"/>
-            <a:ext cx="1543143" cy="552899"/>
+            <a:ext cx="1543143" cy="842701"/>
           </a:xfrm>
           <a:prstGeom prst="wedgeRoundRectCallout">
             <a:avLst>
@@ -10059,7 +13743,7 @@
         <p:spPr>
           <a:xfrm>
             <a:off x="3731101" y="2702941"/>
-            <a:ext cx="1604306" cy="369332"/>
+            <a:ext cx="1604306" cy="646331"/>
           </a:xfrm>
           <a:prstGeom prst="rect">
             <a:avLst/>
@@ -10078,7 +13762,7 @@
                   <a:srgbClr val="00B050"/>
                 </a:solidFill>
               </a:rPr>
-              <a:t>ABCD Method</a:t>
+              <a:t>Mass Fit in 2btag region</a:t>
             </a:r>
           </a:p>
         </p:txBody>
@@ -10477,7 +14161,7 @@
             <a:fld id="{4FAB73BC-B049-4115-A692-8D63A059BFB8}" type="slidenum">
               <a:rPr lang="en-US" smtClean="0"/>
               <a:pPr/>
-              <a:t>5</a:t>
+              <a:t>9</a:t>
             </a:fld>
             <a:endParaRPr lang="en-US" dirty="0"/>
           </a:p>
@@ -11870,7 +15554,7 @@
           <a:p>
             <a:fld id="{A495A033-A54B-4F41-92C4-F7053274BB0C}" type="datetime1">
               <a:rPr lang="en-US" smtClean="0"/>
-              <a:t>1/9/20</a:t>
+              <a:t>1/10/20</a:t>
             </a:fld>
             <a:endParaRPr lang="en-US" dirty="0"/>
           </a:p>

</xml_diff>

<commit_message>
Changed my code for 2016, 2016_Loose because we need to use the control trigger for the control region which has no btagging requirement unlike our Signal trigger which has b-tagging
</commit_message>
<xml_diff>
--- a/Weekly Meetings/HEP_Weekly_10January2020.pptx
+++ b/Weekly Meetings/HEP_Weekly_10January2020.pptx
@@ -6,10 +6,10 @@
     <p:sldMasterId id="2147483661" r:id="rId2"/>
   </p:sldMasterIdLst>
   <p:notesMasterIdLst>
-    <p:notesMasterId r:id="rId14"/>
+    <p:notesMasterId r:id="rId15"/>
   </p:notesMasterIdLst>
   <p:handoutMasterIdLst>
-    <p:handoutMasterId r:id="rId15"/>
+    <p:handoutMasterId r:id="rId16"/>
   </p:handoutMasterIdLst>
   <p:sldIdLst>
     <p:sldId id="256" r:id="rId3"/>
@@ -23,6 +23,7 @@
     <p:sldId id="512" r:id="rId11"/>
     <p:sldId id="518" r:id="rId12"/>
     <p:sldId id="519" r:id="rId13"/>
+    <p:sldId id="520" r:id="rId14"/>
   </p:sldIdLst>
   <p:sldSz cx="12192000" cy="6858000"/>
   <p:notesSz cx="6858000" cy="9144000"/>
@@ -7483,7 +7484,7 @@
             </a:br>
             <a:r>
               <a:rPr lang="en-US" sz="4400" dirty="0"/>
-              <a:t>13/12/2019</a:t>
+              <a:t>10/1/2020</a:t>
             </a:r>
             <a:endParaRPr lang="en-GB" sz="4400" dirty="0"/>
           </a:p>
@@ -8593,6 +8594,326 @@
 </p:sld>
 </file>
 
+<file path=ppt/slides/slide12.xml><?xml version="1.0" encoding="utf-8"?>
+<p:sld xmlns:a="http://schemas.openxmlformats.org/drawingml/2006/main" xmlns:r="http://schemas.openxmlformats.org/officeDocument/2006/relationships" xmlns:p="http://schemas.openxmlformats.org/presentationml/2006/main">
+  <p:cSld>
+    <p:spTree>
+      <p:nvGrpSpPr>
+        <p:cNvPr id="1" name=""/>
+        <p:cNvGrpSpPr/>
+        <p:nvPr/>
+      </p:nvGrpSpPr>
+      <p:grpSpPr>
+        <a:xfrm>
+          <a:off x="0" y="0"/>
+          <a:ext cx="0" cy="0"/>
+          <a:chOff x="0" y="0"/>
+          <a:chExt cx="0" cy="0"/>
+        </a:xfrm>
+      </p:grpSpPr>
+      <p:sp>
+        <p:nvSpPr>
+          <p:cNvPr id="11" name="Footer Placeholder 7">
+            <a:extLst>
+              <a:ext uri="{FF2B5EF4-FFF2-40B4-BE49-F238E27FC236}">
+                <a16:creationId xmlns:a16="http://schemas.microsoft.com/office/drawing/2014/main" id="{59E26047-BD3C-504E-B955-20FE5C8AA1AA}"/>
+              </a:ext>
+            </a:extLst>
+          </p:cNvPr>
+          <p:cNvSpPr>
+            <a:spLocks noGrp="1"/>
+          </p:cNvSpPr>
+          <p:nvPr>
+            <p:ph type="ftr" sz="quarter" idx="11"/>
+          </p:nvPr>
+        </p:nvSpPr>
+        <p:spPr>
+          <a:xfrm>
+            <a:off x="3686185" y="6459785"/>
+            <a:ext cx="4822804" cy="365125"/>
+          </a:xfrm>
+        </p:spPr>
+        <p:txBody>
+          <a:bodyPr/>
+          <a:lstStyle/>
+          <a:p>
+            <a:r>
+              <a:rPr lang="fi-FI"/>
+              <a:t>NTUA G. Bakas</a:t>
+            </a:r>
+            <a:endParaRPr lang="en-US" dirty="0"/>
+          </a:p>
+        </p:txBody>
+      </p:sp>
+      <p:sp>
+        <p:nvSpPr>
+          <p:cNvPr id="2" name="Slide Number Placeholder 1">
+            <a:extLst>
+              <a:ext uri="{FF2B5EF4-FFF2-40B4-BE49-F238E27FC236}">
+                <a16:creationId xmlns:a16="http://schemas.microsoft.com/office/drawing/2014/main" id="{2BDF07F2-8A31-6F41-9C54-4431125619C4}"/>
+              </a:ext>
+            </a:extLst>
+          </p:cNvPr>
+          <p:cNvSpPr>
+            <a:spLocks noGrp="1"/>
+          </p:cNvSpPr>
+          <p:nvPr>
+            <p:ph type="sldNum" sz="quarter" idx="12"/>
+          </p:nvPr>
+        </p:nvSpPr>
+        <p:spPr/>
+        <p:txBody>
+          <a:bodyPr/>
+          <a:lstStyle/>
+          <a:p>
+            <a:fld id="{4FAB73BC-B049-4115-A692-8D63A059BFB8}" type="slidenum">
+              <a:rPr lang="en-US" smtClean="0"/>
+              <a:pPr/>
+              <a:t>12</a:t>
+            </a:fld>
+            <a:endParaRPr lang="en-US" dirty="0"/>
+          </a:p>
+        </p:txBody>
+      </p:sp>
+      <p:sp>
+        <p:nvSpPr>
+          <p:cNvPr id="13" name="Date Placeholder 12">
+            <a:extLst>
+              <a:ext uri="{FF2B5EF4-FFF2-40B4-BE49-F238E27FC236}">
+                <a16:creationId xmlns:a16="http://schemas.microsoft.com/office/drawing/2014/main" id="{26FBEBE3-A9F2-CB4A-A555-BD1769498DB6}"/>
+              </a:ext>
+            </a:extLst>
+          </p:cNvPr>
+          <p:cNvSpPr>
+            <a:spLocks noGrp="1"/>
+          </p:cNvSpPr>
+          <p:nvPr>
+            <p:ph type="dt" sz="half" idx="10"/>
+          </p:nvPr>
+        </p:nvSpPr>
+        <p:spPr/>
+        <p:txBody>
+          <a:bodyPr/>
+          <a:lstStyle/>
+          <a:p>
+            <a:fld id="{863596AC-079A-914A-A4AA-F10BF720D55E}" type="datetime1">
+              <a:rPr lang="en-US" smtClean="0"/>
+              <a:t>1/10/20</a:t>
+            </a:fld>
+            <a:endParaRPr lang="en-US" dirty="0"/>
+          </a:p>
+        </p:txBody>
+      </p:sp>
+      <p:sp>
+        <p:nvSpPr>
+          <p:cNvPr id="32" name="Title 4">
+            <a:extLst>
+              <a:ext uri="{FF2B5EF4-FFF2-40B4-BE49-F238E27FC236}">
+                <a16:creationId xmlns:a16="http://schemas.microsoft.com/office/drawing/2014/main" id="{F99A7C50-63DB-A04F-B28D-F01966DF13E9}"/>
+              </a:ext>
+            </a:extLst>
+          </p:cNvPr>
+          <p:cNvSpPr txBox="1">
+            <a:spLocks/>
+          </p:cNvSpPr>
+          <p:nvPr/>
+        </p:nvSpPr>
+        <p:spPr>
+          <a:xfrm>
+            <a:off x="140550" y="33090"/>
+            <a:ext cx="6598766" cy="512916"/>
+          </a:xfrm>
+          <a:prstGeom prst="rect">
+            <a:avLst/>
+          </a:prstGeom>
+        </p:spPr>
+        <p:txBody>
+          <a:bodyPr vert="horz" lIns="91440" tIns="45720" rIns="91440" bIns="45720" rtlCol="0" anchor="b">
+            <a:noAutofit/>
+          </a:bodyPr>
+          <a:lstStyle>
+            <a:lvl1pPr algn="l" defTabSz="914400" rtl="0" eaLnBrk="1" latinLnBrk="0" hangingPunct="1">
+              <a:lnSpc>
+                <a:spcPct val="85000"/>
+              </a:lnSpc>
+              <a:spcBef>
+                <a:spcPct val="0"/>
+              </a:spcBef>
+              <a:buNone/>
+              <a:defRPr sz="4800" kern="1200" spc="-50" baseline="0">
+                <a:solidFill>
+                  <a:schemeClr val="tx1">
+                    <a:lumMod val="75000"/>
+                    <a:lumOff val="25000"/>
+                  </a:schemeClr>
+                </a:solidFill>
+                <a:latin typeface="+mj-lt"/>
+                <a:ea typeface="+mj-ea"/>
+                <a:cs typeface="+mj-cs"/>
+              </a:defRPr>
+            </a:lvl1pPr>
+          </a:lstStyle>
+          <a:p>
+            <a:r>
+              <a:rPr lang="en-GB" sz="2800" u="sng" dirty="0"/>
+              <a:t>Transfer Factors (both Data and Closure tests)</a:t>
+            </a:r>
+          </a:p>
+        </p:txBody>
+      </p:sp>
+      <p:pic>
+        <p:nvPicPr>
+          <p:cNvPr id="16" name="Picture 15">
+            <a:extLst>
+              <a:ext uri="{FF2B5EF4-FFF2-40B4-BE49-F238E27FC236}">
+                <a16:creationId xmlns:a16="http://schemas.microsoft.com/office/drawing/2014/main" id="{05F8B4D1-CC3D-1B45-8C3D-CC21B327374D}"/>
+              </a:ext>
+            </a:extLst>
+          </p:cNvPr>
+          <p:cNvPicPr>
+            <a:picLocks noChangeAspect="1"/>
+          </p:cNvPicPr>
+          <p:nvPr/>
+        </p:nvPicPr>
+        <p:blipFill>
+          <a:blip r:embed="rId2"/>
+          <a:stretch>
+            <a:fillRect/>
+          </a:stretch>
+        </p:blipFill>
+        <p:spPr>
+          <a:xfrm rot="5400000">
+            <a:off x="7047992" y="551412"/>
+            <a:ext cx="4311269" cy="5976747"/>
+          </a:xfrm>
+          <a:prstGeom prst="rect">
+            <a:avLst/>
+          </a:prstGeom>
+        </p:spPr>
+      </p:pic>
+      <p:pic>
+        <p:nvPicPr>
+          <p:cNvPr id="18" name="Picture 17">
+            <a:extLst>
+              <a:ext uri="{FF2B5EF4-FFF2-40B4-BE49-F238E27FC236}">
+                <a16:creationId xmlns:a16="http://schemas.microsoft.com/office/drawing/2014/main" id="{77B620CE-5B0E-F247-8B07-CD2EC28DC27B}"/>
+              </a:ext>
+            </a:extLst>
+          </p:cNvPr>
+          <p:cNvPicPr>
+            <a:picLocks noChangeAspect="1"/>
+          </p:cNvPicPr>
+          <p:nvPr/>
+        </p:nvPicPr>
+        <p:blipFill>
+          <a:blip r:embed="rId3"/>
+          <a:stretch>
+            <a:fillRect/>
+          </a:stretch>
+        </p:blipFill>
+        <p:spPr>
+          <a:xfrm rot="5400000">
+            <a:off x="973289" y="551412"/>
+            <a:ext cx="4311269" cy="5976747"/>
+          </a:xfrm>
+          <a:prstGeom prst="rect">
+            <a:avLst/>
+          </a:prstGeom>
+        </p:spPr>
+      </p:pic>
+      <p:sp>
+        <p:nvSpPr>
+          <p:cNvPr id="19" name="TextBox 18">
+            <a:extLst>
+              <a:ext uri="{FF2B5EF4-FFF2-40B4-BE49-F238E27FC236}">
+                <a16:creationId xmlns:a16="http://schemas.microsoft.com/office/drawing/2014/main" id="{3F0DD397-E665-5243-AB44-3A16D45C3678}"/>
+              </a:ext>
+            </a:extLst>
+          </p:cNvPr>
+          <p:cNvSpPr txBox="1"/>
+          <p:nvPr/>
+        </p:nvSpPr>
+        <p:spPr>
+          <a:xfrm>
+            <a:off x="2787141" y="849234"/>
+            <a:ext cx="683564" cy="369332"/>
+          </a:xfrm>
+          <a:prstGeom prst="rect">
+            <a:avLst/>
+          </a:prstGeom>
+          <a:noFill/>
+        </p:spPr>
+        <p:txBody>
+          <a:bodyPr wrap="square" rtlCol="0">
+            <a:spAutoFit/>
+          </a:bodyPr>
+          <a:lstStyle/>
+          <a:p>
+            <a:pPr algn="ctr"/>
+            <a:r>
+              <a:rPr lang="en-US" dirty="0">
+                <a:solidFill>
+                  <a:srgbClr val="FF0000"/>
+                </a:solidFill>
+              </a:rPr>
+              <a:t>Data</a:t>
+            </a:r>
+          </a:p>
+        </p:txBody>
+      </p:sp>
+      <p:sp>
+        <p:nvSpPr>
+          <p:cNvPr id="21" name="TextBox 20">
+            <a:extLst>
+              <a:ext uri="{FF2B5EF4-FFF2-40B4-BE49-F238E27FC236}">
+                <a16:creationId xmlns:a16="http://schemas.microsoft.com/office/drawing/2014/main" id="{12E65AD5-FE9C-F948-9BAE-C77FEE965A43}"/>
+              </a:ext>
+            </a:extLst>
+          </p:cNvPr>
+          <p:cNvSpPr txBox="1"/>
+          <p:nvPr/>
+        </p:nvSpPr>
+        <p:spPr>
+          <a:xfrm>
+            <a:off x="8341029" y="843942"/>
+            <a:ext cx="1725194" cy="369332"/>
+          </a:xfrm>
+          <a:prstGeom prst="rect">
+            <a:avLst/>
+          </a:prstGeom>
+          <a:noFill/>
+        </p:spPr>
+        <p:txBody>
+          <a:bodyPr wrap="square" rtlCol="0">
+            <a:spAutoFit/>
+          </a:bodyPr>
+          <a:lstStyle/>
+          <a:p>
+            <a:pPr algn="ctr"/>
+            <a:r>
+              <a:rPr lang="en-US" dirty="0">
+                <a:solidFill>
+                  <a:srgbClr val="FF0000"/>
+                </a:solidFill>
+              </a:rPr>
+              <a:t>MC Closure Test</a:t>
+            </a:r>
+          </a:p>
+        </p:txBody>
+      </p:sp>
+    </p:spTree>
+    <p:extLst>
+      <p:ext uri="{BB962C8B-B14F-4D97-AF65-F5344CB8AC3E}">
+        <p14:creationId xmlns:p14="http://schemas.microsoft.com/office/powerpoint/2010/main" val="133380416"/>
+      </p:ext>
+    </p:extLst>
+  </p:cSld>
+  <p:clrMapOvr>
+    <a:masterClrMapping/>
+  </p:clrMapOvr>
+</p:sld>
+</file>
+
 <file path=ppt/slides/slide2.xml><?xml version="1.0" encoding="utf-8"?>
 <p:sld xmlns:a="http://schemas.openxmlformats.org/drawingml/2006/main" xmlns:r="http://schemas.openxmlformats.org/officeDocument/2006/relationships" xmlns:p="http://schemas.openxmlformats.org/presentationml/2006/main">
   <p:cSld>
@@ -8666,766 +8987,338 @@
           </a:p>
         </p:txBody>
       </p:sp>
-      <mc:AlternateContent xmlns:mc="http://schemas.openxmlformats.org/markup-compatibility/2006" xmlns:a14="http://schemas.microsoft.com/office/drawing/2010/main">
-        <mc:Choice Requires="a14">
-          <p:sp>
-            <p:nvSpPr>
-              <p:cNvPr id="6" name="TextBox 5">
-                <a:extLst>
-                  <a:ext uri="{FF2B5EF4-FFF2-40B4-BE49-F238E27FC236}">
-                    <a16:creationId xmlns:a16="http://schemas.microsoft.com/office/drawing/2014/main" id="{1DDE6F7F-FC19-F840-A70E-C84BA99E0247}"/>
-                  </a:ext>
-                </a:extLst>
-              </p:cNvPr>
-              <p:cNvSpPr txBox="1"/>
-              <p:nvPr/>
-            </p:nvSpPr>
-            <p:spPr>
-              <a:xfrm>
-                <a:off x="111965" y="717334"/>
-                <a:ext cx="11783048" cy="6195992"/>
-              </a:xfrm>
-              <a:prstGeom prst="rect">
-                <a:avLst/>
-              </a:prstGeom>
-              <a:noFill/>
-            </p:spPr>
-            <p:txBody>
-              <a:bodyPr wrap="square" rtlCol="0">
-                <a:spAutoFit/>
-              </a:bodyPr>
-              <a:lstStyle/>
-              <a:p>
-                <a:pPr marL="285750" indent="-285750">
-                  <a:buFont typeface="Arial" panose="020B0604020202020204" pitchFamily="34" charset="0"/>
-                  <a:buChar char="•"/>
-                </a:pPr>
-                <a:r>
-                  <a:rPr lang="en-US" dirty="0"/>
-                  <a:t>Analysis:</a:t>
-                </a:r>
-              </a:p>
-              <a:p>
-                <a:pPr marL="742950" lvl="1" indent="-285750">
-                  <a:buFont typeface="Arial" panose="020B0604020202020204" pitchFamily="34" charset="0"/>
-                  <a:buChar char="•"/>
-                </a:pPr>
-                <a:r>
-                  <a:rPr lang="en-US" dirty="0"/>
-                  <a:t>Method we are using is not </a:t>
-                </a:r>
-                <a:r>
-                  <a:rPr lang="en-US" dirty="0" err="1"/>
-                  <a:t>efficienct</a:t>
-                </a:r>
-                <a:endParaRPr lang="en-US" dirty="0"/>
-              </a:p>
-              <a:p>
-                <a:pPr marL="742950" lvl="1" indent="-285750">
-                  <a:buFont typeface="Arial" panose="020B0604020202020204" pitchFamily="34" charset="0"/>
-                  <a:buChar char="•"/>
-                </a:pPr>
-                <a:r>
-                  <a:rPr lang="en-US" dirty="0"/>
-                  <a:t>Looser b-tag WP</a:t>
-                </a:r>
-                <a:r>
-                  <a:rPr lang="en-US" dirty="0">
-                    <a:sym typeface="Wingdings" pitchFamily="2" charset="2"/>
-                  </a:rPr>
-                  <a:t> Less ttbar contamination in CR (?)</a:t>
-                </a:r>
-              </a:p>
-              <a:p>
-                <a:pPr marL="1200150" lvl="2" indent="-285750">
-                  <a:buFont typeface="Arial" panose="020B0604020202020204" pitchFamily="34" charset="0"/>
-                  <a:buChar char="•"/>
-                </a:pPr>
-                <a:r>
-                  <a:rPr lang="en-US" dirty="0">
-                    <a:sym typeface="Wingdings" pitchFamily="2" charset="2"/>
-                  </a:rPr>
-                  <a:t>We need to re-do preparation to check how the looser b-tag WP responds to out analysis</a:t>
-                </a:r>
-              </a:p>
-              <a:p>
-                <a:pPr marL="1200150" lvl="2" indent="-285750">
-                  <a:buFont typeface="Arial" panose="020B0604020202020204" pitchFamily="34" charset="0"/>
-                  <a:buChar char="•"/>
-                </a:pPr>
-                <a:r>
-                  <a:rPr lang="en-US" dirty="0">
-                    <a:sym typeface="Wingdings" pitchFamily="2" charset="2"/>
-                  </a:rPr>
-                  <a:t>Efficiency/Acceptance ✓</a:t>
-                </a:r>
-              </a:p>
-              <a:p>
-                <a:pPr marL="1200150" lvl="2" indent="-285750">
-                  <a:buFont typeface="Arial" panose="020B0604020202020204" pitchFamily="34" charset="0"/>
-                  <a:buChar char="•"/>
-                </a:pPr>
-                <a:r>
-                  <a:rPr lang="en-US" dirty="0">
-                    <a:sym typeface="Wingdings" pitchFamily="2" charset="2"/>
-                  </a:rPr>
-                  <a:t>QCD Closure tests and ttbar Contamination ✓</a:t>
-                </a:r>
-              </a:p>
-              <a:p>
-                <a:pPr marL="1200150" lvl="2" indent="-285750">
-                  <a:buFont typeface="Arial" panose="020B0604020202020204" pitchFamily="34" charset="0"/>
-                  <a:buChar char="•"/>
-                </a:pPr>
-                <a:r>
-                  <a:rPr lang="en-US" dirty="0">
-                    <a:sym typeface="Wingdings" pitchFamily="2" charset="2"/>
-                  </a:rPr>
-                  <a:t>Response matrices ✓</a:t>
-                </a:r>
-              </a:p>
-              <a:p>
-                <a:pPr marL="1200150" lvl="2" indent="-285750">
-                  <a:buFont typeface="Arial" panose="020B0604020202020204" pitchFamily="34" charset="0"/>
-                  <a:buChar char="•"/>
-                </a:pPr>
-                <a:r>
-                  <a:rPr lang="en-US" dirty="0">
-                    <a:sym typeface="Wingdings" pitchFamily="2" charset="2"/>
-                  </a:rPr>
-                  <a:t>Mass Fit results </a:t>
-                </a:r>
-                <a:r>
-                  <a:rPr lang="en-US" dirty="0">
-                    <a:solidFill>
-                      <a:srgbClr val="FF0000"/>
-                    </a:solidFill>
-                    <a:sym typeface="Wingdings" pitchFamily="2" charset="2"/>
-                  </a:rPr>
-                  <a:t>𝙭</a:t>
-                </a:r>
-              </a:p>
-              <a:p>
-                <a:pPr marL="1657350" lvl="3" indent="-285750">
-                  <a:buFont typeface="Arial" panose="020B0604020202020204" pitchFamily="34" charset="0"/>
-                  <a:buChar char="•"/>
-                </a:pPr>
-                <a:r>
-                  <a:rPr lang="en-US" dirty="0">
-                    <a:solidFill>
-                      <a:srgbClr val="FF0000"/>
-                    </a:solidFill>
-                    <a:sym typeface="Wingdings" pitchFamily="2" charset="2"/>
-                  </a:rPr>
-                  <a:t>Simultaneous fit is not performing well</a:t>
-                </a:r>
-              </a:p>
-              <a:p>
-                <a:pPr marL="1657350" lvl="3" indent="-285750">
-                  <a:buFont typeface="Arial" panose="020B0604020202020204" pitchFamily="34" charset="0"/>
-                  <a:buChar char="•"/>
-                </a:pPr>
-                <a:r>
-                  <a:rPr lang="en-US" dirty="0">
-                    <a:sym typeface="Wingdings" pitchFamily="2" charset="2"/>
-                  </a:rPr>
-                  <a:t>Signal and </a:t>
-                </a:r>
-                <a:r>
-                  <a:rPr lang="en-US" dirty="0" err="1">
-                    <a:sym typeface="Wingdings" pitchFamily="2" charset="2"/>
-                  </a:rPr>
-                  <a:t>bkg</a:t>
-                </a:r>
-                <a:r>
-                  <a:rPr lang="en-US" dirty="0">
-                    <a:sym typeface="Wingdings" pitchFamily="2" charset="2"/>
-                  </a:rPr>
-                  <a:t> templates are ok </a:t>
-                </a:r>
-                <a:endParaRPr lang="el-GR" dirty="0">
-                  <a:sym typeface="Wingdings" pitchFamily="2" charset="2"/>
-                </a:endParaRPr>
-              </a:p>
-              <a:p>
-                <a:pPr marL="742950" lvl="1" indent="-285750">
-                  <a:buFont typeface="Arial" panose="020B0604020202020204" pitchFamily="34" charset="0"/>
-                  <a:buChar char="•"/>
-                </a:pPr>
-                <a:r>
-                  <a:rPr lang="en-US" dirty="0">
-                    <a:sym typeface="Wingdings" pitchFamily="2" charset="2"/>
-                  </a:rPr>
-                  <a:t>In order to compare our results with theoretical </a:t>
-                </a:r>
-                <a:r>
-                  <a:rPr lang="en-US" dirty="0" err="1">
-                    <a:sym typeface="Wingdings" pitchFamily="2" charset="2"/>
-                  </a:rPr>
-                  <a:t>parton</a:t>
-                </a:r>
-                <a:r>
-                  <a:rPr lang="en-US" dirty="0">
-                    <a:sym typeface="Wingdings" pitchFamily="2" charset="2"/>
-                  </a:rPr>
-                  <a:t>/particle results  Nominal MC and not High </a:t>
-                </a:r>
-                <a:r>
-                  <a:rPr lang="en-US" dirty="0" err="1">
-                    <a:sym typeface="Wingdings" pitchFamily="2" charset="2"/>
-                  </a:rPr>
-                  <a:t>Mtt</a:t>
-                </a:r>
-                <a:r>
-                  <a:rPr lang="en-US" dirty="0">
-                    <a:sym typeface="Wingdings" pitchFamily="2" charset="2"/>
-                  </a:rPr>
-                  <a:t> samples</a:t>
-                </a:r>
-                <a:endParaRPr lang="en-US" dirty="0"/>
-              </a:p>
-              <a:p>
-                <a:pPr marL="285750" indent="-285750">
-                  <a:buFont typeface="Arial" panose="020B0604020202020204" pitchFamily="34" charset="0"/>
-                  <a:buChar char="•"/>
-                </a:pPr>
-                <a:r>
-                  <a:rPr lang="en-US" dirty="0"/>
-                  <a:t>Unfolding</a:t>
-                </a:r>
-              </a:p>
-              <a:p>
-                <a:pPr marL="742950" lvl="1" indent="-285750">
-                  <a:buFont typeface="Arial" panose="020B0604020202020204" pitchFamily="34" charset="0"/>
-                  <a:buChar char="•"/>
-                </a:pPr>
-                <a:r>
-                  <a:rPr lang="en-US" dirty="0"/>
-                  <a:t>Response Matrices where </a:t>
-                </a:r>
-                <a:r>
-                  <a:rPr lang="en-US" dirty="0" err="1"/>
-                  <a:t>Nbins</a:t>
-                </a:r>
-                <a:r>
-                  <a:rPr lang="en-US" dirty="0"/>
-                  <a:t> </a:t>
-                </a:r>
-                <a:r>
-                  <a:rPr lang="en-US" dirty="0" err="1"/>
-                  <a:t>Reco</a:t>
-                </a:r>
-                <a:r>
-                  <a:rPr lang="en-US" dirty="0"/>
-                  <a:t> ~ 2Nbins Parton/Particle</a:t>
-                </a:r>
-              </a:p>
-              <a:p>
-                <a:pPr marL="742950" lvl="1" indent="-285750">
-                  <a:buFont typeface="Arial" panose="020B0604020202020204" pitchFamily="34" charset="0"/>
-                  <a:buChar char="•"/>
-                </a:pPr>
-                <a:r>
-                  <a:rPr lang="en-US" dirty="0">
-                    <a:sym typeface="Wingdings" pitchFamily="2" charset="2"/>
-                  </a:rPr>
-                  <a:t>Unfolding to </a:t>
-                </a:r>
-                <a:r>
-                  <a:rPr lang="en-US" dirty="0" err="1">
-                    <a:sym typeface="Wingdings" pitchFamily="2" charset="2"/>
-                  </a:rPr>
-                  <a:t>parton</a:t>
-                </a:r>
-                <a:r>
-                  <a:rPr lang="en-US" dirty="0">
-                    <a:sym typeface="Wingdings" pitchFamily="2" charset="2"/>
-                  </a:rPr>
-                  <a:t> and particle level</a:t>
-                </a:r>
-              </a:p>
-              <a:p>
-                <a:pPr marL="1200150" lvl="2" indent="-285750">
-                  <a:buFont typeface="Arial" panose="020B0604020202020204" pitchFamily="34" charset="0"/>
-                  <a:buChar char="•"/>
-                </a:pPr>
-                <a:r>
-                  <a:rPr lang="en-US" dirty="0"/>
-                  <a:t>For a number of regularization parameters tau do the unfolding and find the average global correlation</a:t>
-                </a:r>
-              </a:p>
-              <a:p>
-                <a:pPr marL="1200150" lvl="2" indent="-285750">
-                  <a:buFont typeface="Arial" panose="020B0604020202020204" pitchFamily="34" charset="0"/>
-                  <a:buChar char="•"/>
-                </a:pPr>
-                <a14:m>
-                  <m:oMath xmlns:m="http://schemas.openxmlformats.org/officeDocument/2006/math">
-                    <m:sSub>
-                      <m:sSubPr>
-                        <m:ctrlPr>
-                          <a:rPr lang="el-GR" b="0" i="1" smtClean="0">
-                            <a:latin typeface="Cambria Math" panose="02040503050406030204" pitchFamily="18" charset="0"/>
-                          </a:rPr>
-                        </m:ctrlPr>
-                      </m:sSubPr>
-                      <m:e>
-                        <m:r>
-                          <a:rPr lang="el-GR" b="0" i="1" smtClean="0">
-                            <a:latin typeface="Cambria Math" panose="02040503050406030204" pitchFamily="18" charset="0"/>
-                          </a:rPr>
-                          <m:t>𝜌</m:t>
-                        </m:r>
-                      </m:e>
-                      <m:sub>
-                        <m:r>
-                          <a:rPr lang="en-US" b="0" i="1" smtClean="0">
-                            <a:latin typeface="Cambria Math" panose="02040503050406030204" pitchFamily="18" charset="0"/>
-                          </a:rPr>
-                          <m:t>𝑗</m:t>
-                        </m:r>
-                      </m:sub>
-                    </m:sSub>
-                    <m:r>
-                      <a:rPr lang="en-US" b="0" i="1" smtClean="0">
-                        <a:latin typeface="Cambria Math" panose="02040503050406030204" pitchFamily="18" charset="0"/>
-                      </a:rPr>
-                      <m:t>= </m:t>
-                    </m:r>
-                    <m:rad>
-                      <m:radPr>
-                        <m:degHide m:val="on"/>
-                        <m:ctrlPr>
-                          <a:rPr lang="en-US" b="0" i="1" smtClean="0">
-                            <a:latin typeface="Cambria Math" panose="02040503050406030204" pitchFamily="18" charset="0"/>
-                          </a:rPr>
-                        </m:ctrlPr>
-                      </m:radPr>
-                      <m:deg/>
-                      <m:e>
-                        <m:r>
-                          <a:rPr lang="en-US" b="0" i="1" smtClean="0">
-                            <a:latin typeface="Cambria Math" panose="02040503050406030204" pitchFamily="18" charset="0"/>
-                          </a:rPr>
-                          <m:t>1 −</m:t>
-                        </m:r>
-                        <m:sSup>
-                          <m:sSupPr>
-                            <m:ctrlPr>
-                              <a:rPr lang="en-US" b="0" i="1" smtClean="0">
-                                <a:latin typeface="Cambria Math" panose="02040503050406030204" pitchFamily="18" charset="0"/>
-                              </a:rPr>
-                            </m:ctrlPr>
-                          </m:sSupPr>
-                          <m:e>
-                            <m:d>
-                              <m:dPr>
-                                <m:begChr m:val="["/>
-                                <m:endChr m:val="]"/>
-                                <m:ctrlPr>
-                                  <a:rPr lang="en-US" b="0" i="1" smtClean="0">
-                                    <a:latin typeface="Cambria Math" panose="02040503050406030204" pitchFamily="18" charset="0"/>
-                                  </a:rPr>
-                                </m:ctrlPr>
-                              </m:dPr>
-                              <m:e>
-                                <m:sSub>
-                                  <m:sSubPr>
-                                    <m:ctrlPr>
-                                      <a:rPr lang="en-US" b="0" i="1" smtClean="0">
-                                        <a:latin typeface="Cambria Math" panose="02040503050406030204" pitchFamily="18" charset="0"/>
-                                      </a:rPr>
-                                    </m:ctrlPr>
-                                  </m:sSubPr>
-                                  <m:e>
-                                    <m:d>
-                                      <m:dPr>
-                                        <m:ctrlPr>
-                                          <a:rPr lang="en-US" b="0" i="1" smtClean="0">
-                                            <a:latin typeface="Cambria Math" panose="02040503050406030204" pitchFamily="18" charset="0"/>
-                                          </a:rPr>
-                                        </m:ctrlPr>
-                                      </m:dPr>
-                                      <m:e>
-                                        <m:sSub>
-                                          <m:sSubPr>
-                                            <m:ctrlPr>
-                                              <a:rPr lang="en-US" b="0" i="1" smtClean="0">
-                                                <a:latin typeface="Cambria Math" panose="02040503050406030204" pitchFamily="18" charset="0"/>
-                                              </a:rPr>
-                                            </m:ctrlPr>
-                                          </m:sSubPr>
-                                          <m:e>
-                                            <m:r>
-                                              <a:rPr lang="en-US" b="0" i="1" smtClean="0">
-                                                <a:latin typeface="Cambria Math" panose="02040503050406030204" pitchFamily="18" charset="0"/>
-                                              </a:rPr>
-                                              <m:t>𝑉</m:t>
-                                            </m:r>
-                                          </m:e>
-                                          <m:sub>
-                                            <m:r>
-                                              <a:rPr lang="en-US" b="0" i="1" smtClean="0">
-                                                <a:latin typeface="Cambria Math" panose="02040503050406030204" pitchFamily="18" charset="0"/>
-                                              </a:rPr>
-                                              <m:t>𝑥</m:t>
-                                            </m:r>
-                                          </m:sub>
-                                        </m:sSub>
-                                      </m:e>
-                                    </m:d>
-                                  </m:e>
-                                  <m:sub>
-                                    <m:r>
-                                      <a:rPr lang="en-US" b="0" i="1" smtClean="0">
-                                        <a:latin typeface="Cambria Math" panose="02040503050406030204" pitchFamily="18" charset="0"/>
-                                      </a:rPr>
-                                      <m:t>𝑗𝑗</m:t>
-                                    </m:r>
-                                  </m:sub>
-                                </m:sSub>
-                                <m:r>
-                                  <a:rPr lang="en-US" b="0" i="1" smtClean="0">
-                                    <a:latin typeface="Cambria Math" panose="02040503050406030204" pitchFamily="18" charset="0"/>
-                                  </a:rPr>
-                                  <m:t>−</m:t>
-                                </m:r>
-                                <m:sSub>
-                                  <m:sSubPr>
-                                    <m:ctrlPr>
-                                      <a:rPr lang="en-US" b="0" i="1" smtClean="0">
-                                        <a:latin typeface="Cambria Math" panose="02040503050406030204" pitchFamily="18" charset="0"/>
-                                      </a:rPr>
-                                    </m:ctrlPr>
-                                  </m:sSubPr>
-                                  <m:e>
-                                    <m:d>
-                                      <m:dPr>
-                                        <m:ctrlPr>
-                                          <a:rPr lang="en-US" b="0" i="1" smtClean="0">
-                                            <a:latin typeface="Cambria Math" panose="02040503050406030204" pitchFamily="18" charset="0"/>
-                                          </a:rPr>
-                                        </m:ctrlPr>
-                                      </m:dPr>
-                                      <m:e>
-                                        <m:sSubSup>
-                                          <m:sSubSupPr>
-                                            <m:ctrlPr>
-                                              <a:rPr lang="en-US" b="0" i="1" smtClean="0">
-                                                <a:latin typeface="Cambria Math" panose="02040503050406030204" pitchFamily="18" charset="0"/>
-                                              </a:rPr>
-                                            </m:ctrlPr>
-                                          </m:sSubSupPr>
-                                          <m:e>
-                                            <m:r>
-                                              <a:rPr lang="en-US" b="0" i="1" smtClean="0">
-                                                <a:latin typeface="Cambria Math" panose="02040503050406030204" pitchFamily="18" charset="0"/>
-                                              </a:rPr>
-                                              <m:t>𝑉</m:t>
-                                            </m:r>
-                                          </m:e>
-                                          <m:sub>
-                                            <m:r>
-                                              <a:rPr lang="en-US" b="0" i="1" smtClean="0">
-                                                <a:latin typeface="Cambria Math" panose="02040503050406030204" pitchFamily="18" charset="0"/>
-                                              </a:rPr>
-                                              <m:t>𝑥</m:t>
-                                            </m:r>
-                                          </m:sub>
-                                          <m:sup>
-                                            <m:r>
-                                              <a:rPr lang="en-US" b="0" i="1" smtClean="0">
-                                                <a:latin typeface="Cambria Math" panose="02040503050406030204" pitchFamily="18" charset="0"/>
-                                              </a:rPr>
-                                              <m:t>−1</m:t>
-                                            </m:r>
-                                          </m:sup>
-                                        </m:sSubSup>
-                                      </m:e>
-                                    </m:d>
-                                  </m:e>
-                                  <m:sub>
-                                    <m:r>
-                                      <a:rPr lang="en-US" b="0" i="1" smtClean="0">
-                                        <a:latin typeface="Cambria Math" panose="02040503050406030204" pitchFamily="18" charset="0"/>
-                                      </a:rPr>
-                                      <m:t>𝑗𝑗</m:t>
-                                    </m:r>
-                                  </m:sub>
-                                </m:sSub>
-                              </m:e>
-                            </m:d>
-                          </m:e>
-                          <m:sup>
-                            <m:r>
-                              <a:rPr lang="en-US" b="0" i="1" smtClean="0">
-                                <a:latin typeface="Cambria Math" panose="02040503050406030204" pitchFamily="18" charset="0"/>
-                              </a:rPr>
-                              <m:t>−1</m:t>
-                            </m:r>
-                          </m:sup>
-                        </m:sSup>
-                      </m:e>
-                    </m:rad>
-                    <m:r>
-                      <a:rPr lang="en-US" b="0" i="1" smtClean="0">
-                        <a:latin typeface="Cambria Math" panose="02040503050406030204" pitchFamily="18" charset="0"/>
-                      </a:rPr>
-                      <m:t> </m:t>
-                    </m:r>
-                    <m:r>
-                      <a:rPr lang="en-US" b="0" i="1" smtClean="0">
-                        <a:latin typeface="Cambria Math" panose="02040503050406030204" pitchFamily="18" charset="0"/>
-                      </a:rPr>
-                      <m:t>𝑤h𝑒𝑟𝑒</m:t>
-                    </m:r>
-                    <m:r>
-                      <a:rPr lang="en-US" b="0" i="1" smtClean="0">
-                        <a:latin typeface="Cambria Math" panose="02040503050406030204" pitchFamily="18" charset="0"/>
-                      </a:rPr>
-                      <m:t> </m:t>
-                    </m:r>
-                    <m:sSub>
-                      <m:sSubPr>
-                        <m:ctrlPr>
-                          <a:rPr lang="en-US" b="0" i="1" smtClean="0">
-                            <a:latin typeface="Cambria Math" panose="02040503050406030204" pitchFamily="18" charset="0"/>
-                          </a:rPr>
-                        </m:ctrlPr>
-                      </m:sSubPr>
-                      <m:e>
-                        <m:r>
-                          <a:rPr lang="en-US" b="0" i="1" smtClean="0">
-                            <a:latin typeface="Cambria Math" panose="02040503050406030204" pitchFamily="18" charset="0"/>
-                          </a:rPr>
-                          <m:t>𝑉</m:t>
-                        </m:r>
-                      </m:e>
-                      <m:sub>
-                        <m:r>
-                          <a:rPr lang="en-US" b="0" i="1" smtClean="0">
-                            <a:latin typeface="Cambria Math" panose="02040503050406030204" pitchFamily="18" charset="0"/>
-                          </a:rPr>
-                          <m:t>𝑥</m:t>
-                        </m:r>
-                      </m:sub>
-                    </m:sSub>
-                    <m:r>
-                      <a:rPr lang="en-US" b="0" i="1" smtClean="0">
-                        <a:latin typeface="Cambria Math" panose="02040503050406030204" pitchFamily="18" charset="0"/>
-                      </a:rPr>
-                      <m:t> </m:t>
-                    </m:r>
-                    <m:r>
-                      <a:rPr lang="en-US" b="0" i="1" smtClean="0">
-                        <a:latin typeface="Cambria Math" panose="02040503050406030204" pitchFamily="18" charset="0"/>
-                      </a:rPr>
-                      <m:t>𝑖𝑠</m:t>
-                    </m:r>
-                    <m:r>
-                      <a:rPr lang="en-US" b="0" i="1" smtClean="0">
-                        <a:latin typeface="Cambria Math" panose="02040503050406030204" pitchFamily="18" charset="0"/>
-                      </a:rPr>
-                      <m:t> </m:t>
-                    </m:r>
-                    <m:r>
-                      <a:rPr lang="en-US" b="0" i="1" smtClean="0">
-                        <a:latin typeface="Cambria Math" panose="02040503050406030204" pitchFamily="18" charset="0"/>
-                      </a:rPr>
-                      <m:t>𝑡h𝑒</m:t>
-                    </m:r>
-                    <m:r>
-                      <a:rPr lang="en-US" b="0" i="1" smtClean="0">
-                        <a:latin typeface="Cambria Math" panose="02040503050406030204" pitchFamily="18" charset="0"/>
-                      </a:rPr>
-                      <m:t> </m:t>
-                    </m:r>
-                    <m:r>
-                      <a:rPr lang="en-US" b="0" i="1" smtClean="0">
-                        <a:latin typeface="Cambria Math" panose="02040503050406030204" pitchFamily="18" charset="0"/>
-                      </a:rPr>
-                      <m:t>𝑐𝑜𝑣𝑎𝑟𝑖𝑎𝑛𝑐𝑒</m:t>
-                    </m:r>
-                    <m:r>
-                      <a:rPr lang="en-US" b="0" i="1" smtClean="0">
-                        <a:latin typeface="Cambria Math" panose="02040503050406030204" pitchFamily="18" charset="0"/>
-                      </a:rPr>
-                      <m:t> </m:t>
-                    </m:r>
-                    <m:r>
-                      <a:rPr lang="en-US" b="0" i="1" smtClean="0">
-                        <a:latin typeface="Cambria Math" panose="02040503050406030204" pitchFamily="18" charset="0"/>
-                      </a:rPr>
-                      <m:t>𝑚𝑎𝑡𝑟𝑖𝑥</m:t>
-                    </m:r>
-                    <m:r>
-                      <a:rPr lang="en-US" b="0" i="1" smtClean="0">
-                        <a:latin typeface="Cambria Math" panose="02040503050406030204" pitchFamily="18" charset="0"/>
-                      </a:rPr>
-                      <m:t> </m:t>
-                    </m:r>
-                    <m:r>
-                      <a:rPr lang="en-US" b="0" i="1" smtClean="0">
-                        <a:latin typeface="Cambria Math" panose="02040503050406030204" pitchFamily="18" charset="0"/>
-                      </a:rPr>
-                      <m:t>𝑜𝑓</m:t>
-                    </m:r>
-                    <m:r>
-                      <a:rPr lang="en-US" b="0" i="1" smtClean="0">
-                        <a:latin typeface="Cambria Math" panose="02040503050406030204" pitchFamily="18" charset="0"/>
-                      </a:rPr>
-                      <m:t> </m:t>
-                    </m:r>
-                    <m:r>
-                      <a:rPr lang="en-US" b="0" i="1" smtClean="0">
-                        <a:latin typeface="Cambria Math" panose="02040503050406030204" pitchFamily="18" charset="0"/>
-                      </a:rPr>
-                      <m:t>𝑥</m:t>
-                    </m:r>
-                    <m:r>
-                      <a:rPr lang="en-US" b="0" i="1" smtClean="0">
-                        <a:latin typeface="Cambria Math" panose="02040503050406030204" pitchFamily="18" charset="0"/>
-                      </a:rPr>
-                      <m:t> (</m:t>
-                    </m:r>
-                    <m:r>
-                      <a:rPr lang="en-US" b="0" i="1" smtClean="0">
-                        <a:latin typeface="Cambria Math" panose="02040503050406030204" pitchFamily="18" charset="0"/>
-                      </a:rPr>
-                      <m:t>𝑔𝑒𝑛</m:t>
-                    </m:r>
-                    <m:r>
-                      <a:rPr lang="en-US" b="0" i="1" smtClean="0">
-                        <a:latin typeface="Cambria Math" panose="02040503050406030204" pitchFamily="18" charset="0"/>
-                      </a:rPr>
-                      <m:t> </m:t>
-                    </m:r>
-                    <m:r>
-                      <a:rPr lang="en-US" b="0" i="1" smtClean="0">
-                        <a:latin typeface="Cambria Math" panose="02040503050406030204" pitchFamily="18" charset="0"/>
-                      </a:rPr>
-                      <m:t>𝑙𝑒𝑣𝑒𝑙</m:t>
-                    </m:r>
-                    <m:r>
-                      <a:rPr lang="en-US" b="0" i="1" smtClean="0">
-                        <a:latin typeface="Cambria Math" panose="02040503050406030204" pitchFamily="18" charset="0"/>
-                      </a:rPr>
-                      <m:t>)</m:t>
-                    </m:r>
-                  </m:oMath>
-                </a14:m>
-                <a:endParaRPr lang="en-US" dirty="0"/>
-              </a:p>
-              <a:p>
-                <a:pPr marL="1200150" lvl="2" indent="-285750">
-                  <a:buFont typeface="Arial" panose="020B0604020202020204" pitchFamily="34" charset="0"/>
-                  <a:buChar char="•"/>
-                </a:pPr>
-                <a:r>
-                  <a:rPr lang="en-US" dirty="0"/>
-                  <a:t>We select the </a:t>
-                </a:r>
-                <a:r>
-                  <a:rPr lang="en-US" dirty="0">
-                    <a:solidFill>
-                      <a:srgbClr val="FF0000"/>
-                    </a:solidFill>
-                  </a:rPr>
-                  <a:t>tau that minimizes </a:t>
-                </a:r>
-                <a:r>
-                  <a:rPr lang="el-GR" dirty="0">
-                    <a:solidFill>
-                      <a:srgbClr val="FF0000"/>
-                    </a:solidFill>
-                  </a:rPr>
-                  <a:t>ρ </a:t>
-                </a:r>
-                <a:endParaRPr lang="en-US" dirty="0">
-                  <a:solidFill>
-                    <a:srgbClr val="FF0000"/>
-                  </a:solidFill>
-                </a:endParaRPr>
-              </a:p>
-              <a:p>
-                <a:pPr marL="1200150" lvl="2" indent="-285750">
-                  <a:buFont typeface="Arial" panose="020B0604020202020204" pitchFamily="34" charset="0"/>
-                  <a:buChar char="•"/>
-                </a:pPr>
-                <a:r>
-                  <a:rPr lang="en-US" dirty="0"/>
-                  <a:t>The tau spectrum is ~[10E-10, 10]</a:t>
-                </a:r>
-              </a:p>
-              <a:p>
-                <a:pPr marL="742950" lvl="1" indent="-285750">
-                  <a:buFont typeface="Arial" panose="020B0604020202020204" pitchFamily="34" charset="0"/>
-                  <a:buChar char="•"/>
-                </a:pPr>
-                <a:endParaRPr lang="en-US" dirty="0"/>
-              </a:p>
-              <a:p>
-                <a:pPr marL="285750" indent="-285750">
-                  <a:buFont typeface="Arial" panose="020B0604020202020204" pitchFamily="34" charset="0"/>
-                  <a:buChar char="•"/>
-                </a:pPr>
-                <a:endParaRPr lang="en-US" dirty="0"/>
-              </a:p>
-              <a:p>
-                <a:pPr marL="285750" indent="-285750">
-                  <a:buFont typeface="Arial" panose="020B0604020202020204" pitchFamily="34" charset="0"/>
-                  <a:buChar char="•"/>
-                </a:pPr>
-                <a:endParaRPr lang="en-US" dirty="0"/>
-              </a:p>
-            </p:txBody>
-          </p:sp>
-        </mc:Choice>
-        <mc:Fallback xmlns="">
-          <p:sp>
-            <p:nvSpPr>
-              <p:cNvPr id="6" name="TextBox 5">
-                <a:extLst>
-                  <a:ext uri="{FF2B5EF4-FFF2-40B4-BE49-F238E27FC236}">
-                    <a16:creationId xmlns:a16="http://schemas.microsoft.com/office/drawing/2014/main" id="{1DDE6F7F-FC19-F840-A70E-C84BA99E0247}"/>
-                  </a:ext>
-                </a:extLst>
-              </p:cNvPr>
-              <p:cNvSpPr txBox="1">
-                <a:spLocks noRot="1" noChangeAspect="1" noMove="1" noResize="1" noEditPoints="1" noAdjustHandles="1" noChangeArrowheads="1" noChangeShapeType="1" noTextEdit="1"/>
-              </p:cNvSpPr>
-              <p:nvPr/>
-            </p:nvSpPr>
-            <p:spPr>
-              <a:xfrm>
-                <a:off x="111965" y="717334"/>
-                <a:ext cx="11783048" cy="6195992"/>
-              </a:xfrm>
-              <a:prstGeom prst="rect">
-                <a:avLst/>
-              </a:prstGeom>
-              <a:blipFill>
-                <a:blip r:embed="rId2"/>
-                <a:stretch>
-                  <a:fillRect l="-323" t="-204"/>
-                </a:stretch>
-              </a:blipFill>
-            </p:spPr>
-            <p:txBody>
-              <a:bodyPr/>
-              <a:lstStyle/>
-              <a:p>
-                <a:r>
-                  <a:rPr lang="en-US">
-                    <a:noFill/>
-                  </a:rPr>
-                  <a:t> </a:t>
-                </a:r>
-              </a:p>
-            </p:txBody>
-          </p:sp>
-        </mc:Fallback>
-      </mc:AlternateContent>
+      <p:sp>
+        <p:nvSpPr>
+          <p:cNvPr id="6" name="TextBox 5">
+            <a:extLst>
+              <a:ext uri="{FF2B5EF4-FFF2-40B4-BE49-F238E27FC236}">
+                <a16:creationId xmlns:a16="http://schemas.microsoft.com/office/drawing/2014/main" id="{1DDE6F7F-FC19-F840-A70E-C84BA99E0247}"/>
+              </a:ext>
+            </a:extLst>
+          </p:cNvPr>
+          <p:cNvSpPr txBox="1"/>
+          <p:nvPr/>
+        </p:nvSpPr>
+        <p:spPr>
+          <a:xfrm>
+            <a:off x="111965" y="717334"/>
+            <a:ext cx="11783048" cy="4801314"/>
+          </a:xfrm>
+          <a:prstGeom prst="rect">
+            <a:avLst/>
+          </a:prstGeom>
+          <a:noFill/>
+        </p:spPr>
+        <p:txBody>
+          <a:bodyPr wrap="square" rtlCol="0">
+            <a:spAutoFit/>
+          </a:bodyPr>
+          <a:lstStyle/>
+          <a:p>
+            <a:pPr marL="285750" indent="-285750">
+              <a:buFont typeface="Arial" panose="020B0604020202020204" pitchFamily="34" charset="0"/>
+              <a:buChar char="•"/>
+            </a:pPr>
+            <a:r>
+              <a:rPr lang="en-US" dirty="0"/>
+              <a:t>Analysis:</a:t>
+            </a:r>
+          </a:p>
+          <a:p>
+            <a:pPr marL="742950" lvl="1" indent="-285750">
+              <a:buFont typeface="Arial" panose="020B0604020202020204" pitchFamily="34" charset="0"/>
+              <a:buChar char="•"/>
+            </a:pPr>
+            <a:r>
+              <a:rPr lang="en-US" dirty="0"/>
+              <a:t>Method we are implementing is not efficient</a:t>
+            </a:r>
+          </a:p>
+          <a:p>
+            <a:pPr marL="742950" lvl="1" indent="-285750">
+              <a:buFont typeface="Arial" panose="020B0604020202020204" pitchFamily="34" charset="0"/>
+              <a:buChar char="•"/>
+            </a:pPr>
+            <a:r>
+              <a:rPr lang="en-US" dirty="0"/>
+              <a:t>Looser b-tag WP</a:t>
+            </a:r>
+            <a:r>
+              <a:rPr lang="en-US" dirty="0">
+                <a:sym typeface="Wingdings" pitchFamily="2" charset="2"/>
+              </a:rPr>
+              <a:t> Less ttbar contamination in CR</a:t>
+            </a:r>
+          </a:p>
+          <a:p>
+            <a:pPr marL="1200150" lvl="2" indent="-285750">
+              <a:buFont typeface="Arial" panose="020B0604020202020204" pitchFamily="34" charset="0"/>
+              <a:buChar char="•"/>
+            </a:pPr>
+            <a:r>
+              <a:rPr lang="en-US" dirty="0">
+                <a:sym typeface="Wingdings" pitchFamily="2" charset="2"/>
+              </a:rPr>
+              <a:t>Need to re-do method to check how the looser b-tag WP responds to out analysis</a:t>
+            </a:r>
+          </a:p>
+          <a:p>
+            <a:pPr marL="1200150" lvl="2" indent="-285750">
+              <a:buFont typeface="Arial" panose="020B0604020202020204" pitchFamily="34" charset="0"/>
+              <a:buChar char="•"/>
+            </a:pPr>
+            <a:r>
+              <a:rPr lang="en-US" dirty="0">
+                <a:sym typeface="Wingdings" pitchFamily="2" charset="2"/>
+              </a:rPr>
+              <a:t>Efficiency/Acceptance ✓</a:t>
+            </a:r>
+          </a:p>
+          <a:p>
+            <a:pPr marL="1200150" lvl="2" indent="-285750">
+              <a:buFont typeface="Arial" panose="020B0604020202020204" pitchFamily="34" charset="0"/>
+              <a:buChar char="•"/>
+            </a:pPr>
+            <a:r>
+              <a:rPr lang="en-US" dirty="0">
+                <a:sym typeface="Wingdings" pitchFamily="2" charset="2"/>
+              </a:rPr>
+              <a:t>QCD Closure tests and ttbar Contamination ✓</a:t>
+            </a:r>
+          </a:p>
+          <a:p>
+            <a:pPr marL="1200150" lvl="2" indent="-285750">
+              <a:buFont typeface="Arial" panose="020B0604020202020204" pitchFamily="34" charset="0"/>
+              <a:buChar char="•"/>
+            </a:pPr>
+            <a:r>
+              <a:rPr lang="en-US" dirty="0">
+                <a:sym typeface="Wingdings" pitchFamily="2" charset="2"/>
+              </a:rPr>
+              <a:t>Response matrices ✓</a:t>
+            </a:r>
+          </a:p>
+          <a:p>
+            <a:pPr marL="1200150" lvl="2" indent="-285750">
+              <a:buFont typeface="Arial" panose="020B0604020202020204" pitchFamily="34" charset="0"/>
+              <a:buChar char="•"/>
+            </a:pPr>
+            <a:r>
+              <a:rPr lang="en-US" dirty="0">
+                <a:sym typeface="Wingdings" pitchFamily="2" charset="2"/>
+              </a:rPr>
+              <a:t>Mass Fit results:</a:t>
+            </a:r>
+            <a:endParaRPr lang="en-US" dirty="0">
+              <a:solidFill>
+                <a:srgbClr val="FF0000"/>
+              </a:solidFill>
+              <a:sym typeface="Wingdings" pitchFamily="2" charset="2"/>
+            </a:endParaRPr>
+          </a:p>
+          <a:p>
+            <a:pPr marL="1657350" lvl="3" indent="-285750">
+              <a:buFont typeface="Arial" panose="020B0604020202020204" pitchFamily="34" charset="0"/>
+              <a:buChar char="•"/>
+            </a:pPr>
+            <a:r>
+              <a:rPr lang="en-US" dirty="0">
+                <a:solidFill>
+                  <a:srgbClr val="FF0000"/>
+                </a:solidFill>
+                <a:sym typeface="Wingdings" pitchFamily="2" charset="2"/>
+              </a:rPr>
+              <a:t>Simultaneous fit is not performing well 𝙭</a:t>
+            </a:r>
+          </a:p>
+          <a:p>
+            <a:pPr marL="1657350" lvl="3" indent="-285750">
+              <a:buFont typeface="Arial" panose="020B0604020202020204" pitchFamily="34" charset="0"/>
+              <a:buChar char="•"/>
+            </a:pPr>
+            <a:r>
+              <a:rPr lang="en-US" dirty="0">
+                <a:sym typeface="Wingdings" pitchFamily="2" charset="2"/>
+              </a:rPr>
+              <a:t>Signal and </a:t>
+            </a:r>
+            <a:r>
+              <a:rPr lang="en-US" dirty="0" err="1">
+                <a:sym typeface="Wingdings" pitchFamily="2" charset="2"/>
+              </a:rPr>
+              <a:t>bkg</a:t>
+            </a:r>
+            <a:r>
+              <a:rPr lang="en-US" dirty="0">
+                <a:sym typeface="Wingdings" pitchFamily="2" charset="2"/>
+              </a:rPr>
+              <a:t> templates ✓</a:t>
+            </a:r>
+          </a:p>
+          <a:p>
+            <a:pPr marL="1657350" lvl="3" indent="-285750">
+              <a:buFont typeface="Arial" panose="020B0604020202020204" pitchFamily="34" charset="0"/>
+              <a:buChar char="•"/>
+            </a:pPr>
+            <a:r>
+              <a:rPr lang="en-US" dirty="0">
+                <a:sym typeface="Wingdings" pitchFamily="2" charset="2"/>
+              </a:rPr>
+              <a:t>Fit in the 2btag region ✓</a:t>
+            </a:r>
+          </a:p>
+          <a:p>
+            <a:pPr marL="1200150" lvl="2" indent="-285750">
+              <a:buFont typeface="Arial" panose="020B0604020202020204" pitchFamily="34" charset="0"/>
+              <a:buChar char="•"/>
+            </a:pPr>
+            <a:r>
+              <a:rPr lang="en-US" dirty="0" err="1">
+                <a:sym typeface="Wingdings" pitchFamily="2" charset="2"/>
+              </a:rPr>
+              <a:t>Btagging</a:t>
+            </a:r>
+            <a:r>
+              <a:rPr lang="en-US" dirty="0">
+                <a:sym typeface="Wingdings" pitchFamily="2" charset="2"/>
+              </a:rPr>
+              <a:t> efficiency in the </a:t>
+            </a:r>
+            <a:r>
+              <a:rPr lang="en-US" dirty="0" err="1">
+                <a:sym typeface="Wingdings" pitchFamily="2" charset="2"/>
+              </a:rPr>
+              <a:t>subjet</a:t>
+            </a:r>
+            <a:r>
+              <a:rPr lang="en-US" dirty="0">
+                <a:sym typeface="Wingdings" pitchFamily="2" charset="2"/>
+              </a:rPr>
+              <a:t> </a:t>
+            </a:r>
+            <a:r>
+              <a:rPr lang="en-US" dirty="0" err="1">
+                <a:sym typeface="Wingdings" pitchFamily="2" charset="2"/>
+              </a:rPr>
+              <a:t>pt</a:t>
+            </a:r>
+            <a:r>
+              <a:rPr lang="en-US" dirty="0">
+                <a:sym typeface="Wingdings" pitchFamily="2" charset="2"/>
+              </a:rPr>
+              <a:t> , </a:t>
+            </a:r>
+            <a:r>
+              <a:rPr lang="en-US" dirty="0" err="1">
+                <a:sym typeface="Wingdings" pitchFamily="2" charset="2"/>
+              </a:rPr>
+              <a:t>subjet</a:t>
+            </a:r>
+            <a:r>
+              <a:rPr lang="en-US" dirty="0">
+                <a:sym typeface="Wingdings" pitchFamily="2" charset="2"/>
+              </a:rPr>
+              <a:t> |eta| phase space ✓</a:t>
+            </a:r>
+          </a:p>
+          <a:p>
+            <a:pPr marL="1200150" lvl="2" indent="-285750">
+              <a:buFont typeface="Arial" panose="020B0604020202020204" pitchFamily="34" charset="0"/>
+              <a:buChar char="•"/>
+            </a:pPr>
+            <a:r>
+              <a:rPr lang="en-US" dirty="0" err="1">
+                <a:sym typeface="Wingdings" pitchFamily="2" charset="2"/>
+              </a:rPr>
+              <a:t>Btagging</a:t>
+            </a:r>
+            <a:r>
+              <a:rPr lang="en-US" dirty="0">
+                <a:sym typeface="Wingdings" pitchFamily="2" charset="2"/>
+              </a:rPr>
+              <a:t> purity ✓</a:t>
+            </a:r>
+            <a:endParaRPr lang="el-GR" dirty="0">
+              <a:sym typeface="Wingdings" pitchFamily="2" charset="2"/>
+            </a:endParaRPr>
+          </a:p>
+          <a:p>
+            <a:pPr marL="742950" lvl="1" indent="-285750">
+              <a:buFont typeface="Arial" panose="020B0604020202020204" pitchFamily="34" charset="0"/>
+              <a:buChar char="•"/>
+            </a:pPr>
+            <a:r>
+              <a:rPr lang="en-US" dirty="0">
+                <a:sym typeface="Wingdings" pitchFamily="2" charset="2"/>
+              </a:rPr>
+              <a:t>In order to compare our results with theoretical </a:t>
+            </a:r>
+            <a:r>
+              <a:rPr lang="en-US" dirty="0" err="1">
+                <a:sym typeface="Wingdings" pitchFamily="2" charset="2"/>
+              </a:rPr>
+              <a:t>parton</a:t>
+            </a:r>
+            <a:r>
+              <a:rPr lang="en-US" dirty="0">
+                <a:sym typeface="Wingdings" pitchFamily="2" charset="2"/>
+              </a:rPr>
+              <a:t>/particle results  Nominal MC and not High </a:t>
+            </a:r>
+            <a:r>
+              <a:rPr lang="en-US" dirty="0" err="1">
+                <a:sym typeface="Wingdings" pitchFamily="2" charset="2"/>
+              </a:rPr>
+              <a:t>Mtt</a:t>
+            </a:r>
+            <a:r>
+              <a:rPr lang="en-US" dirty="0">
+                <a:sym typeface="Wingdings" pitchFamily="2" charset="2"/>
+              </a:rPr>
+              <a:t> samples</a:t>
+            </a:r>
+          </a:p>
+          <a:p>
+            <a:pPr marL="1200150" lvl="2" indent="-285750">
+              <a:buFont typeface="Arial" panose="020B0604020202020204" pitchFamily="34" charset="0"/>
+              <a:buChar char="•"/>
+            </a:pPr>
+            <a:r>
+              <a:rPr lang="en-US" dirty="0">
+                <a:sym typeface="Wingdings" pitchFamily="2" charset="2"/>
+              </a:rPr>
+              <a:t>Nominal MC production (2016 re-</a:t>
+            </a:r>
+            <a:r>
+              <a:rPr lang="en-US" dirty="0" err="1">
+                <a:sym typeface="Wingdings" pitchFamily="2" charset="2"/>
+              </a:rPr>
+              <a:t>reco</a:t>
+            </a:r>
+            <a:r>
+              <a:rPr lang="en-US">
+                <a:sym typeface="Wingdings" pitchFamily="2" charset="2"/>
+              </a:rPr>
+              <a:t>)</a:t>
+            </a:r>
+            <a:endParaRPr lang="en-US" dirty="0"/>
+          </a:p>
+          <a:p>
+            <a:pPr marL="285750" indent="-285750">
+              <a:buFont typeface="Arial" panose="020B0604020202020204" pitchFamily="34" charset="0"/>
+              <a:buChar char="•"/>
+            </a:pPr>
+            <a:endParaRPr lang="en-US" dirty="0"/>
+          </a:p>
+          <a:p>
+            <a:pPr marL="285750" indent="-285750">
+              <a:buFont typeface="Arial" panose="020B0604020202020204" pitchFamily="34" charset="0"/>
+              <a:buChar char="•"/>
+            </a:pPr>
+            <a:endParaRPr lang="en-US" dirty="0"/>
+          </a:p>
+        </p:txBody>
+      </p:sp>
       <p:sp>
         <p:nvSpPr>
           <p:cNvPr id="5" name="Slide Number Placeholder 4">
@@ -13030,7 +12923,7 @@
         </p:nvSpPr>
         <p:spPr>
           <a:xfrm>
-            <a:off x="111965" y="83975"/>
+            <a:off x="111965" y="169035"/>
             <a:ext cx="11783049" cy="523220"/>
           </a:xfrm>
           <a:prstGeom prst="rect">
@@ -13759,7 +13652,7 @@
             <a:r>
               <a:rPr lang="en-US" dirty="0">
                 <a:solidFill>
-                  <a:srgbClr val="00B050"/>
+                  <a:srgbClr val="FF0000"/>
                 </a:solidFill>
               </a:rPr>
               <a:t>Mass Fit in 2btag region</a:t>
@@ -14182,7 +14075,7 @@
         <p:spPr>
           <a:xfrm>
             <a:off x="111965" y="4401756"/>
-            <a:ext cx="11651945" cy="646331"/>
+            <a:ext cx="11651945" cy="369332"/>
           </a:xfrm>
           <a:prstGeom prst="rect">
             <a:avLst/>
@@ -14205,15 +14098,18 @@
                 <a:cs typeface="Calibri" panose="020F0502020204030204" pitchFamily="34" charset="0"/>
                 <a:sym typeface="Wingdings" pitchFamily="2" charset="2"/>
               </a:rPr>
-              <a:t>We deploy a simultaneous fit in 3 regions (0,1,2 </a:t>
-            </a:r>
-            <a:r>
-              <a:rPr lang="en-US" dirty="0" err="1">
+              <a:t>We deploy a fit in the 2btag region: Now we have a </a:t>
+            </a:r>
+            <a:r>
+              <a:rPr lang="en-US" dirty="0">
+                <a:solidFill>
+                  <a:srgbClr val="FF0000"/>
+                </a:solidFill>
                 <a:latin typeface="Calibri" panose="020F0502020204030204" pitchFamily="34" charset="0"/>
                 <a:cs typeface="Calibri" panose="020F0502020204030204" pitchFamily="34" charset="0"/>
                 <a:sym typeface="Wingdings" pitchFamily="2" charset="2"/>
               </a:rPr>
-              <a:t>btag</a:t>
+              <a:t>pure Control Region</a:t>
             </a:r>
             <a:r>
               <a:rPr lang="en-US" dirty="0">
@@ -14221,31 +14117,13 @@
                 <a:cs typeface="Calibri" panose="020F0502020204030204" pitchFamily="34" charset="0"/>
                 <a:sym typeface="Wingdings" pitchFamily="2" charset="2"/>
               </a:rPr>
-              <a:t>) because we do not have a pure Control Region. </a:t>
-            </a:r>
-          </a:p>
-          <a:p>
-            <a:pPr marL="742950" lvl="1" indent="-285750">
-              <a:buFont typeface="Arial" panose="020B0604020202020204" pitchFamily="34" charset="0"/>
-              <a:buChar char="•"/>
-            </a:pPr>
-            <a:r>
-              <a:rPr lang="en-US" dirty="0">
-                <a:latin typeface="Calibri" panose="020F0502020204030204" pitchFamily="34" charset="0"/>
-                <a:cs typeface="Calibri" panose="020F0502020204030204" pitchFamily="34" charset="0"/>
-                <a:sym typeface="Wingdings" pitchFamily="2" charset="2"/>
-              </a:rPr>
-              <a:t>Our data CR is ttbar contaminated</a:t>
-            </a:r>
-            <a:endParaRPr lang="en-US" dirty="0">
-              <a:latin typeface="Calibri" panose="020F0502020204030204" pitchFamily="34" charset="0"/>
-              <a:cs typeface="Calibri" panose="020F0502020204030204" pitchFamily="34" charset="0"/>
-            </a:endParaRPr>
-          </a:p>
-        </p:txBody>
-      </p:sp>
-      <mc:AlternateContent xmlns:mc="http://schemas.openxmlformats.org/markup-compatibility/2006" xmlns:a14="http://schemas.microsoft.com/office/drawing/2010/main">
-        <mc:Choice Requires="a14">
+              <a:t>. </a:t>
+            </a:r>
+          </a:p>
+        </p:txBody>
+      </p:sp>
+      <mc:AlternateContent xmlns:mc="http://schemas.openxmlformats.org/markup-compatibility/2006">
+        <mc:Choice xmlns:a14="http://schemas.microsoft.com/office/drawing/2010/main" Requires="a14">
           <p:sp>
             <p:nvSpPr>
               <p:cNvPr id="23" name="Rectangle 22">
@@ -14260,7 +14138,7 @@
             </p:nvSpPr>
             <p:spPr>
               <a:xfrm>
-                <a:off x="111965" y="5082218"/>
+                <a:off x="111965" y="4943814"/>
                 <a:ext cx="11651945" cy="474489"/>
               </a:xfrm>
               <a:prstGeom prst="rect">
@@ -14347,11 +14225,11 @@
                             <m:t>(</m:t>
                           </m:r>
                           <m:r>
-                            <a:rPr lang="en-US" i="1">
+                            <a:rPr lang="en-US" b="0" i="1" smtClean="0">
                               <a:latin typeface="Cambria Math" panose="02040503050406030204" pitchFamily="18" charset="0"/>
                               <a:sym typeface="Wingdings" pitchFamily="2" charset="2"/>
                             </a:rPr>
-                            <m:t>𝑖</m:t>
+                            <m:t>2</m:t>
                           </m:r>
                           <m:r>
                             <a:rPr lang="en-US" i="1">
@@ -14405,11 +14283,11 @@
                             <m:t>(</m:t>
                           </m:r>
                           <m:r>
-                            <a:rPr lang="en-US" i="1">
+                            <a:rPr lang="en-US" b="0" i="1" smtClean="0">
                               <a:latin typeface="Cambria Math" panose="02040503050406030204" pitchFamily="18" charset="0"/>
                               <a:sym typeface="Wingdings" pitchFamily="2" charset="2"/>
                             </a:rPr>
-                            <m:t>𝑖</m:t>
+                            <m:t>2</m:t>
                           </m:r>
                           <m:r>
                             <a:rPr lang="en-US" i="1">
@@ -14447,11 +14325,11 @@
                             <m:t>(</m:t>
                           </m:r>
                           <m:r>
-                            <a:rPr lang="en-US" i="1">
+                            <a:rPr lang="en-US" b="0" i="1" smtClean="0">
                               <a:latin typeface="Cambria Math" panose="02040503050406030204" pitchFamily="18" charset="0"/>
                               <a:sym typeface="Wingdings" pitchFamily="2" charset="2"/>
                             </a:rPr>
-                            <m:t>𝑖</m:t>
+                            <m:t>2</m:t>
                           </m:r>
                           <m:r>
                             <a:rPr lang="en-US" i="1">
@@ -14615,11 +14493,11 @@
                             <m:t>(</m:t>
                           </m:r>
                           <m:r>
-                            <a:rPr lang="en-US" i="1">
+                            <a:rPr lang="en-US" b="0" i="1" smtClean="0">
                               <a:latin typeface="Cambria Math" panose="02040503050406030204" pitchFamily="18" charset="0"/>
                               <a:sym typeface="Wingdings" pitchFamily="2" charset="2"/>
                             </a:rPr>
-                            <m:t>𝑖</m:t>
+                            <m:t>2</m:t>
                           </m:r>
                           <m:r>
                             <a:rPr lang="en-US" i="1">
@@ -14781,11 +14659,11 @@
                             <m:t>(</m:t>
                           </m:r>
                           <m:r>
-                            <a:rPr lang="en-US" i="1">
+                            <a:rPr lang="en-US" b="0" i="1" smtClean="0">
                               <a:latin typeface="Cambria Math" panose="02040503050406030204" pitchFamily="18" charset="0"/>
                               <a:sym typeface="Wingdings" pitchFamily="2" charset="2"/>
                             </a:rPr>
-                            <m:t>𝑖</m:t>
+                            <m:t>2</m:t>
                           </m:r>
                           <m:r>
                             <a:rPr lang="en-US" i="1">
@@ -14827,7 +14705,7 @@
                               <a:latin typeface="Cambria Math" panose="02040503050406030204" pitchFamily="18" charset="0"/>
                               <a:sym typeface="Wingdings" pitchFamily="2" charset="2"/>
                             </a:rPr>
-                            <m:t>𝑖</m:t>
+                            <m:t>2</m:t>
                           </m:r>
                           <m:r>
                             <a:rPr lang="en-US" i="1">
@@ -14895,7 +14773,7 @@
             </p:txBody>
           </p:sp>
         </mc:Choice>
-        <mc:Fallback xmlns="">
+        <mc:Fallback>
           <p:sp>
             <p:nvSpPr>
               <p:cNvPr id="23" name="Rectangle 22">
@@ -14912,7 +14790,7 @@
             </p:nvSpPr>
             <p:spPr>
               <a:xfrm>
-                <a:off x="111965" y="5082218"/>
+                <a:off x="111965" y="4943814"/>
                 <a:ext cx="11651945" cy="474489"/>
               </a:xfrm>
               <a:prstGeom prst="rect">
@@ -14922,597 +14800,6 @@
                 <a:blip r:embed="rId3"/>
                 <a:stretch>
                   <a:fillRect b="-5128"/>
-                </a:stretch>
-              </a:blipFill>
-            </p:spPr>
-            <p:txBody>
-              <a:bodyPr/>
-              <a:lstStyle/>
-              <a:p>
-                <a:r>
-                  <a:rPr lang="en-US">
-                    <a:noFill/>
-                  </a:rPr>
-                  <a:t> </a:t>
-                </a:r>
-              </a:p>
-            </p:txBody>
-          </p:sp>
-        </mc:Fallback>
-      </mc:AlternateContent>
-      <mc:AlternateContent xmlns:mc="http://schemas.openxmlformats.org/markup-compatibility/2006" xmlns:a14="http://schemas.microsoft.com/office/drawing/2010/main">
-        <mc:Choice Requires="a14">
-          <p:sp>
-            <p:nvSpPr>
-              <p:cNvPr id="22" name="Rectangle 21">
-                <a:extLst>
-                  <a:ext uri="{FF2B5EF4-FFF2-40B4-BE49-F238E27FC236}">
-                    <a16:creationId xmlns:a16="http://schemas.microsoft.com/office/drawing/2014/main" id="{403C8F49-F8D5-384F-BE40-C10B9E2FF0CE}"/>
-                  </a:ext>
-                </a:extLst>
-              </p:cNvPr>
-              <p:cNvSpPr/>
-              <p:nvPr/>
-            </p:nvSpPr>
-            <p:spPr>
-              <a:xfrm>
-                <a:off x="111965" y="5591030"/>
-                <a:ext cx="10730444" cy="646139"/>
-              </a:xfrm>
-              <a:prstGeom prst="rect">
-                <a:avLst/>
-              </a:prstGeom>
-            </p:spPr>
-            <p:txBody>
-              <a:bodyPr wrap="square">
-                <a:spAutoFit/>
-              </a:bodyPr>
-              <a:lstStyle/>
-              <a:p>
-                <a:pPr marL="285750" indent="-285750">
-                  <a:buFont typeface="Arial" panose="020B0604020202020204" pitchFamily="34" charset="0"/>
-                  <a:buChar char="•"/>
-                </a:pPr>
-                <a:r>
-                  <a:rPr lang="en-GB" sz="1600" dirty="0">
-                    <a:sym typeface="Wingdings" pitchFamily="2" charset="2"/>
-                  </a:rPr>
-                  <a:t>We assume that </a:t>
-                </a:r>
-                <a14:m>
-                  <m:oMath xmlns:m="http://schemas.openxmlformats.org/officeDocument/2006/math">
-                    <m:sSubSup>
-                      <m:sSubSupPr>
-                        <m:ctrlPr>
-                          <a:rPr lang="en-US" sz="1600" i="1">
-                            <a:latin typeface="Cambria Math" panose="02040503050406030204" pitchFamily="18" charset="0"/>
-                            <a:sym typeface="Wingdings" pitchFamily="2" charset="2"/>
-                          </a:rPr>
-                        </m:ctrlPr>
-                      </m:sSubSupPr>
-                      <m:e>
-                        <m:r>
-                          <a:rPr lang="en-US" sz="1600" i="1">
-                            <a:latin typeface="Cambria Math" panose="02040503050406030204" pitchFamily="18" charset="0"/>
-                            <a:sym typeface="Wingdings" pitchFamily="2" charset="2"/>
-                          </a:rPr>
-                          <m:t>𝑁</m:t>
-                        </m:r>
-                      </m:e>
-                      <m:sub>
-                        <m:r>
-                          <a:rPr lang="en-US" sz="1600" i="1">
-                            <a:latin typeface="Cambria Math" panose="02040503050406030204" pitchFamily="18" charset="0"/>
-                            <a:sym typeface="Wingdings" pitchFamily="2" charset="2"/>
-                          </a:rPr>
-                          <m:t>𝑡𝑡</m:t>
-                        </m:r>
-                      </m:sub>
-                      <m:sup>
-                        <m:r>
-                          <a:rPr lang="en-US" sz="1600" i="1">
-                            <a:latin typeface="Cambria Math" panose="02040503050406030204" pitchFamily="18" charset="0"/>
-                            <a:sym typeface="Wingdings" pitchFamily="2" charset="2"/>
-                          </a:rPr>
-                          <m:t>(0)</m:t>
-                        </m:r>
-                      </m:sup>
-                    </m:sSubSup>
-                    <m:r>
-                      <a:rPr lang="en-US" sz="1600">
-                        <a:latin typeface="Cambria Math" panose="02040503050406030204" pitchFamily="18" charset="0"/>
-                        <a:sym typeface="Wingdings" pitchFamily="2" charset="2"/>
-                      </a:rPr>
-                      <m:t>=</m:t>
-                    </m:r>
-                    <m:sSup>
-                      <m:sSupPr>
-                        <m:ctrlPr>
-                          <a:rPr lang="en-US" sz="1600" i="1">
-                            <a:latin typeface="Cambria Math" panose="02040503050406030204" pitchFamily="18" charset="0"/>
-                            <a:sym typeface="Wingdings" pitchFamily="2" charset="2"/>
-                          </a:rPr>
-                        </m:ctrlPr>
-                      </m:sSupPr>
-                      <m:e>
-                        <m:d>
-                          <m:dPr>
-                            <m:ctrlPr>
-                              <a:rPr lang="en-US" sz="1600" i="1">
-                                <a:latin typeface="Cambria Math" panose="02040503050406030204" pitchFamily="18" charset="0"/>
-                                <a:sym typeface="Wingdings" pitchFamily="2" charset="2"/>
-                              </a:rPr>
-                            </m:ctrlPr>
-                          </m:dPr>
-                          <m:e>
-                            <m:r>
-                              <a:rPr lang="en-US" sz="1600">
-                                <a:latin typeface="Cambria Math" panose="02040503050406030204" pitchFamily="18" charset="0"/>
-                                <a:sym typeface="Wingdings" pitchFamily="2" charset="2"/>
-                              </a:rPr>
-                              <m:t>1−</m:t>
-                            </m:r>
-                            <m:sSub>
-                              <m:sSubPr>
-                                <m:ctrlPr>
-                                  <a:rPr lang="en-US" sz="1600" i="1">
-                                    <a:latin typeface="Cambria Math" panose="02040503050406030204" pitchFamily="18" charset="0"/>
-                                    <a:sym typeface="Wingdings" pitchFamily="2" charset="2"/>
-                                  </a:rPr>
-                                </m:ctrlPr>
-                              </m:sSubPr>
-                              <m:e>
-                                <m:r>
-                                  <m:rPr>
-                                    <m:sty m:val="p"/>
-                                  </m:rPr>
-                                  <a:rPr lang="en-US" sz="1600">
-                                    <a:latin typeface="Cambria Math" panose="02040503050406030204" pitchFamily="18" charset="0"/>
-                                    <a:sym typeface="Wingdings" pitchFamily="2" charset="2"/>
-                                  </a:rPr>
-                                  <m:t>e</m:t>
-                                </m:r>
-                              </m:e>
-                              <m:sub>
-                                <m:r>
-                                  <m:rPr>
-                                    <m:sty m:val="p"/>
-                                  </m:rPr>
-                                  <a:rPr lang="en-US" sz="1600">
-                                    <a:latin typeface="Cambria Math" panose="02040503050406030204" pitchFamily="18" charset="0"/>
-                                    <a:sym typeface="Wingdings" pitchFamily="2" charset="2"/>
-                                  </a:rPr>
-                                  <m:t>b</m:t>
-                                </m:r>
-                              </m:sub>
-                            </m:sSub>
-                          </m:e>
-                        </m:d>
-                      </m:e>
-                      <m:sup>
-                        <m:r>
-                          <a:rPr lang="en-US" sz="1600">
-                            <a:latin typeface="Cambria Math" panose="02040503050406030204" pitchFamily="18" charset="0"/>
-                            <a:sym typeface="Wingdings" pitchFamily="2" charset="2"/>
-                          </a:rPr>
-                          <m:t>2</m:t>
-                        </m:r>
-                      </m:sup>
-                    </m:sSup>
-                    <m:sSub>
-                      <m:sSubPr>
-                        <m:ctrlPr>
-                          <a:rPr lang="en-US" sz="1600" i="1">
-                            <a:latin typeface="Cambria Math" panose="02040503050406030204" pitchFamily="18" charset="0"/>
-                            <a:sym typeface="Wingdings" pitchFamily="2" charset="2"/>
-                          </a:rPr>
-                        </m:ctrlPr>
-                      </m:sSubPr>
-                      <m:e>
-                        <m:r>
-                          <m:rPr>
-                            <m:sty m:val="p"/>
-                          </m:rPr>
-                          <a:rPr lang="en-US" sz="1600">
-                            <a:latin typeface="Cambria Math" panose="02040503050406030204" pitchFamily="18" charset="0"/>
-                            <a:sym typeface="Wingdings" pitchFamily="2" charset="2"/>
-                          </a:rPr>
-                          <m:t>N</m:t>
-                        </m:r>
-                      </m:e>
-                      <m:sub>
-                        <m:r>
-                          <m:rPr>
-                            <m:sty m:val="p"/>
-                          </m:rPr>
-                          <a:rPr lang="en-US" sz="1600">
-                            <a:latin typeface="Cambria Math" panose="02040503050406030204" pitchFamily="18" charset="0"/>
-                            <a:sym typeface="Wingdings" pitchFamily="2" charset="2"/>
-                          </a:rPr>
-                          <m:t>tt</m:t>
-                        </m:r>
-                      </m:sub>
-                    </m:sSub>
-                    <m:r>
-                      <a:rPr lang="en-US" sz="1600">
-                        <a:latin typeface="Cambria Math" panose="02040503050406030204" pitchFamily="18" charset="0"/>
-                        <a:sym typeface="Wingdings" pitchFamily="2" charset="2"/>
-                      </a:rPr>
-                      <m:t>, </m:t>
-                    </m:r>
-                    <m:sSubSup>
-                      <m:sSubSupPr>
-                        <m:ctrlPr>
-                          <a:rPr lang="en-US" sz="1600" i="1">
-                            <a:latin typeface="Cambria Math" panose="02040503050406030204" pitchFamily="18" charset="0"/>
-                            <a:sym typeface="Wingdings" pitchFamily="2" charset="2"/>
-                          </a:rPr>
-                        </m:ctrlPr>
-                      </m:sSubSupPr>
-                      <m:e>
-                        <m:r>
-                          <m:rPr>
-                            <m:sty m:val="p"/>
-                          </m:rPr>
-                          <a:rPr lang="en-US" sz="1600">
-                            <a:latin typeface="Cambria Math" panose="02040503050406030204" pitchFamily="18" charset="0"/>
-                            <a:sym typeface="Wingdings" pitchFamily="2" charset="2"/>
-                          </a:rPr>
-                          <m:t>N</m:t>
-                        </m:r>
-                      </m:e>
-                      <m:sub>
-                        <m:r>
-                          <m:rPr>
-                            <m:sty m:val="p"/>
-                          </m:rPr>
-                          <a:rPr lang="en-US" sz="1600">
-                            <a:latin typeface="Cambria Math" panose="02040503050406030204" pitchFamily="18" charset="0"/>
-                            <a:sym typeface="Wingdings" pitchFamily="2" charset="2"/>
-                          </a:rPr>
-                          <m:t>tt</m:t>
-                        </m:r>
-                      </m:sub>
-                      <m:sup>
-                        <m:r>
-                          <a:rPr lang="en-US" sz="1600">
-                            <a:latin typeface="Cambria Math" panose="02040503050406030204" pitchFamily="18" charset="0"/>
-                            <a:sym typeface="Wingdings" pitchFamily="2" charset="2"/>
-                          </a:rPr>
-                          <m:t>(2)</m:t>
-                        </m:r>
-                      </m:sup>
-                    </m:sSubSup>
-                    <m:r>
-                      <a:rPr lang="en-US" sz="1600">
-                        <a:latin typeface="Cambria Math" panose="02040503050406030204" pitchFamily="18" charset="0"/>
-                        <a:sym typeface="Wingdings" pitchFamily="2" charset="2"/>
-                      </a:rPr>
-                      <m:t>=</m:t>
-                    </m:r>
-                    <m:sSubSup>
-                      <m:sSubSupPr>
-                        <m:ctrlPr>
-                          <a:rPr lang="en-US" sz="1600" i="1">
-                            <a:latin typeface="Cambria Math" panose="02040503050406030204" pitchFamily="18" charset="0"/>
-                            <a:sym typeface="Wingdings" pitchFamily="2" charset="2"/>
-                          </a:rPr>
-                        </m:ctrlPr>
-                      </m:sSubSupPr>
-                      <m:e>
-                        <m:r>
-                          <m:rPr>
-                            <m:sty m:val="p"/>
-                          </m:rPr>
-                          <a:rPr lang="en-US" sz="1600">
-                            <a:latin typeface="Cambria Math" panose="02040503050406030204" pitchFamily="18" charset="0"/>
-                            <a:sym typeface="Wingdings" pitchFamily="2" charset="2"/>
-                          </a:rPr>
-                          <m:t>e</m:t>
-                        </m:r>
-                      </m:e>
-                      <m:sub>
-                        <m:r>
-                          <m:rPr>
-                            <m:sty m:val="p"/>
-                          </m:rPr>
-                          <a:rPr lang="en-US" sz="1600">
-                            <a:latin typeface="Cambria Math" panose="02040503050406030204" pitchFamily="18" charset="0"/>
-                            <a:sym typeface="Wingdings" pitchFamily="2" charset="2"/>
-                          </a:rPr>
-                          <m:t>b</m:t>
-                        </m:r>
-                      </m:sub>
-                      <m:sup>
-                        <m:r>
-                          <a:rPr lang="en-US" sz="1600" i="1">
-                            <a:latin typeface="Cambria Math" panose="02040503050406030204" pitchFamily="18" charset="0"/>
-                            <a:sym typeface="Wingdings" pitchFamily="2" charset="2"/>
-                          </a:rPr>
-                          <m:t>2</m:t>
-                        </m:r>
-                      </m:sup>
-                    </m:sSubSup>
-                    <m:sSub>
-                      <m:sSubPr>
-                        <m:ctrlPr>
-                          <a:rPr lang="en-US" sz="1600" i="1">
-                            <a:latin typeface="Cambria Math" panose="02040503050406030204" pitchFamily="18" charset="0"/>
-                            <a:sym typeface="Wingdings" pitchFamily="2" charset="2"/>
-                          </a:rPr>
-                        </m:ctrlPr>
-                      </m:sSubPr>
-                      <m:e>
-                        <m:r>
-                          <m:rPr>
-                            <m:sty m:val="p"/>
-                          </m:rPr>
-                          <a:rPr lang="en-US" sz="1600">
-                            <a:latin typeface="Cambria Math" panose="02040503050406030204" pitchFamily="18" charset="0"/>
-                            <a:sym typeface="Wingdings" pitchFamily="2" charset="2"/>
-                          </a:rPr>
-                          <m:t>N</m:t>
-                        </m:r>
-                      </m:e>
-                      <m:sub>
-                        <m:r>
-                          <m:rPr>
-                            <m:sty m:val="p"/>
-                          </m:rPr>
-                          <a:rPr lang="en-US" sz="1600">
-                            <a:latin typeface="Cambria Math" panose="02040503050406030204" pitchFamily="18" charset="0"/>
-                            <a:sym typeface="Wingdings" pitchFamily="2" charset="2"/>
-                          </a:rPr>
-                          <m:t>tt</m:t>
-                        </m:r>
-                      </m:sub>
-                    </m:sSub>
-                    <m:r>
-                      <a:rPr lang="en-US" sz="1600">
-                        <a:latin typeface="Cambria Math" panose="02040503050406030204" pitchFamily="18" charset="0"/>
-                        <a:sym typeface="Wingdings" pitchFamily="2" charset="2"/>
-                      </a:rPr>
-                      <m:t> </m:t>
-                    </m:r>
-                    <m:r>
-                      <m:rPr>
-                        <m:sty m:val="p"/>
-                      </m:rPr>
-                      <a:rPr lang="en-US" sz="1600">
-                        <a:latin typeface="Cambria Math" panose="02040503050406030204" pitchFamily="18" charset="0"/>
-                        <a:sym typeface="Wingdings" pitchFamily="2" charset="2"/>
-                      </a:rPr>
-                      <m:t>and</m:t>
-                    </m:r>
-                    <m:r>
-                      <a:rPr lang="en-US" sz="1600">
-                        <a:latin typeface="Cambria Math" panose="02040503050406030204" pitchFamily="18" charset="0"/>
-                        <a:sym typeface="Wingdings" pitchFamily="2" charset="2"/>
-                      </a:rPr>
-                      <m:t> </m:t>
-                    </m:r>
-                    <m:sSubSup>
-                      <m:sSubSupPr>
-                        <m:ctrlPr>
-                          <a:rPr lang="en-US" sz="1600" i="1">
-                            <a:latin typeface="Cambria Math" panose="02040503050406030204" pitchFamily="18" charset="0"/>
-                            <a:sym typeface="Wingdings" pitchFamily="2" charset="2"/>
-                          </a:rPr>
-                        </m:ctrlPr>
-                      </m:sSubSupPr>
-                      <m:e>
-                        <m:r>
-                          <m:rPr>
-                            <m:sty m:val="p"/>
-                          </m:rPr>
-                          <a:rPr lang="en-US" sz="1600">
-                            <a:latin typeface="Cambria Math" panose="02040503050406030204" pitchFamily="18" charset="0"/>
-                            <a:sym typeface="Wingdings" pitchFamily="2" charset="2"/>
-                          </a:rPr>
-                          <m:t>N</m:t>
-                        </m:r>
-                      </m:e>
-                      <m:sub>
-                        <m:r>
-                          <m:rPr>
-                            <m:sty m:val="p"/>
-                          </m:rPr>
-                          <a:rPr lang="en-US" sz="1600">
-                            <a:latin typeface="Cambria Math" panose="02040503050406030204" pitchFamily="18" charset="0"/>
-                            <a:sym typeface="Wingdings" pitchFamily="2" charset="2"/>
-                          </a:rPr>
-                          <m:t>tt</m:t>
-                        </m:r>
-                      </m:sub>
-                      <m:sup>
-                        <m:r>
-                          <a:rPr lang="en-US" sz="1600" i="1">
-                            <a:latin typeface="Cambria Math" panose="02040503050406030204" pitchFamily="18" charset="0"/>
-                            <a:sym typeface="Wingdings" pitchFamily="2" charset="2"/>
-                          </a:rPr>
-                          <m:t>(1)</m:t>
-                        </m:r>
-                      </m:sup>
-                    </m:sSubSup>
-                    <m:r>
-                      <a:rPr lang="en-US" sz="1600" i="1">
-                        <a:latin typeface="Cambria Math" panose="02040503050406030204" pitchFamily="18" charset="0"/>
-                        <a:sym typeface="Wingdings" pitchFamily="2" charset="2"/>
-                      </a:rPr>
-                      <m:t>=2</m:t>
-                    </m:r>
-                    <m:d>
-                      <m:dPr>
-                        <m:ctrlPr>
-                          <a:rPr lang="en-US" sz="1600" i="1">
-                            <a:latin typeface="Cambria Math" panose="02040503050406030204" pitchFamily="18" charset="0"/>
-                            <a:sym typeface="Wingdings" pitchFamily="2" charset="2"/>
-                          </a:rPr>
-                        </m:ctrlPr>
-                      </m:dPr>
-                      <m:e>
-                        <m:r>
-                          <a:rPr lang="en-US" sz="1600" i="1">
-                            <a:latin typeface="Cambria Math" panose="02040503050406030204" pitchFamily="18" charset="0"/>
-                            <a:sym typeface="Wingdings" pitchFamily="2" charset="2"/>
-                          </a:rPr>
-                          <m:t>1−</m:t>
-                        </m:r>
-                        <m:sSub>
-                          <m:sSubPr>
-                            <m:ctrlPr>
-                              <a:rPr lang="en-US" sz="1600" i="1">
-                                <a:latin typeface="Cambria Math" panose="02040503050406030204" pitchFamily="18" charset="0"/>
-                                <a:sym typeface="Wingdings" pitchFamily="2" charset="2"/>
-                              </a:rPr>
-                            </m:ctrlPr>
-                          </m:sSubPr>
-                          <m:e>
-                            <m:r>
-                              <a:rPr lang="en-US" sz="1600" i="1">
-                                <a:latin typeface="Cambria Math" panose="02040503050406030204" pitchFamily="18" charset="0"/>
-                                <a:sym typeface="Wingdings" pitchFamily="2" charset="2"/>
-                              </a:rPr>
-                              <m:t>𝑒</m:t>
-                            </m:r>
-                          </m:e>
-                          <m:sub>
-                            <m:r>
-                              <a:rPr lang="en-US" sz="1600" i="1">
-                                <a:latin typeface="Cambria Math" panose="02040503050406030204" pitchFamily="18" charset="0"/>
-                                <a:sym typeface="Wingdings" pitchFamily="2" charset="2"/>
-                              </a:rPr>
-                              <m:t>𝑏</m:t>
-                            </m:r>
-                          </m:sub>
-                        </m:sSub>
-                      </m:e>
-                    </m:d>
-                    <m:sSub>
-                      <m:sSubPr>
-                        <m:ctrlPr>
-                          <a:rPr lang="en-US" sz="1600" i="1">
-                            <a:latin typeface="Cambria Math" panose="02040503050406030204" pitchFamily="18" charset="0"/>
-                            <a:sym typeface="Wingdings" pitchFamily="2" charset="2"/>
-                          </a:rPr>
-                        </m:ctrlPr>
-                      </m:sSubPr>
-                      <m:e>
-                        <m:r>
-                          <a:rPr lang="en-US" sz="1600" i="1">
-                            <a:latin typeface="Cambria Math" panose="02040503050406030204" pitchFamily="18" charset="0"/>
-                            <a:sym typeface="Wingdings" pitchFamily="2" charset="2"/>
-                          </a:rPr>
-                          <m:t>𝑒</m:t>
-                        </m:r>
-                      </m:e>
-                      <m:sub>
-                        <m:r>
-                          <a:rPr lang="en-US" sz="1600" i="1">
-                            <a:latin typeface="Cambria Math" panose="02040503050406030204" pitchFamily="18" charset="0"/>
-                            <a:sym typeface="Wingdings" pitchFamily="2" charset="2"/>
-                          </a:rPr>
-                          <m:t>𝑏</m:t>
-                        </m:r>
-                      </m:sub>
-                    </m:sSub>
-                    <m:sSub>
-                      <m:sSubPr>
-                        <m:ctrlPr>
-                          <a:rPr lang="en-US" sz="1600" i="1">
-                            <a:latin typeface="Cambria Math" panose="02040503050406030204" pitchFamily="18" charset="0"/>
-                            <a:sym typeface="Wingdings" pitchFamily="2" charset="2"/>
-                          </a:rPr>
-                        </m:ctrlPr>
-                      </m:sSubPr>
-                      <m:e>
-                        <m:r>
-                          <a:rPr lang="en-US" sz="1600" i="1">
-                            <a:latin typeface="Cambria Math" panose="02040503050406030204" pitchFamily="18" charset="0"/>
-                            <a:sym typeface="Wingdings" pitchFamily="2" charset="2"/>
-                          </a:rPr>
-                          <m:t>𝑁</m:t>
-                        </m:r>
-                      </m:e>
-                      <m:sub>
-                        <m:r>
-                          <a:rPr lang="en-US" sz="1600" i="1">
-                            <a:latin typeface="Cambria Math" panose="02040503050406030204" pitchFamily="18" charset="0"/>
-                            <a:sym typeface="Wingdings" pitchFamily="2" charset="2"/>
-                          </a:rPr>
-                          <m:t>𝑡𝑡</m:t>
-                        </m:r>
-                      </m:sub>
-                    </m:sSub>
-                  </m:oMath>
-                </a14:m>
-                <a:r>
-                  <a:rPr lang="en-GB" sz="1600" dirty="0">
-                    <a:sym typeface="Wingdings" pitchFamily="2" charset="2"/>
-                  </a:rPr>
-                  <a:t> where e</a:t>
-                </a:r>
-                <a:r>
-                  <a:rPr lang="en-GB" sz="1600" baseline="-25000" dirty="0">
-                    <a:sym typeface="Wingdings" pitchFamily="2" charset="2"/>
-                  </a:rPr>
-                  <a:t>b</a:t>
-                </a:r>
-                <a:r>
-                  <a:rPr lang="en-GB" sz="1600" dirty="0">
-                    <a:sym typeface="Wingdings" pitchFamily="2" charset="2"/>
-                  </a:rPr>
-                  <a:t> is the b tagging efficiency and </a:t>
-                </a:r>
-                <a:r>
-                  <a:rPr lang="en-GB" sz="1600" dirty="0" err="1">
-                    <a:sym typeface="Wingdings" pitchFamily="2" charset="2"/>
-                  </a:rPr>
-                  <a:t>N</a:t>
-                </a:r>
-                <a:r>
-                  <a:rPr lang="en-GB" sz="1600" baseline="-25000" dirty="0" err="1">
-                    <a:sym typeface="Wingdings" pitchFamily="2" charset="2"/>
-                  </a:rPr>
-                  <a:t>tt</a:t>
-                </a:r>
-                <a:r>
-                  <a:rPr lang="en-GB" sz="1600" dirty="0">
-                    <a:sym typeface="Wingdings" pitchFamily="2" charset="2"/>
-                  </a:rPr>
-                  <a:t> is the total ttbar yield. </a:t>
-                </a:r>
-              </a:p>
-            </p:txBody>
-          </p:sp>
-        </mc:Choice>
-        <mc:Fallback xmlns="">
-          <p:sp>
-            <p:nvSpPr>
-              <p:cNvPr id="22" name="Rectangle 21">
-                <a:extLst>
-                  <a:ext uri="{FF2B5EF4-FFF2-40B4-BE49-F238E27FC236}">
-                    <a16:creationId xmlns:a16="http://schemas.microsoft.com/office/drawing/2014/main" id="{403C8F49-F8D5-384F-BE40-C10B9E2FF0CE}"/>
-                  </a:ext>
-                </a:extLst>
-              </p:cNvPr>
-              <p:cNvSpPr>
-                <a:spLocks noRot="1" noChangeAspect="1" noMove="1" noResize="1" noEditPoints="1" noAdjustHandles="1" noChangeArrowheads="1" noChangeShapeType="1" noTextEdit="1"/>
-              </p:cNvSpPr>
-              <p:nvPr/>
-            </p:nvSpPr>
-            <p:spPr>
-              <a:xfrm>
-                <a:off x="111965" y="5591030"/>
-                <a:ext cx="10730444" cy="646139"/>
-              </a:xfrm>
-              <a:prstGeom prst="rect">
-                <a:avLst/>
-              </a:prstGeom>
-              <a:blipFill>
-                <a:blip r:embed="rId4"/>
-                <a:stretch>
-                  <a:fillRect l="-236" b="-9615"/>
                 </a:stretch>
               </a:blipFill>
             </p:spPr>

</xml_diff>